<commit_message>
paper: address issues 1, 2, 3 from reviewers
Signed-off-by: Michael Sevilla <mikesevilla3@gmail.com>
</commit_message>
<xml_diff>
--- a/paper/figures/figures.pptx
+++ b/paper/figures/figures.pptx
@@ -8,7 +8,7 @@
     <p:sldMasterId id="2147483684" r:id="rId4"/>
   </p:sldMasterIdLst>
   <p:notesMasterIdLst>
-    <p:notesMasterId r:id="rId18"/>
+    <p:notesMasterId r:id="rId19"/>
   </p:notesMasterIdLst>
   <p:sldIdLst>
     <p:sldId id="256" r:id="rId5"/>
@@ -16,14 +16,15 @@
     <p:sldId id="303" r:id="rId7"/>
     <p:sldId id="304" r:id="rId8"/>
     <p:sldId id="305" r:id="rId9"/>
-    <p:sldId id="296" r:id="rId10"/>
-    <p:sldId id="301" r:id="rId11"/>
-    <p:sldId id="302" r:id="rId12"/>
-    <p:sldId id="291" r:id="rId13"/>
-    <p:sldId id="270" r:id="rId14"/>
-    <p:sldId id="294" r:id="rId15"/>
-    <p:sldId id="272" r:id="rId16"/>
-    <p:sldId id="295" r:id="rId17"/>
+    <p:sldId id="306" r:id="rId10"/>
+    <p:sldId id="296" r:id="rId11"/>
+    <p:sldId id="301" r:id="rId12"/>
+    <p:sldId id="302" r:id="rId13"/>
+    <p:sldId id="291" r:id="rId14"/>
+    <p:sldId id="270" r:id="rId15"/>
+    <p:sldId id="294" r:id="rId16"/>
+    <p:sldId id="272" r:id="rId17"/>
+    <p:sldId id="295" r:id="rId18"/>
   </p:sldIdLst>
   <p:sldSz cx="12192000" cy="6858000"/>
   <p:notesSz cx="6858000" cy="9144000"/>
@@ -124,7 +125,7 @@
   </p:defaultTextStyle>
   <p:extLst>
     <p:ext uri="{EFAFB233-063F-42B5-8137-9DF3F51BA10A}">
-      <p15:sldGuideLst xmlns="" xmlns:p15="http://schemas.microsoft.com/office/powerpoint/2012/main"/>
+      <p15:sldGuideLst xmlns:p15="http://schemas.microsoft.com/office/powerpoint/2012/main" xmlns=""/>
     </p:ext>
   </p:extLst>
 </p:presentation>
@@ -212,7 +213,7 @@
           <a:p>
             <a:fld id="{8B6AC9F1-AAD0-495C-933B-F901D4FCD036}" type="datetimeFigureOut">
               <a:rPr lang="en-US" smtClean="0"/>
-              <a:t>2/6/17</a:t>
+              <a:t>2/8/17</a:t>
             </a:fld>
             <a:endParaRPr lang="en-US"/>
           </a:p>
@@ -637,7 +638,7 @@
           <a:p>
             <a:fld id="{E1BA7341-26C0-4A86-AD44-E110A3BEC611}" type="slidenum">
               <a:rPr lang="en-US" smtClean="0"/>
-              <a:t>8</a:t>
+              <a:t>9</a:t>
             </a:fld>
             <a:endParaRPr lang="en-US"/>
           </a:p>
@@ -729,7 +730,7 @@
           <a:p>
             <a:fld id="{E1BA7341-26C0-4A86-AD44-E110A3BEC611}" type="slidenum">
               <a:rPr lang="en-US" smtClean="0"/>
-              <a:t>10</a:t>
+              <a:t>11</a:t>
             </a:fld>
             <a:endParaRPr lang="en-US"/>
           </a:p>
@@ -898,7 +899,7 @@
           <a:p>
             <a:fld id="{E1BA7341-26C0-4A86-AD44-E110A3BEC611}" type="slidenum">
               <a:rPr lang="en-US" smtClean="0"/>
-              <a:t>13</a:t>
+              <a:t>14</a:t>
             </a:fld>
             <a:endParaRPr lang="en-US"/>
           </a:p>
@@ -1048,7 +1049,7 @@
           <a:p>
             <a:fld id="{7ACA203A-1341-45AE-8AE5-9E342A2C38C9}" type="datetimeFigureOut">
               <a:rPr lang="en-US" smtClean="0"/>
-              <a:t>2/6/17</a:t>
+              <a:t>2/8/17</a:t>
             </a:fld>
             <a:endParaRPr lang="en-US"/>
           </a:p>
@@ -1225,7 +1226,7 @@
           <a:p>
             <a:fld id="{7ACA203A-1341-45AE-8AE5-9E342A2C38C9}" type="datetimeFigureOut">
               <a:rPr lang="en-US" smtClean="0"/>
-              <a:t>2/6/17</a:t>
+              <a:t>2/8/17</a:t>
             </a:fld>
             <a:endParaRPr lang="en-US"/>
           </a:p>
@@ -1412,7 +1413,7 @@
           <a:p>
             <a:fld id="{7ACA203A-1341-45AE-8AE5-9E342A2C38C9}" type="datetimeFigureOut">
               <a:rPr lang="en-US" smtClean="0"/>
-              <a:t>2/6/17</a:t>
+              <a:t>2/8/17</a:t>
             </a:fld>
             <a:endParaRPr lang="en-US"/>
           </a:p>
@@ -2220,7 +2221,7 @@
           <a:p>
             <a:fld id="{BA5C85E4-B586-4D50-9BA0-0F3A58A49C8B}" type="datetimeFigureOut">
               <a:rPr lang="en-US" smtClean="0"/>
-              <a:t>2/6/17</a:t>
+              <a:t>2/8/17</a:t>
             </a:fld>
             <a:endParaRPr lang="en-US"/>
           </a:p>
@@ -2526,7 +2527,7 @@
           <a:p>
             <a:fld id="{BA5C85E4-B586-4D50-9BA0-0F3A58A49C8B}" type="datetimeFigureOut">
               <a:rPr lang="en-US" smtClean="0"/>
-              <a:t>2/6/17</a:t>
+              <a:t>2/8/17</a:t>
             </a:fld>
             <a:endParaRPr lang="en-US"/>
           </a:p>
@@ -2779,7 +2780,7 @@
           <a:p>
             <a:fld id="{BA5C85E4-B586-4D50-9BA0-0F3A58A49C8B}" type="datetimeFigureOut">
               <a:rPr lang="en-US" smtClean="0"/>
-              <a:t>2/6/17</a:t>
+              <a:t>2/8/17</a:t>
             </a:fld>
             <a:endParaRPr lang="en-US"/>
           </a:p>
@@ -3018,7 +3019,7 @@
           <a:p>
             <a:fld id="{BA5C85E4-B586-4D50-9BA0-0F3A58A49C8B}" type="datetimeFigureOut">
               <a:rPr lang="en-US" smtClean="0"/>
-              <a:t>2/6/17</a:t>
+              <a:t>2/8/17</a:t>
             </a:fld>
             <a:endParaRPr lang="en-US"/>
           </a:p>
@@ -3392,7 +3393,7 @@
           <a:p>
             <a:fld id="{BA5C85E4-B586-4D50-9BA0-0F3A58A49C8B}" type="datetimeFigureOut">
               <a:rPr lang="en-US" smtClean="0"/>
-              <a:t>2/6/17</a:t>
+              <a:t>2/8/17</a:t>
             </a:fld>
             <a:endParaRPr lang="en-US"/>
           </a:p>
@@ -3517,7 +3518,7 @@
           <a:p>
             <a:fld id="{BA5C85E4-B586-4D50-9BA0-0F3A58A49C8B}" type="datetimeFigureOut">
               <a:rPr lang="en-US" smtClean="0"/>
-              <a:t>2/6/17</a:t>
+              <a:t>2/8/17</a:t>
             </a:fld>
             <a:endParaRPr lang="en-US"/>
           </a:p>
@@ -3619,7 +3620,7 @@
           <a:p>
             <a:fld id="{BA5C85E4-B586-4D50-9BA0-0F3A58A49C8B}" type="datetimeFigureOut">
               <a:rPr lang="en-US" smtClean="0"/>
-              <a:t>2/6/17</a:t>
+              <a:t>2/8/17</a:t>
             </a:fld>
             <a:endParaRPr lang="en-US"/>
           </a:p>
@@ -3903,7 +3904,7 @@
           <a:p>
             <a:fld id="{BA5C85E4-B586-4D50-9BA0-0F3A58A49C8B}" type="datetimeFigureOut">
               <a:rPr lang="en-US" smtClean="0"/>
-              <a:t>2/6/17</a:t>
+              <a:t>2/8/17</a:t>
             </a:fld>
             <a:endParaRPr lang="en-US"/>
           </a:p>
@@ -4080,7 +4081,7 @@
           <a:p>
             <a:fld id="{7ACA203A-1341-45AE-8AE5-9E342A2C38C9}" type="datetimeFigureOut">
               <a:rPr lang="en-US" smtClean="0"/>
-              <a:t>2/6/17</a:t>
+              <a:t>2/8/17</a:t>
             </a:fld>
             <a:endParaRPr lang="en-US"/>
           </a:p>
@@ -4340,7 +4341,7 @@
           <a:p>
             <a:fld id="{BA5C85E4-B586-4D50-9BA0-0F3A58A49C8B}" type="datetimeFigureOut">
               <a:rPr lang="en-US" smtClean="0"/>
-              <a:t>2/6/17</a:t>
+              <a:t>2/8/17</a:t>
             </a:fld>
             <a:endParaRPr lang="en-US"/>
           </a:p>
@@ -4510,7 +4511,7 @@
           <a:p>
             <a:fld id="{BA5C85E4-B586-4D50-9BA0-0F3A58A49C8B}" type="datetimeFigureOut">
               <a:rPr lang="en-US" smtClean="0"/>
-              <a:t>2/6/17</a:t>
+              <a:t>2/8/17</a:t>
             </a:fld>
             <a:endParaRPr lang="en-US"/>
           </a:p>
@@ -4690,7 +4691,7 @@
           <a:p>
             <a:fld id="{BA5C85E4-B586-4D50-9BA0-0F3A58A49C8B}" type="datetimeFigureOut">
               <a:rPr lang="en-US" smtClean="0"/>
-              <a:t>2/6/17</a:t>
+              <a:t>2/8/17</a:t>
             </a:fld>
             <a:endParaRPr lang="en-US"/>
           </a:p>
@@ -4889,7 +4890,7 @@
           <a:p>
             <a:fld id="{027A1B2E-1286-4A75-915E-AE937742E7F1}" type="datetimeFigureOut">
               <a:rPr lang="en-US" smtClean="0"/>
-              <a:t>2/6/17</a:t>
+              <a:t>2/8/17</a:t>
             </a:fld>
             <a:endParaRPr lang="en-US"/>
           </a:p>
@@ -5374,7 +5375,7 @@
           <a:p>
             <a:fld id="{027A1B2E-1286-4A75-915E-AE937742E7F1}" type="datetimeFigureOut">
               <a:rPr lang="en-US" smtClean="0"/>
-              <a:t>2/6/17</a:t>
+              <a:t>2/8/17</a:t>
             </a:fld>
             <a:endParaRPr lang="en-US"/>
           </a:p>
@@ -5627,7 +5628,7 @@
           <a:p>
             <a:fld id="{027A1B2E-1286-4A75-915E-AE937742E7F1}" type="datetimeFigureOut">
               <a:rPr lang="en-US" smtClean="0"/>
-              <a:t>2/6/17</a:t>
+              <a:t>2/8/17</a:t>
             </a:fld>
             <a:endParaRPr lang="en-US"/>
           </a:p>
@@ -5859,7 +5860,7 @@
           <a:p>
             <a:fld id="{027A1B2E-1286-4A75-915E-AE937742E7F1}" type="datetimeFigureOut">
               <a:rPr lang="en-US" smtClean="0"/>
-              <a:t>2/6/17</a:t>
+              <a:t>2/8/17</a:t>
             </a:fld>
             <a:endParaRPr lang="en-US"/>
           </a:p>
@@ -6226,7 +6227,7 @@
           <a:p>
             <a:fld id="{027A1B2E-1286-4A75-915E-AE937742E7F1}" type="datetimeFigureOut">
               <a:rPr lang="en-US" smtClean="0"/>
-              <a:t>2/6/17</a:t>
+              <a:t>2/8/17</a:t>
             </a:fld>
             <a:endParaRPr lang="en-US"/>
           </a:p>
@@ -6344,7 +6345,7 @@
           <a:p>
             <a:fld id="{027A1B2E-1286-4A75-915E-AE937742E7F1}" type="datetimeFigureOut">
               <a:rPr lang="en-US" smtClean="0"/>
-              <a:t>2/6/17</a:t>
+              <a:t>2/8/17</a:t>
             </a:fld>
             <a:endParaRPr lang="en-US"/>
           </a:p>
@@ -6439,7 +6440,7 @@
           <a:p>
             <a:fld id="{027A1B2E-1286-4A75-915E-AE937742E7F1}" type="datetimeFigureOut">
               <a:rPr lang="en-US" smtClean="0"/>
-              <a:t>2/6/17</a:t>
+              <a:t>2/8/17</a:t>
             </a:fld>
             <a:endParaRPr lang="en-US"/>
           </a:p>
@@ -6685,7 +6686,7 @@
           <a:p>
             <a:fld id="{7ACA203A-1341-45AE-8AE5-9E342A2C38C9}" type="datetimeFigureOut">
               <a:rPr lang="en-US" smtClean="0"/>
-              <a:t>2/6/17</a:t>
+              <a:t>2/8/17</a:t>
             </a:fld>
             <a:endParaRPr lang="en-US"/>
           </a:p>
@@ -6969,7 +6970,7 @@
           <a:p>
             <a:fld id="{027A1B2E-1286-4A75-915E-AE937742E7F1}" type="datetimeFigureOut">
               <a:rPr lang="en-US" smtClean="0"/>
-              <a:t>2/6/17</a:t>
+              <a:t>2/8/17</a:t>
             </a:fld>
             <a:endParaRPr lang="en-US"/>
           </a:p>
@@ -7222,7 +7223,7 @@
           <a:p>
             <a:fld id="{027A1B2E-1286-4A75-915E-AE937742E7F1}" type="datetimeFigureOut">
               <a:rPr lang="en-US" smtClean="0"/>
-              <a:t>2/6/17</a:t>
+              <a:t>2/8/17</a:t>
             </a:fld>
             <a:endParaRPr lang="en-US"/>
           </a:p>
@@ -7399,7 +7400,7 @@
           <a:p>
             <a:fld id="{027A1B2E-1286-4A75-915E-AE937742E7F1}" type="datetimeFigureOut">
               <a:rPr lang="en-US" smtClean="0"/>
-              <a:t>2/6/17</a:t>
+              <a:t>2/8/17</a:t>
             </a:fld>
             <a:endParaRPr lang="en-US"/>
           </a:p>
@@ -7579,7 +7580,7 @@
           <a:p>
             <a:fld id="{027A1B2E-1286-4A75-915E-AE937742E7F1}" type="datetimeFigureOut">
               <a:rPr lang="en-US" smtClean="0"/>
-              <a:t>2/6/17</a:t>
+              <a:t>2/8/17</a:t>
             </a:fld>
             <a:endParaRPr lang="en-US"/>
           </a:p>
@@ -7771,7 +7772,7 @@
           <a:p>
             <a:fld id="{9C0D432E-3E9D-4011-B87F-F9F35BE171A9}" type="datetimeFigureOut">
               <a:rPr lang="en-US" smtClean="0"/>
-              <a:t>2/6/17</a:t>
+              <a:t>2/8/17</a:t>
             </a:fld>
             <a:endParaRPr lang="en-US"/>
           </a:p>
@@ -8318,7 +8319,7 @@
           <a:p>
             <a:fld id="{9C0D432E-3E9D-4011-B87F-F9F35BE171A9}" type="datetimeFigureOut">
               <a:rPr lang="en-US" smtClean="0"/>
-              <a:t>2/6/17</a:t>
+              <a:t>2/8/17</a:t>
             </a:fld>
             <a:endParaRPr lang="en-US"/>
           </a:p>
@@ -8571,7 +8572,7 @@
           <a:p>
             <a:fld id="{9C0D432E-3E9D-4011-B87F-F9F35BE171A9}" type="datetimeFigureOut">
               <a:rPr lang="en-US" smtClean="0"/>
-              <a:t>2/6/17</a:t>
+              <a:t>2/8/17</a:t>
             </a:fld>
             <a:endParaRPr lang="en-US"/>
           </a:p>
@@ -8803,7 +8804,7 @@
           <a:p>
             <a:fld id="{9C0D432E-3E9D-4011-B87F-F9F35BE171A9}" type="datetimeFigureOut">
               <a:rPr lang="en-US" smtClean="0"/>
-              <a:t>2/6/17</a:t>
+              <a:t>2/8/17</a:t>
             </a:fld>
             <a:endParaRPr lang="en-US"/>
           </a:p>
@@ -9170,7 +9171,7 @@
           <a:p>
             <a:fld id="{9C0D432E-3E9D-4011-B87F-F9F35BE171A9}" type="datetimeFigureOut">
               <a:rPr lang="en-US" smtClean="0"/>
-              <a:t>2/6/17</a:t>
+              <a:t>2/8/17</a:t>
             </a:fld>
             <a:endParaRPr lang="en-US"/>
           </a:p>
@@ -9288,7 +9289,7 @@
           <a:p>
             <a:fld id="{9C0D432E-3E9D-4011-B87F-F9F35BE171A9}" type="datetimeFigureOut">
               <a:rPr lang="en-US" smtClean="0"/>
-              <a:t>2/6/17</a:t>
+              <a:t>2/8/17</a:t>
             </a:fld>
             <a:endParaRPr lang="en-US"/>
           </a:p>
@@ -9520,7 +9521,7 @@
           <a:p>
             <a:fld id="{7ACA203A-1341-45AE-8AE5-9E342A2C38C9}" type="datetimeFigureOut">
               <a:rPr lang="en-US" smtClean="0"/>
-              <a:t>2/6/17</a:t>
+              <a:t>2/8/17</a:t>
             </a:fld>
             <a:endParaRPr lang="en-US"/>
           </a:p>
@@ -9627,7 +9628,7 @@
           <a:p>
             <a:fld id="{9C0D432E-3E9D-4011-B87F-F9F35BE171A9}" type="datetimeFigureOut">
               <a:rPr lang="en-US" smtClean="0"/>
-              <a:t>2/6/17</a:t>
+              <a:t>2/8/17</a:t>
             </a:fld>
             <a:endParaRPr lang="en-US"/>
           </a:p>
@@ -9904,7 +9905,7 @@
           <a:p>
             <a:fld id="{9C0D432E-3E9D-4011-B87F-F9F35BE171A9}" type="datetimeFigureOut">
               <a:rPr lang="en-US" smtClean="0"/>
-              <a:t>2/6/17</a:t>
+              <a:t>2/8/17</a:t>
             </a:fld>
             <a:endParaRPr lang="en-US"/>
           </a:p>
@@ -10157,7 +10158,7 @@
           <a:p>
             <a:fld id="{9C0D432E-3E9D-4011-B87F-F9F35BE171A9}" type="datetimeFigureOut">
               <a:rPr lang="en-US" smtClean="0"/>
-              <a:t>2/6/17</a:t>
+              <a:t>2/8/17</a:t>
             </a:fld>
             <a:endParaRPr lang="en-US"/>
           </a:p>
@@ -10327,7 +10328,7 @@
           <a:p>
             <a:fld id="{9C0D432E-3E9D-4011-B87F-F9F35BE171A9}" type="datetimeFigureOut">
               <a:rPr lang="en-US" smtClean="0"/>
-              <a:t>2/6/17</a:t>
+              <a:t>2/8/17</a:t>
             </a:fld>
             <a:endParaRPr lang="en-US"/>
           </a:p>
@@ -10507,7 +10508,7 @@
           <a:p>
             <a:fld id="{9C0D432E-3E9D-4011-B87F-F9F35BE171A9}" type="datetimeFigureOut">
               <a:rPr lang="en-US" smtClean="0"/>
-              <a:t>2/6/17</a:t>
+              <a:t>2/8/17</a:t>
             </a:fld>
             <a:endParaRPr lang="en-US"/>
           </a:p>
@@ -10874,7 +10875,7 @@
           <a:p>
             <a:fld id="{7ACA203A-1341-45AE-8AE5-9E342A2C38C9}" type="datetimeFigureOut">
               <a:rPr lang="en-US" smtClean="0"/>
-              <a:t>2/6/17</a:t>
+              <a:t>2/8/17</a:t>
             </a:fld>
             <a:endParaRPr lang="en-US"/>
           </a:p>
@@ -10999,7 +11000,7 @@
           <a:p>
             <a:fld id="{7ACA203A-1341-45AE-8AE5-9E342A2C38C9}" type="datetimeFigureOut">
               <a:rPr lang="en-US" smtClean="0"/>
-              <a:t>2/6/17</a:t>
+              <a:t>2/8/17</a:t>
             </a:fld>
             <a:endParaRPr lang="en-US"/>
           </a:p>
@@ -11101,7 +11102,7 @@
           <a:p>
             <a:fld id="{7ACA203A-1341-45AE-8AE5-9E342A2C38C9}" type="datetimeFigureOut">
               <a:rPr lang="en-US" smtClean="0"/>
-              <a:t>2/6/17</a:t>
+              <a:t>2/8/17</a:t>
             </a:fld>
             <a:endParaRPr lang="en-US"/>
           </a:p>
@@ -11385,7 +11386,7 @@
           <a:p>
             <a:fld id="{7ACA203A-1341-45AE-8AE5-9E342A2C38C9}" type="datetimeFigureOut">
               <a:rPr lang="en-US" smtClean="0"/>
-              <a:t>2/6/17</a:t>
+              <a:t>2/8/17</a:t>
             </a:fld>
             <a:endParaRPr lang="en-US"/>
           </a:p>
@@ -11645,7 +11646,7 @@
           <a:p>
             <a:fld id="{7ACA203A-1341-45AE-8AE5-9E342A2C38C9}" type="datetimeFigureOut">
               <a:rPr lang="en-US" smtClean="0"/>
-              <a:t>2/6/17</a:t>
+              <a:t>2/8/17</a:t>
             </a:fld>
             <a:endParaRPr lang="en-US"/>
           </a:p>
@@ -11858,7 +11859,7 @@
           <a:p>
             <a:fld id="{7ACA203A-1341-45AE-8AE5-9E342A2C38C9}" type="datetimeFigureOut">
               <a:rPr lang="en-US" smtClean="0"/>
-              <a:t>2/6/17</a:t>
+              <a:t>2/8/17</a:t>
             </a:fld>
             <a:endParaRPr lang="en-US"/>
           </a:p>
@@ -12405,7 +12406,7 @@
           <a:p>
             <a:fld id="{BA5C85E4-B586-4D50-9BA0-0F3A58A49C8B}" type="datetimeFigureOut">
               <a:rPr lang="en-US" smtClean="0"/>
-              <a:t>2/6/17</a:t>
+              <a:t>2/8/17</a:t>
             </a:fld>
             <a:endParaRPr lang="en-US"/>
           </a:p>
@@ -13035,7 +13036,7 @@
           <a:p>
             <a:fld id="{027A1B2E-1286-4A75-915E-AE937742E7F1}" type="datetimeFigureOut">
               <a:rPr lang="en-US" smtClean="0"/>
-              <a:t>2/6/17</a:t>
+              <a:t>2/8/17</a:t>
             </a:fld>
             <a:endParaRPr lang="en-US"/>
           </a:p>
@@ -13718,7 +13719,7 @@
           <a:p>
             <a:fld id="{9C0D432E-3E9D-4011-B87F-F9F35BE171A9}" type="datetimeFigureOut">
               <a:rPr lang="en-US" smtClean="0"/>
-              <a:t>2/6/17</a:t>
+              <a:t>2/8/17</a:t>
             </a:fld>
             <a:endParaRPr lang="en-US"/>
           </a:p>
@@ -14452,6 +14453,634 @@
 </file>
 
 <file path=ppt/slides/slide10.xml><?xml version="1.0" encoding="utf-8"?>
+<p:sld xmlns:a="http://schemas.openxmlformats.org/drawingml/2006/main" xmlns:r="http://schemas.openxmlformats.org/officeDocument/2006/relationships" xmlns:p="http://schemas.openxmlformats.org/presentationml/2006/main">
+  <p:cSld>
+    <p:spTree>
+      <p:nvGrpSpPr>
+        <p:cNvPr id="1" name=""/>
+        <p:cNvGrpSpPr/>
+        <p:nvPr/>
+      </p:nvGrpSpPr>
+      <p:grpSpPr>
+        <a:xfrm>
+          <a:off x="0" y="0"/>
+          <a:ext cx="0" cy="0"/>
+          <a:chOff x="0" y="0"/>
+          <a:chExt cx="0" cy="0"/>
+        </a:xfrm>
+      </p:grpSpPr>
+      <p:sp>
+        <p:nvSpPr>
+          <p:cNvPr id="2" name="Title 1"/>
+          <p:cNvSpPr>
+            <a:spLocks noGrp="1"/>
+          </p:cNvSpPr>
+          <p:nvPr>
+            <p:ph type="title"/>
+          </p:nvPr>
+        </p:nvSpPr>
+        <p:spPr/>
+        <p:txBody>
+          <a:bodyPr/>
+          <a:lstStyle/>
+          <a:p>
+            <a:r>
+              <a:rPr lang="en-US" dirty="0" smtClean="0"/>
+              <a:t>A Quick Story…</a:t>
+            </a:r>
+            <a:endParaRPr lang="en-US" dirty="0"/>
+          </a:p>
+        </p:txBody>
+      </p:sp>
+      <p:sp>
+        <p:nvSpPr>
+          <p:cNvPr id="3" name="Content Placeholder 2"/>
+          <p:cNvSpPr>
+            <a:spLocks noGrp="1"/>
+          </p:cNvSpPr>
+          <p:nvPr>
+            <p:ph idx="1"/>
+          </p:nvPr>
+        </p:nvSpPr>
+        <p:spPr/>
+        <p:txBody>
+          <a:bodyPr>
+            <a:normAutofit/>
+          </a:bodyPr>
+          <a:lstStyle/>
+          <a:p>
+            <a:pPr marL="0" indent="0">
+              <a:buNone/>
+            </a:pPr>
+            <a:r>
+              <a:rPr lang="en-US" dirty="0" smtClean="0"/>
+              <a:t>Research Code </a:t>
+            </a:r>
+            <a:r>
+              <a:rPr lang="en-US" dirty="0"/>
+              <a:t>≠ Production </a:t>
+            </a:r>
+            <a:r>
+              <a:rPr lang="en-US" dirty="0" smtClean="0"/>
+              <a:t>quality</a:t>
+            </a:r>
+          </a:p>
+          <a:p>
+            <a:pPr marL="514350" indent="-514350">
+              <a:buAutoNum type="arabicPeriod"/>
+            </a:pPr>
+            <a:r>
+              <a:rPr lang="en-US" sz="2800" b="1" dirty="0" smtClean="0">
+                <a:solidFill>
+                  <a:srgbClr val="FF0000"/>
+                </a:solidFill>
+              </a:rPr>
+              <a:t>Distributing work</a:t>
+            </a:r>
+          </a:p>
+          <a:p>
+            <a:pPr lvl="1"/>
+            <a:r>
+              <a:rPr lang="en-US" dirty="0" smtClean="0"/>
+              <a:t>Dynamically </a:t>
+            </a:r>
+            <a:r>
+              <a:rPr lang="en-US" dirty="0"/>
+              <a:t>load </a:t>
+            </a:r>
+            <a:r>
+              <a:rPr lang="en-US" dirty="0" smtClean="0"/>
+              <a:t>balancers?</a:t>
+            </a:r>
+          </a:p>
+          <a:p>
+            <a:pPr lvl="1"/>
+            <a:r>
+              <a:rPr lang="en-US" sz="2400" dirty="0" smtClean="0"/>
+              <a:t>Safety </a:t>
+            </a:r>
+            <a:r>
+              <a:rPr lang="en-US" sz="2400" dirty="0"/>
+              <a:t>and security</a:t>
+            </a:r>
+            <a:r>
+              <a:rPr lang="en-US" sz="2400" dirty="0" smtClean="0"/>
+              <a:t>?</a:t>
+            </a:r>
+          </a:p>
+          <a:p>
+            <a:pPr marL="514350" indent="-514350">
+              <a:buAutoNum type="arabicPeriod"/>
+            </a:pPr>
+            <a:r>
+              <a:rPr lang="en-US" b="1" dirty="0" smtClean="0">
+                <a:solidFill>
+                  <a:srgbClr val="FF0000"/>
+                </a:solidFill>
+              </a:rPr>
+              <a:t>Durability</a:t>
+            </a:r>
+          </a:p>
+          <a:p>
+            <a:pPr lvl="1"/>
+            <a:r>
+              <a:rPr lang="en-US" dirty="0" smtClean="0"/>
+              <a:t>Store balancers?</a:t>
+            </a:r>
+          </a:p>
+          <a:p>
+            <a:pPr marL="514350" indent="-514350">
+              <a:buAutoNum type="arabicPeriod"/>
+            </a:pPr>
+            <a:r>
+              <a:rPr lang="en-US" sz="2800" b="1" dirty="0" smtClean="0">
+                <a:solidFill>
+                  <a:srgbClr val="FF0000"/>
+                </a:solidFill>
+              </a:rPr>
+              <a:t>Versioning</a:t>
+            </a:r>
+          </a:p>
+          <a:p>
+            <a:pPr lvl="1"/>
+            <a:r>
+              <a:rPr lang="en-US" sz="2400" dirty="0" smtClean="0"/>
+              <a:t>Current balancer?</a:t>
+            </a:r>
+          </a:p>
+        </p:txBody>
+      </p:sp>
+      <p:pic>
+        <p:nvPicPr>
+          <p:cNvPr id="9" name="Picture 8"/>
+          <p:cNvPicPr>
+            <a:picLocks noChangeAspect="1"/>
+          </p:cNvPicPr>
+          <p:nvPr/>
+        </p:nvPicPr>
+        <p:blipFill rotWithShape="1">
+          <a:blip r:embed="rId2"/>
+          <a:srcRect l="14492" t="12753" r="33898"/>
+          <a:stretch/>
+        </p:blipFill>
+        <p:spPr>
+          <a:xfrm>
+            <a:off x="8466749" y="651184"/>
+            <a:ext cx="3465914" cy="4504194"/>
+          </a:xfrm>
+          <a:prstGeom prst="rect">
+            <a:avLst/>
+          </a:prstGeom>
+          <a:ln>
+            <a:solidFill>
+              <a:schemeClr val="tx1"/>
+            </a:solidFill>
+          </a:ln>
+        </p:spPr>
+      </p:pic>
+      <p:pic>
+        <p:nvPicPr>
+          <p:cNvPr id="4" name="Picture 3" descr="Screen Shot 2016-01-14 at 9.55.13 AM.png"/>
+          <p:cNvPicPr>
+            <a:picLocks noChangeAspect="1"/>
+          </p:cNvPicPr>
+          <p:nvPr/>
+        </p:nvPicPr>
+        <p:blipFill rotWithShape="1">
+          <a:blip r:embed="rId3" cstate="print">
+            <a:extLst>
+              <a:ext uri="{28A0092B-C50C-407E-A947-70E740481C1C}">
+                <a14:useLocalDpi xmlns:a14="http://schemas.microsoft.com/office/drawing/2010/main" val="0"/>
+              </a:ext>
+            </a:extLst>
+          </a:blip>
+          <a:srcRect r="26247"/>
+          <a:stretch/>
+        </p:blipFill>
+        <p:spPr>
+          <a:xfrm>
+            <a:off x="6067837" y="3091903"/>
+            <a:ext cx="3133486" cy="2349534"/>
+          </a:xfrm>
+          <a:prstGeom prst="rect">
+            <a:avLst/>
+          </a:prstGeom>
+          <a:ln>
+            <a:solidFill>
+              <a:srgbClr val="0D0D0D"/>
+            </a:solidFill>
+          </a:ln>
+        </p:spPr>
+      </p:pic>
+    </p:spTree>
+    <p:extLst>
+      <p:ext uri="{BB962C8B-B14F-4D97-AF65-F5344CB8AC3E}">
+        <p14:creationId xmlns:p14="http://schemas.microsoft.com/office/powerpoint/2010/main" val="3991331871"/>
+      </p:ext>
+    </p:extLst>
+  </p:cSld>
+  <p:clrMapOvr>
+    <a:masterClrMapping/>
+  </p:clrMapOvr>
+  <p:timing>
+    <p:tnLst>
+      <p:par>
+        <p:cTn xmlns:p14="http://schemas.microsoft.com/office/powerpoint/2010/main" id="1" dur="indefinite" restart="never" nodeType="tmRoot">
+          <p:childTnLst>
+            <p:seq concurrent="1" nextAc="seek">
+              <p:cTn id="2" dur="indefinite" nodeType="mainSeq">
+                <p:childTnLst>
+                  <p:par>
+                    <p:cTn id="3" fill="hold">
+                      <p:stCondLst>
+                        <p:cond delay="indefinite"/>
+                      </p:stCondLst>
+                      <p:childTnLst>
+                        <p:par>
+                          <p:cTn id="4" fill="hold">
+                            <p:stCondLst>
+                              <p:cond delay="0"/>
+                            </p:stCondLst>
+                            <p:childTnLst>
+                              <p:par>
+                                <p:cTn id="5" presetID="1" presetClass="entr" presetSubtype="0" fill="hold" nodeType="clickEffect">
+                                  <p:stCondLst>
+                                    <p:cond delay="0"/>
+                                  </p:stCondLst>
+                                  <p:childTnLst>
+                                    <p:set>
+                                      <p:cBhvr>
+                                        <p:cTn id="6" dur="1" fill="hold">
+                                          <p:stCondLst>
+                                            <p:cond delay="0"/>
+                                          </p:stCondLst>
+                                        </p:cTn>
+                                        <p:tgtEl>
+                                          <p:spTgt spid="4"/>
+                                        </p:tgtEl>
+                                        <p:attrNameLst>
+                                          <p:attrName>style.visibility</p:attrName>
+                                        </p:attrNameLst>
+                                      </p:cBhvr>
+                                      <p:to>
+                                        <p:strVal val="visible"/>
+                                      </p:to>
+                                    </p:set>
+                                  </p:childTnLst>
+                                </p:cTn>
+                              </p:par>
+                            </p:childTnLst>
+                          </p:cTn>
+                        </p:par>
+                      </p:childTnLst>
+                    </p:cTn>
+                  </p:par>
+                  <p:par>
+                    <p:cTn id="7" fill="hold">
+                      <p:stCondLst>
+                        <p:cond delay="indefinite"/>
+                      </p:stCondLst>
+                      <p:childTnLst>
+                        <p:par>
+                          <p:cTn id="8" fill="hold">
+                            <p:stCondLst>
+                              <p:cond delay="0"/>
+                            </p:stCondLst>
+                            <p:childTnLst>
+                              <p:par>
+                                <p:cTn id="9" presetID="1" presetClass="entr" presetSubtype="0" fill="hold" nodeType="clickEffect">
+                                  <p:stCondLst>
+                                    <p:cond delay="0"/>
+                                  </p:stCondLst>
+                                  <p:childTnLst>
+                                    <p:set>
+                                      <p:cBhvr>
+                                        <p:cTn id="10" dur="1" fill="hold">
+                                          <p:stCondLst>
+                                            <p:cond delay="0"/>
+                                          </p:stCondLst>
+                                        </p:cTn>
+                                        <p:tgtEl>
+                                          <p:spTgt spid="3">
+                                            <p:txEl>
+                                              <p:pRg st="0" end="0"/>
+                                            </p:txEl>
+                                          </p:spTgt>
+                                        </p:tgtEl>
+                                        <p:attrNameLst>
+                                          <p:attrName>style.visibility</p:attrName>
+                                        </p:attrNameLst>
+                                      </p:cBhvr>
+                                      <p:to>
+                                        <p:strVal val="visible"/>
+                                      </p:to>
+                                    </p:set>
+                                  </p:childTnLst>
+                                </p:cTn>
+                              </p:par>
+                            </p:childTnLst>
+                          </p:cTn>
+                        </p:par>
+                      </p:childTnLst>
+                    </p:cTn>
+                  </p:par>
+                  <p:par>
+                    <p:cTn id="11" fill="hold">
+                      <p:stCondLst>
+                        <p:cond delay="indefinite"/>
+                      </p:stCondLst>
+                      <p:childTnLst>
+                        <p:par>
+                          <p:cTn id="12" fill="hold">
+                            <p:stCondLst>
+                              <p:cond delay="0"/>
+                            </p:stCondLst>
+                            <p:childTnLst>
+                              <p:par>
+                                <p:cTn id="13" presetID="1" presetClass="entr" presetSubtype="0" fill="hold" nodeType="clickEffect">
+                                  <p:stCondLst>
+                                    <p:cond delay="0"/>
+                                  </p:stCondLst>
+                                  <p:childTnLst>
+                                    <p:set>
+                                      <p:cBhvr>
+                                        <p:cTn id="14" dur="1" fill="hold">
+                                          <p:stCondLst>
+                                            <p:cond delay="0"/>
+                                          </p:stCondLst>
+                                        </p:cTn>
+                                        <p:tgtEl>
+                                          <p:spTgt spid="3">
+                                            <p:txEl>
+                                              <p:pRg st="1" end="1"/>
+                                            </p:txEl>
+                                          </p:spTgt>
+                                        </p:tgtEl>
+                                        <p:attrNameLst>
+                                          <p:attrName>style.visibility</p:attrName>
+                                        </p:attrNameLst>
+                                      </p:cBhvr>
+                                      <p:to>
+                                        <p:strVal val="visible"/>
+                                      </p:to>
+                                    </p:set>
+                                  </p:childTnLst>
+                                </p:cTn>
+                              </p:par>
+                              <p:par>
+                                <p:cTn id="15" presetID="1" presetClass="entr" presetSubtype="0" fill="hold" nodeType="withEffect">
+                                  <p:stCondLst>
+                                    <p:cond delay="0"/>
+                                  </p:stCondLst>
+                                  <p:childTnLst>
+                                    <p:set>
+                                      <p:cBhvr>
+                                        <p:cTn id="16" dur="1" fill="hold">
+                                          <p:stCondLst>
+                                            <p:cond delay="0"/>
+                                          </p:stCondLst>
+                                        </p:cTn>
+                                        <p:tgtEl>
+                                          <p:spTgt spid="3">
+                                            <p:txEl>
+                                              <p:pRg st="2" end="2"/>
+                                            </p:txEl>
+                                          </p:spTgt>
+                                        </p:tgtEl>
+                                        <p:attrNameLst>
+                                          <p:attrName>style.visibility</p:attrName>
+                                        </p:attrNameLst>
+                                      </p:cBhvr>
+                                      <p:to>
+                                        <p:strVal val="visible"/>
+                                      </p:to>
+                                    </p:set>
+                                  </p:childTnLst>
+                                </p:cTn>
+                              </p:par>
+                              <p:par>
+                                <p:cTn id="17" presetID="1" presetClass="entr" presetSubtype="0" fill="hold" nodeType="withEffect">
+                                  <p:stCondLst>
+                                    <p:cond delay="0"/>
+                                  </p:stCondLst>
+                                  <p:childTnLst>
+                                    <p:set>
+                                      <p:cBhvr>
+                                        <p:cTn id="18" dur="1" fill="hold">
+                                          <p:stCondLst>
+                                            <p:cond delay="0"/>
+                                          </p:stCondLst>
+                                        </p:cTn>
+                                        <p:tgtEl>
+                                          <p:spTgt spid="3">
+                                            <p:txEl>
+                                              <p:pRg st="3" end="3"/>
+                                            </p:txEl>
+                                          </p:spTgt>
+                                        </p:tgtEl>
+                                        <p:attrNameLst>
+                                          <p:attrName>style.visibility</p:attrName>
+                                        </p:attrNameLst>
+                                      </p:cBhvr>
+                                      <p:to>
+                                        <p:strVal val="visible"/>
+                                      </p:to>
+                                    </p:set>
+                                  </p:childTnLst>
+                                </p:cTn>
+                              </p:par>
+                            </p:childTnLst>
+                          </p:cTn>
+                        </p:par>
+                      </p:childTnLst>
+                    </p:cTn>
+                  </p:par>
+                  <p:par>
+                    <p:cTn id="19" fill="hold">
+                      <p:stCondLst>
+                        <p:cond delay="indefinite"/>
+                      </p:stCondLst>
+                      <p:childTnLst>
+                        <p:par>
+                          <p:cTn id="20" fill="hold">
+                            <p:stCondLst>
+                              <p:cond delay="0"/>
+                            </p:stCondLst>
+                            <p:childTnLst>
+                              <p:par>
+                                <p:cTn id="21" presetID="1" presetClass="entr" presetSubtype="0" fill="hold" nodeType="clickEffect">
+                                  <p:stCondLst>
+                                    <p:cond delay="0"/>
+                                  </p:stCondLst>
+                                  <p:childTnLst>
+                                    <p:set>
+                                      <p:cBhvr>
+                                        <p:cTn id="22" dur="1" fill="hold">
+                                          <p:stCondLst>
+                                            <p:cond delay="0"/>
+                                          </p:stCondLst>
+                                        </p:cTn>
+                                        <p:tgtEl>
+                                          <p:spTgt spid="3">
+                                            <p:txEl>
+                                              <p:pRg st="4" end="4"/>
+                                            </p:txEl>
+                                          </p:spTgt>
+                                        </p:tgtEl>
+                                        <p:attrNameLst>
+                                          <p:attrName>style.visibility</p:attrName>
+                                        </p:attrNameLst>
+                                      </p:cBhvr>
+                                      <p:to>
+                                        <p:strVal val="visible"/>
+                                      </p:to>
+                                    </p:set>
+                                  </p:childTnLst>
+                                </p:cTn>
+                              </p:par>
+                              <p:par>
+                                <p:cTn id="23" presetID="1" presetClass="entr" presetSubtype="0" fill="hold" nodeType="withEffect">
+                                  <p:stCondLst>
+                                    <p:cond delay="0"/>
+                                  </p:stCondLst>
+                                  <p:childTnLst>
+                                    <p:set>
+                                      <p:cBhvr>
+                                        <p:cTn id="24" dur="1" fill="hold">
+                                          <p:stCondLst>
+                                            <p:cond delay="0"/>
+                                          </p:stCondLst>
+                                        </p:cTn>
+                                        <p:tgtEl>
+                                          <p:spTgt spid="3">
+                                            <p:txEl>
+                                              <p:pRg st="5" end="5"/>
+                                            </p:txEl>
+                                          </p:spTgt>
+                                        </p:tgtEl>
+                                        <p:attrNameLst>
+                                          <p:attrName>style.visibility</p:attrName>
+                                        </p:attrNameLst>
+                                      </p:cBhvr>
+                                      <p:to>
+                                        <p:strVal val="visible"/>
+                                      </p:to>
+                                    </p:set>
+                                  </p:childTnLst>
+                                </p:cTn>
+                              </p:par>
+                            </p:childTnLst>
+                          </p:cTn>
+                        </p:par>
+                      </p:childTnLst>
+                    </p:cTn>
+                  </p:par>
+                  <p:par>
+                    <p:cTn id="25" fill="hold">
+                      <p:stCondLst>
+                        <p:cond delay="indefinite"/>
+                      </p:stCondLst>
+                      <p:childTnLst>
+                        <p:par>
+                          <p:cTn id="26" fill="hold">
+                            <p:stCondLst>
+                              <p:cond delay="0"/>
+                            </p:stCondLst>
+                            <p:childTnLst>
+                              <p:par>
+                                <p:cTn id="27" presetID="1" presetClass="entr" presetSubtype="0" fill="hold" nodeType="clickEffect">
+                                  <p:stCondLst>
+                                    <p:cond delay="0"/>
+                                  </p:stCondLst>
+                                  <p:childTnLst>
+                                    <p:set>
+                                      <p:cBhvr>
+                                        <p:cTn id="28" dur="1" fill="hold">
+                                          <p:stCondLst>
+                                            <p:cond delay="0"/>
+                                          </p:stCondLst>
+                                        </p:cTn>
+                                        <p:tgtEl>
+                                          <p:spTgt spid="3">
+                                            <p:txEl>
+                                              <p:pRg st="6" end="6"/>
+                                            </p:txEl>
+                                          </p:spTgt>
+                                        </p:tgtEl>
+                                        <p:attrNameLst>
+                                          <p:attrName>style.visibility</p:attrName>
+                                        </p:attrNameLst>
+                                      </p:cBhvr>
+                                      <p:to>
+                                        <p:strVal val="visible"/>
+                                      </p:to>
+                                    </p:set>
+                                  </p:childTnLst>
+                                </p:cTn>
+                              </p:par>
+                              <p:par>
+                                <p:cTn id="29" presetID="1" presetClass="entr" presetSubtype="0" fill="hold" nodeType="withEffect">
+                                  <p:stCondLst>
+                                    <p:cond delay="0"/>
+                                  </p:stCondLst>
+                                  <p:childTnLst>
+                                    <p:set>
+                                      <p:cBhvr>
+                                        <p:cTn id="30" dur="1" fill="hold">
+                                          <p:stCondLst>
+                                            <p:cond delay="0"/>
+                                          </p:stCondLst>
+                                        </p:cTn>
+                                        <p:tgtEl>
+                                          <p:spTgt spid="3">
+                                            <p:txEl>
+                                              <p:pRg st="7" end="7"/>
+                                            </p:txEl>
+                                          </p:spTgt>
+                                        </p:tgtEl>
+                                        <p:attrNameLst>
+                                          <p:attrName>style.visibility</p:attrName>
+                                        </p:attrNameLst>
+                                      </p:cBhvr>
+                                      <p:to>
+                                        <p:strVal val="visible"/>
+                                      </p:to>
+                                    </p:set>
+                                  </p:childTnLst>
+                                </p:cTn>
+                              </p:par>
+                            </p:childTnLst>
+                          </p:cTn>
+                        </p:par>
+                      </p:childTnLst>
+                    </p:cTn>
+                  </p:par>
+                </p:childTnLst>
+              </p:cTn>
+              <p:prevCondLst>
+                <p:cond evt="onPrev" delay="0">
+                  <p:tgtEl>
+                    <p:sldTgt/>
+                  </p:tgtEl>
+                </p:cond>
+              </p:prevCondLst>
+              <p:nextCondLst>
+                <p:cond evt="onNext" delay="0">
+                  <p:tgtEl>
+                    <p:sldTgt/>
+                  </p:tgtEl>
+                </p:cond>
+              </p:nextCondLst>
+            </p:seq>
+          </p:childTnLst>
+        </p:cTn>
+      </p:par>
+    </p:tnLst>
+  </p:timing>
+</p:sld>
+</file>
+
+<file path=ppt/slides/slide11.xml><?xml version="1.0" encoding="utf-8"?>
 <p:sld xmlns:a="http://schemas.openxmlformats.org/drawingml/2006/main" xmlns:r="http://schemas.openxmlformats.org/officeDocument/2006/relationships" xmlns:p="http://schemas.openxmlformats.org/presentationml/2006/main">
   <p:cSld>
     <p:spTree>
@@ -16768,7 +17397,7 @@
 </p:sld>
 </file>
 
-<file path=ppt/slides/slide11.xml><?xml version="1.0" encoding="utf-8"?>
+<file path=ppt/slides/slide12.xml><?xml version="1.0" encoding="utf-8"?>
 <p:sld xmlns:a="http://schemas.openxmlformats.org/drawingml/2006/main" xmlns:r="http://schemas.openxmlformats.org/officeDocument/2006/relationships" xmlns:p="http://schemas.openxmlformats.org/presentationml/2006/main">
   <p:cSld>
     <p:spTree>
@@ -16913,7 +17542,7 @@
 </p:sld>
 </file>
 
-<file path=ppt/slides/slide12.xml><?xml version="1.0" encoding="utf-8"?>
+<file path=ppt/slides/slide13.xml><?xml version="1.0" encoding="utf-8"?>
 <p:sld xmlns:a="http://schemas.openxmlformats.org/drawingml/2006/main" xmlns:r="http://schemas.openxmlformats.org/officeDocument/2006/relationships" xmlns:p="http://schemas.openxmlformats.org/presentationml/2006/main">
   <p:cSld>
     <p:spTree>
@@ -18207,7 +18836,7 @@
 </p:sld>
 </file>
 
-<file path=ppt/slides/slide13.xml><?xml version="1.0" encoding="utf-8"?>
+<file path=ppt/slides/slide14.xml><?xml version="1.0" encoding="utf-8"?>
 <p:sld xmlns:a="http://schemas.openxmlformats.org/drawingml/2006/main" xmlns:r="http://schemas.openxmlformats.org/officeDocument/2006/relationships" xmlns:p="http://schemas.openxmlformats.org/presentationml/2006/main">
   <p:cSld>
     <p:spTree>
@@ -29757,11 +30386,6 @@
               </a:rPr>
               <a:t>POSIX Client</a:t>
             </a:r>
-            <a:endParaRPr lang="en-US" sz="2800" b="1" dirty="0" smtClean="0">
-              <a:solidFill>
-                <a:schemeClr val="tx1"/>
-              </a:solidFill>
-            </a:endParaRPr>
           </a:p>
           <a:p>
             <a:endParaRPr lang="en-US" sz="2800" dirty="0">
@@ -29824,11 +30448,6 @@
               </a:rPr>
               <a:t>Client, Library</a:t>
             </a:r>
-            <a:endParaRPr lang="en-US" sz="2800" b="1" dirty="0" smtClean="0">
-              <a:solidFill>
-                <a:schemeClr val="tx1"/>
-              </a:solidFill>
-            </a:endParaRPr>
           </a:p>
         </p:txBody>
       </p:sp>
@@ -29840,8 +30459,8 @@
         </p:nvSpPr>
         <p:spPr>
           <a:xfrm>
-            <a:off x="6870700" y="1993900"/>
-            <a:ext cx="3556000" cy="2565400"/>
+            <a:off x="6870700" y="2286000"/>
+            <a:ext cx="3556000" cy="4013200"/>
           </a:xfrm>
           <a:prstGeom prst="rect">
             <a:avLst/>
@@ -29884,11 +30503,6 @@
               </a:rPr>
               <a:t>    Metadata Server</a:t>
             </a:r>
-            <a:endParaRPr lang="en-US" sz="2800" b="1" dirty="0" smtClean="0">
-              <a:solidFill>
-                <a:schemeClr val="tx1"/>
-              </a:solidFill>
-            </a:endParaRPr>
           </a:p>
           <a:p>
             <a:endParaRPr lang="en-US" sz="2800" dirty="0">
@@ -29907,7 +30521,7 @@
         </p:nvSpPr>
         <p:spPr>
           <a:xfrm>
-            <a:off x="6985000" y="2578100"/>
+            <a:off x="6985000" y="2870200"/>
             <a:ext cx="3352800" cy="914400"/>
           </a:xfrm>
           <a:prstGeom prst="rect">
@@ -29967,7 +30581,7 @@
         </p:nvSpPr>
         <p:spPr>
           <a:xfrm>
-            <a:off x="6985000" y="3568700"/>
+            <a:off x="6985000" y="3949700"/>
             <a:ext cx="3352800" cy="914400"/>
           </a:xfrm>
           <a:prstGeom prst="rect">
@@ -30011,11 +30625,6 @@
               </a:rPr>
               <a:t>Metadata Balancer</a:t>
             </a:r>
-            <a:endParaRPr lang="en-US" sz="2800" b="1" dirty="0" smtClean="0">
-              <a:solidFill>
-                <a:schemeClr val="tx1"/>
-              </a:solidFill>
-            </a:endParaRPr>
           </a:p>
         </p:txBody>
       </p:sp>
@@ -30027,7 +30636,7 @@
         </p:nvSpPr>
         <p:spPr>
           <a:xfrm>
-            <a:off x="3162300" y="1981200"/>
+            <a:off x="3162300" y="1828800"/>
             <a:ext cx="3568700" cy="1651000"/>
           </a:xfrm>
           <a:prstGeom prst="rect">
@@ -30069,21 +30678,8 @@
                   <a:schemeClr val="tx1"/>
                 </a:solidFill>
               </a:rPr>
-              <a:t>Monitor </a:t>
-            </a:r>
-            <a:r>
-              <a:rPr lang="en-US" sz="2800" b="1" dirty="0" smtClean="0">
-                <a:solidFill>
-                  <a:schemeClr val="tx1"/>
-                </a:solidFill>
-              </a:rPr>
-              <a:t>Server</a:t>
-            </a:r>
-            <a:endParaRPr lang="en-US" sz="2800" b="1" dirty="0" smtClean="0">
-              <a:solidFill>
-                <a:schemeClr val="tx1"/>
-              </a:solidFill>
-            </a:endParaRPr>
+              <a:t>Monitor Server</a:t>
+            </a:r>
           </a:p>
           <a:p>
             <a:endParaRPr lang="en-US" sz="2800" dirty="0">
@@ -30102,7 +30698,7 @@
         </p:nvSpPr>
         <p:spPr>
           <a:xfrm>
-            <a:off x="3276600" y="2565400"/>
+            <a:off x="3276600" y="2413000"/>
             <a:ext cx="3352800" cy="914400"/>
           </a:xfrm>
           <a:prstGeom prst="rect">
@@ -30201,11 +30797,6 @@
               </a:rPr>
               <a:t>      Object Server</a:t>
             </a:r>
-            <a:endParaRPr lang="en-US" sz="2800" b="1" dirty="0" smtClean="0">
-              <a:solidFill>
-                <a:schemeClr val="tx1"/>
-              </a:solidFill>
-            </a:endParaRPr>
           </a:p>
           <a:p>
             <a:endParaRPr lang="en-US" sz="2800" dirty="0">
@@ -30330,7 +30921,7 @@
         </p:nvGrpSpPr>
         <p:grpSpPr>
           <a:xfrm>
-            <a:off x="6957060" y="2013489"/>
+            <a:off x="6931660" y="2330989"/>
             <a:ext cx="511271" cy="511271"/>
             <a:chOff x="4243616" y="5502638"/>
             <a:chExt cx="417576" cy="417576"/>
@@ -30683,7 +31274,7 @@
         </p:nvSpPr>
         <p:spPr>
           <a:xfrm>
-            <a:off x="3307618" y="2027907"/>
+            <a:off x="3307618" y="1875507"/>
             <a:ext cx="494762" cy="494762"/>
           </a:xfrm>
           <a:prstGeom prst="roundRect">
@@ -30746,7 +31337,7 @@
         </p:nvSpPr>
         <p:spPr>
           <a:xfrm rot="16200000">
-            <a:off x="9867900" y="2641600"/>
+            <a:off x="9867900" y="2908300"/>
             <a:ext cx="1549400" cy="812800"/>
           </a:xfrm>
           <a:prstGeom prst="snip2SameRect">
@@ -30809,8 +31400,8 @@
           <p:nvPr/>
         </p:nvSpPr>
         <p:spPr>
-          <a:xfrm>
-            <a:off x="8001000" y="4330700"/>
+          <a:xfrm rot="5400000">
+            <a:off x="5880100" y="3987800"/>
             <a:ext cx="1549400" cy="812800"/>
           </a:xfrm>
           <a:prstGeom prst="snip2SameRect">
@@ -31002,7 +31593,7 @@
         </p:nvSpPr>
         <p:spPr>
           <a:xfrm rot="5400000">
-            <a:off x="2171701" y="2616200"/>
+            <a:off x="2171701" y="2476500"/>
             <a:ext cx="1549400" cy="812800"/>
           </a:xfrm>
           <a:prstGeom prst="snip2SameRect">
@@ -31124,7 +31715,7 @@
         </p:nvSpPr>
         <p:spPr>
           <a:xfrm rot="16200000">
-            <a:off x="10998200" y="2527300"/>
+            <a:off x="10998200" y="2794000"/>
             <a:ext cx="889000" cy="990600"/>
           </a:xfrm>
           <a:prstGeom prst="upArrowCallout">
@@ -31181,8 +31772,8 @@
           <p:nvPr/>
         </p:nvSpPr>
         <p:spPr>
-          <a:xfrm>
-            <a:off x="8940800" y="4953000"/>
+          <a:xfrm rot="5400000">
+            <a:off x="5346700" y="4394200"/>
             <a:ext cx="889000" cy="990600"/>
           </a:xfrm>
           <a:prstGeom prst="upArrowCallout">
@@ -31240,10 +31831,10 @@
         </p:nvGrpSpPr>
         <p:grpSpPr>
           <a:xfrm>
-            <a:off x="3314700" y="3873500"/>
-            <a:ext cx="3111500" cy="1778000"/>
-            <a:chOff x="8267700" y="4927600"/>
-            <a:chExt cx="3111500" cy="1778000"/>
+            <a:off x="1574800" y="4203700"/>
+            <a:ext cx="3111500" cy="1524000"/>
+            <a:chOff x="6527800" y="5257800"/>
+            <a:chExt cx="3111500" cy="1524000"/>
           </a:xfrm>
         </p:grpSpPr>
         <p:sp>
@@ -31254,8 +31845,8 @@
           </p:nvSpPr>
           <p:spPr>
             <a:xfrm>
-              <a:off x="8267700" y="4927600"/>
-              <a:ext cx="3111500" cy="1778000"/>
+              <a:off x="6527800" y="5257800"/>
+              <a:ext cx="3111500" cy="1524000"/>
             </a:xfrm>
             <a:prstGeom prst="rect">
               <a:avLst/>
@@ -31358,31 +31949,8 @@
                     <a:schemeClr val="tx1"/>
                   </a:solidFill>
                 </a:rPr>
-                <a:t>Communication</a:t>
-              </a:r>
-            </a:p>
-            <a:p>
-              <a:r>
-                <a:rPr lang="en-US" b="1" dirty="0">
-                  <a:solidFill>
-                    <a:schemeClr val="tx1"/>
-                  </a:solidFill>
-                </a:rPr>
-                <a:t>	</a:t>
-              </a:r>
-              <a:r>
-                <a:rPr lang="en-US" dirty="0" smtClean="0">
-                  <a:solidFill>
-                    <a:schemeClr val="tx1"/>
-                  </a:solidFill>
-                </a:rPr>
                 <a:t>Higher-Level Service</a:t>
               </a:r>
-              <a:endParaRPr lang="en-US" dirty="0" smtClean="0">
-                <a:solidFill>
-                  <a:schemeClr val="tx1"/>
-                </a:solidFill>
-              </a:endParaRPr>
             </a:p>
             <a:p>
               <a:endParaRPr lang="en-US" sz="2000" dirty="0">
@@ -31401,10 +31969,10 @@
           </p:nvGrpSpPr>
           <p:grpSpPr>
             <a:xfrm>
-              <a:off x="8565629" y="5403329"/>
-              <a:ext cx="558800" cy="1162572"/>
-              <a:chOff x="8565629" y="5403329"/>
-              <a:chExt cx="558800" cy="1162572"/>
+              <a:off x="6736829" y="5746231"/>
+              <a:ext cx="558800" cy="883173"/>
+              <a:chOff x="6736829" y="5746231"/>
+              <a:chExt cx="558800" cy="883173"/>
             </a:xfrm>
           </p:grpSpPr>
           <p:sp>
@@ -31415,7 +31983,7 @@
             </p:nvSpPr>
             <p:spPr>
               <a:xfrm rot="10800000">
-                <a:off x="8565629" y="5403329"/>
+                <a:off x="6736829" y="5746231"/>
                 <a:ext cx="558800" cy="293141"/>
               </a:xfrm>
               <a:prstGeom prst="snip2SameRect">
@@ -31468,7 +32036,7 @@
             </p:nvSpPr>
             <p:spPr>
               <a:xfrm>
-                <a:off x="8597900" y="5740400"/>
+                <a:off x="6769100" y="6083302"/>
                 <a:ext cx="495300" cy="223371"/>
               </a:xfrm>
               <a:prstGeom prst="rect">
@@ -31514,62 +32082,13 @@
           </p:sp>
           <p:sp>
             <p:nvSpPr>
-              <p:cNvPr id="41" name="Right Arrow 40"/>
-              <p:cNvSpPr/>
-              <p:nvPr/>
-            </p:nvSpPr>
-            <p:spPr>
-              <a:xfrm>
-                <a:off x="8677013" y="6010810"/>
-                <a:ext cx="382213" cy="264650"/>
-              </a:xfrm>
-              <a:prstGeom prst="rightArrow">
-                <a:avLst/>
-              </a:prstGeom>
-              <a:ln>
-                <a:solidFill>
-                  <a:srgbClr val="000000"/>
-                </a:solidFill>
-              </a:ln>
-            </p:spPr>
-            <p:style>
-              <a:lnRef idx="2">
-                <a:schemeClr val="accent2">
-                  <a:shade val="50000"/>
-                </a:schemeClr>
-              </a:lnRef>
-              <a:fillRef idx="1">
-                <a:schemeClr val="accent2"/>
-              </a:fillRef>
-              <a:effectRef idx="0">
-                <a:schemeClr val="accent2"/>
-              </a:effectRef>
-              <a:fontRef idx="minor">
-                <a:schemeClr val="lt1"/>
-              </a:fontRef>
-            </p:style>
-            <p:txBody>
-              <a:bodyPr rtlCol="0" anchor="ctr"/>
-              <a:lstStyle/>
-              <a:p>
-                <a:pPr algn="ctr"/>
-                <a:endParaRPr lang="en-US" b="1" dirty="0">
-                  <a:solidFill>
-                    <a:srgbClr val="000000"/>
-                  </a:solidFill>
-                </a:endParaRPr>
-              </a:p>
-            </p:txBody>
-          </p:sp>
-          <p:sp>
-            <p:nvSpPr>
               <p:cNvPr id="48" name="Up Arrow Callout 47"/>
               <p:cNvSpPr/>
               <p:nvPr/>
             </p:nvSpPr>
             <p:spPr>
               <a:xfrm rot="5400000">
-                <a:off x="8740866" y="6270535"/>
+                <a:off x="6912066" y="6334038"/>
                 <a:ext cx="279400" cy="311331"/>
               </a:xfrm>
               <a:prstGeom prst="upArrowCallout">
@@ -31621,7 +32140,7 @@
         </p:nvSpPr>
         <p:spPr>
           <a:xfrm rot="5400000">
-            <a:off x="1651000" y="2044700"/>
+            <a:off x="1651000" y="1905000"/>
             <a:ext cx="889000" cy="990600"/>
           </a:xfrm>
           <a:prstGeom prst="upArrowCallout">
@@ -31679,7 +32198,7 @@
         </p:nvSpPr>
         <p:spPr>
           <a:xfrm rot="5400000">
-            <a:off x="1651000" y="2984500"/>
+            <a:off x="1651000" y="2844800"/>
             <a:ext cx="889000" cy="990600"/>
           </a:xfrm>
           <a:prstGeom prst="upArrowCallout">
@@ -31736,8 +32255,8 @@
           <p:nvPr/>
         </p:nvSpPr>
         <p:spPr>
-          <a:xfrm>
-            <a:off x="7708900" y="4914900"/>
+          <a:xfrm rot="5400000">
+            <a:off x="5359400" y="3467100"/>
             <a:ext cx="889000" cy="990600"/>
           </a:xfrm>
           <a:prstGeom prst="upArrowCallout">
@@ -31795,7 +32314,7 @@
         </p:nvSpPr>
         <p:spPr>
           <a:xfrm rot="16200000">
-            <a:off x="11049000" y="660400"/>
+            <a:off x="10998200" y="660400"/>
             <a:ext cx="889000" cy="990600"/>
           </a:xfrm>
           <a:prstGeom prst="upArrowCallout">
@@ -31830,12 +32349,197 @@
           <a:p>
             <a:pPr algn="ctr"/>
             <a:r>
+              <a:rPr lang="en-US" b="1" dirty="0" err="1" smtClean="0">
+                <a:solidFill>
+                  <a:srgbClr val="000000"/>
+                </a:solidFill>
+              </a:rPr>
+              <a:t>ZLog</a:t>
+            </a:r>
+            <a:endParaRPr lang="en-US" b="1" dirty="0">
+              <a:solidFill>
+                <a:srgbClr val="000000"/>
+              </a:solidFill>
+            </a:endParaRPr>
+          </a:p>
+        </p:txBody>
+      </p:sp>
+      <p:sp>
+        <p:nvSpPr>
+          <p:cNvPr id="44" name="Rectangle 43"/>
+          <p:cNvSpPr/>
+          <p:nvPr/>
+        </p:nvSpPr>
+        <p:spPr>
+          <a:xfrm>
+            <a:off x="6985000" y="5029200"/>
+            <a:ext cx="3352800" cy="914400"/>
+          </a:xfrm>
+          <a:prstGeom prst="rect">
+            <a:avLst/>
+          </a:prstGeom>
+          <a:solidFill>
+            <a:schemeClr val="bg1">
+              <a:lumMod val="65000"/>
+            </a:schemeClr>
+          </a:solidFill>
+          <a:ln>
+            <a:solidFill>
+              <a:schemeClr val="tx1"/>
+            </a:solidFill>
+          </a:ln>
+        </p:spPr>
+        <p:style>
+          <a:lnRef idx="1">
+            <a:schemeClr val="accent1"/>
+          </a:lnRef>
+          <a:fillRef idx="3">
+            <a:schemeClr val="accent1"/>
+          </a:fillRef>
+          <a:effectRef idx="2">
+            <a:schemeClr val="accent1"/>
+          </a:effectRef>
+          <a:fontRef idx="minor">
+            <a:schemeClr val="lt1"/>
+          </a:fontRef>
+        </p:style>
+        <p:txBody>
+          <a:bodyPr rtlCol="0" anchor="ctr"/>
+          <a:lstStyle/>
+          <a:p>
+            <a:pPr algn="ctr"/>
+            <a:r>
+              <a:rPr lang="en-US" sz="2800" b="1" dirty="0" err="1" smtClean="0">
+                <a:solidFill>
+                  <a:schemeClr val="tx1"/>
+                </a:solidFill>
+              </a:rPr>
+              <a:t>Inode</a:t>
+            </a:r>
+            <a:r>
+              <a:rPr lang="en-US" sz="2800" b="1" dirty="0" smtClean="0">
+                <a:solidFill>
+                  <a:schemeClr val="tx1"/>
+                </a:solidFill>
+              </a:rPr>
+              <a:t> Structures</a:t>
+            </a:r>
+          </a:p>
+        </p:txBody>
+      </p:sp>
+      <p:sp>
+        <p:nvSpPr>
+          <p:cNvPr id="45" name="Snip Same Side Corner Rectangle 44"/>
+          <p:cNvSpPr/>
+          <p:nvPr/>
+        </p:nvSpPr>
+        <p:spPr>
+          <a:xfrm rot="16200000">
+            <a:off x="9880600" y="5080000"/>
+            <a:ext cx="1549400" cy="812800"/>
+          </a:xfrm>
+          <a:prstGeom prst="snip2SameRect">
+            <a:avLst>
+              <a:gd name="adj1" fmla="val 50000"/>
+              <a:gd name="adj2" fmla="val 0"/>
+            </a:avLst>
+          </a:prstGeom>
+          <a:solidFill>
+            <a:schemeClr val="accent1">
+              <a:lumMod val="60000"/>
+              <a:lumOff val="40000"/>
+            </a:schemeClr>
+          </a:solidFill>
+          <a:ln>
+            <a:solidFill>
+              <a:srgbClr val="000000"/>
+            </a:solidFill>
+          </a:ln>
+        </p:spPr>
+        <p:style>
+          <a:lnRef idx="1">
+            <a:schemeClr val="accent1"/>
+          </a:lnRef>
+          <a:fillRef idx="3">
+            <a:schemeClr val="accent1"/>
+          </a:fillRef>
+          <a:effectRef idx="2">
+            <a:schemeClr val="accent1"/>
+          </a:effectRef>
+          <a:fontRef idx="minor">
+            <a:schemeClr val="lt1"/>
+          </a:fontRef>
+        </p:style>
+        <p:txBody>
+          <a:bodyPr rtlCol="0" anchor="ctr"/>
+          <a:lstStyle/>
+          <a:p>
+            <a:pPr algn="ctr"/>
+            <a:r>
               <a:rPr lang="en-US" b="1" dirty="0" smtClean="0">
                 <a:solidFill>
                   <a:srgbClr val="000000"/>
                 </a:solidFill>
               </a:rPr>
-              <a:t>Mantle</a:t>
+              <a:t>File Type</a:t>
+            </a:r>
+            <a:endParaRPr lang="en-US" b="1" dirty="0">
+              <a:solidFill>
+                <a:srgbClr val="000000"/>
+              </a:solidFill>
+            </a:endParaRPr>
+          </a:p>
+        </p:txBody>
+      </p:sp>
+      <p:sp>
+        <p:nvSpPr>
+          <p:cNvPr id="46" name="Up Arrow Callout 45"/>
+          <p:cNvSpPr/>
+          <p:nvPr/>
+        </p:nvSpPr>
+        <p:spPr>
+          <a:xfrm rot="16200000">
+            <a:off x="10998200" y="4940300"/>
+            <a:ext cx="889000" cy="990600"/>
+          </a:xfrm>
+          <a:prstGeom prst="upArrowCallout">
+            <a:avLst/>
+          </a:prstGeom>
+          <a:solidFill>
+            <a:srgbClr val="A5679E"/>
+          </a:solidFill>
+          <a:ln>
+            <a:solidFill>
+              <a:srgbClr val="000000"/>
+            </a:solidFill>
+          </a:ln>
+        </p:spPr>
+        <p:style>
+          <a:lnRef idx="1">
+            <a:schemeClr val="accent1"/>
+          </a:lnRef>
+          <a:fillRef idx="3">
+            <a:schemeClr val="accent1"/>
+          </a:fillRef>
+          <a:effectRef idx="2">
+            <a:schemeClr val="accent1"/>
+          </a:effectRef>
+          <a:fontRef idx="minor">
+            <a:schemeClr val="lt1"/>
+          </a:fontRef>
+        </p:style>
+        <p:txBody>
+          <a:bodyPr rtlCol="0" anchor="ctr"/>
+          <a:lstStyle/>
+          <a:p>
+            <a:pPr algn="ctr"/>
+            <a:r>
+              <a:rPr lang="en-US" b="1" dirty="0" err="1" smtClean="0">
+                <a:solidFill>
+                  <a:srgbClr val="000000"/>
+                </a:solidFill>
+              </a:rPr>
+              <a:t>ZLog</a:t>
             </a:r>
             <a:endParaRPr lang="en-US" b="1" dirty="0">
               <a:solidFill>
@@ -31866,6 +32570,2046 @@
 </file>
 
 <file path=ppt/slides/slide6.xml><?xml version="1.0" encoding="utf-8"?>
+<p:sld xmlns:a="http://schemas.openxmlformats.org/drawingml/2006/main" xmlns:r="http://schemas.openxmlformats.org/officeDocument/2006/relationships" xmlns:p="http://schemas.openxmlformats.org/presentationml/2006/main">
+  <p:cSld>
+    <p:spTree>
+      <p:nvGrpSpPr>
+        <p:cNvPr id="1" name=""/>
+        <p:cNvGrpSpPr/>
+        <p:nvPr/>
+      </p:nvGrpSpPr>
+      <p:grpSpPr>
+        <a:xfrm>
+          <a:off x="0" y="0"/>
+          <a:ext cx="0" cy="0"/>
+          <a:chOff x="0" y="0"/>
+          <a:chExt cx="0" cy="0"/>
+        </a:xfrm>
+      </p:grpSpPr>
+      <p:sp>
+        <p:nvSpPr>
+          <p:cNvPr id="4" name="Rectangle 3"/>
+          <p:cNvSpPr/>
+          <p:nvPr/>
+        </p:nvSpPr>
+        <p:spPr>
+          <a:xfrm rot="16200000">
+            <a:off x="4106805" y="2381016"/>
+            <a:ext cx="1654292" cy="1008474"/>
+          </a:xfrm>
+          <a:prstGeom prst="rect">
+            <a:avLst/>
+          </a:prstGeom>
+          <a:noFill/>
+          <a:ln w="38100" cmpd="sng">
+            <a:solidFill>
+              <a:schemeClr val="tx1"/>
+            </a:solidFill>
+          </a:ln>
+        </p:spPr>
+        <p:style>
+          <a:lnRef idx="1">
+            <a:schemeClr val="accent1"/>
+          </a:lnRef>
+          <a:fillRef idx="3">
+            <a:schemeClr val="accent1"/>
+          </a:fillRef>
+          <a:effectRef idx="2">
+            <a:schemeClr val="accent1"/>
+          </a:effectRef>
+          <a:fontRef idx="minor">
+            <a:schemeClr val="lt1"/>
+          </a:fontRef>
+        </p:style>
+        <p:txBody>
+          <a:bodyPr rtlCol="0" anchor="t"/>
+          <a:lstStyle/>
+          <a:p>
+            <a:pPr algn="ctr"/>
+            <a:r>
+              <a:rPr lang="en-US" sz="2800" b="1" dirty="0" smtClean="0">
+                <a:solidFill>
+                  <a:schemeClr val="tx1"/>
+                </a:solidFill>
+              </a:rPr>
+              <a:t>Shared Resource</a:t>
+            </a:r>
+            <a:endParaRPr lang="en-US" sz="2800" b="1" dirty="0">
+              <a:solidFill>
+                <a:schemeClr val="tx1"/>
+              </a:solidFill>
+            </a:endParaRPr>
+          </a:p>
+        </p:txBody>
+      </p:sp>
+      <p:sp>
+        <p:nvSpPr>
+          <p:cNvPr id="5" name="Rectangle 4"/>
+          <p:cNvSpPr/>
+          <p:nvPr/>
+        </p:nvSpPr>
+        <p:spPr>
+          <a:xfrm rot="16200000">
+            <a:off x="8454910" y="2370196"/>
+            <a:ext cx="1654292" cy="1008474"/>
+          </a:xfrm>
+          <a:prstGeom prst="rect">
+            <a:avLst/>
+          </a:prstGeom>
+          <a:noFill/>
+          <a:ln w="38100" cmpd="sng">
+            <a:solidFill>
+              <a:schemeClr val="tx1"/>
+            </a:solidFill>
+          </a:ln>
+        </p:spPr>
+        <p:style>
+          <a:lnRef idx="1">
+            <a:schemeClr val="accent1"/>
+          </a:lnRef>
+          <a:fillRef idx="3">
+            <a:schemeClr val="accent1"/>
+          </a:fillRef>
+          <a:effectRef idx="2">
+            <a:schemeClr val="accent1"/>
+          </a:effectRef>
+          <a:fontRef idx="minor">
+            <a:schemeClr val="lt1"/>
+          </a:fontRef>
+        </p:style>
+        <p:txBody>
+          <a:bodyPr rtlCol="0" anchor="t"/>
+          <a:lstStyle/>
+          <a:p>
+            <a:pPr algn="ctr"/>
+            <a:r>
+              <a:rPr lang="en-US" sz="2800" b="1" dirty="0" smtClean="0">
+                <a:solidFill>
+                  <a:schemeClr val="tx1"/>
+                </a:solidFill>
+              </a:rPr>
+              <a:t>Load Balancing</a:t>
+            </a:r>
+            <a:endParaRPr lang="en-US" sz="2800" b="1" dirty="0">
+              <a:solidFill>
+                <a:schemeClr val="tx1"/>
+              </a:solidFill>
+            </a:endParaRPr>
+          </a:p>
+        </p:txBody>
+      </p:sp>
+      <p:sp>
+        <p:nvSpPr>
+          <p:cNvPr id="6" name="Rectangle 5"/>
+          <p:cNvSpPr/>
+          <p:nvPr/>
+        </p:nvSpPr>
+        <p:spPr>
+          <a:xfrm rot="16200000">
+            <a:off x="5192419" y="2381487"/>
+            <a:ext cx="1654292" cy="1008474"/>
+          </a:xfrm>
+          <a:prstGeom prst="rect">
+            <a:avLst/>
+          </a:prstGeom>
+          <a:noFill/>
+          <a:ln w="38100" cmpd="sng">
+            <a:solidFill>
+              <a:schemeClr val="tx1"/>
+            </a:solidFill>
+          </a:ln>
+        </p:spPr>
+        <p:style>
+          <a:lnRef idx="1">
+            <a:schemeClr val="accent1"/>
+          </a:lnRef>
+          <a:fillRef idx="3">
+            <a:schemeClr val="accent1"/>
+          </a:fillRef>
+          <a:effectRef idx="2">
+            <a:schemeClr val="accent1"/>
+          </a:effectRef>
+          <a:fontRef idx="minor">
+            <a:schemeClr val="lt1"/>
+          </a:fontRef>
+        </p:style>
+        <p:txBody>
+          <a:bodyPr rtlCol="0" anchor="t"/>
+          <a:lstStyle/>
+          <a:p>
+            <a:pPr algn="ctr"/>
+            <a:r>
+              <a:rPr lang="en-US" sz="2800" b="1" dirty="0" smtClean="0">
+                <a:solidFill>
+                  <a:schemeClr val="tx1"/>
+                </a:solidFill>
+              </a:rPr>
+              <a:t>Data</a:t>
+            </a:r>
+          </a:p>
+          <a:p>
+            <a:pPr algn="ctr"/>
+            <a:r>
+              <a:rPr lang="en-US" sz="2800" b="1" dirty="0" smtClean="0">
+                <a:solidFill>
+                  <a:schemeClr val="tx1"/>
+                </a:solidFill>
+              </a:rPr>
+              <a:t>I/O</a:t>
+            </a:r>
+            <a:endParaRPr lang="en-US" sz="2800" b="1" dirty="0">
+              <a:solidFill>
+                <a:schemeClr val="tx1"/>
+              </a:solidFill>
+            </a:endParaRPr>
+          </a:p>
+        </p:txBody>
+      </p:sp>
+      <p:sp>
+        <p:nvSpPr>
+          <p:cNvPr id="7" name="Rectangle 6"/>
+          <p:cNvSpPr/>
+          <p:nvPr/>
+        </p:nvSpPr>
+        <p:spPr>
+          <a:xfrm rot="16200000">
+            <a:off x="9512299" y="2370669"/>
+            <a:ext cx="1654292" cy="1008474"/>
+          </a:xfrm>
+          <a:prstGeom prst="rect">
+            <a:avLst/>
+          </a:prstGeom>
+          <a:noFill/>
+          <a:ln w="38100" cmpd="sng">
+            <a:solidFill>
+              <a:schemeClr val="tx1"/>
+            </a:solidFill>
+          </a:ln>
+        </p:spPr>
+        <p:style>
+          <a:lnRef idx="1">
+            <a:schemeClr val="accent1"/>
+          </a:lnRef>
+          <a:fillRef idx="3">
+            <a:schemeClr val="accent1"/>
+          </a:fillRef>
+          <a:effectRef idx="2">
+            <a:schemeClr val="accent1"/>
+          </a:effectRef>
+          <a:fontRef idx="minor">
+            <a:schemeClr val="lt1"/>
+          </a:fontRef>
+        </p:style>
+        <p:txBody>
+          <a:bodyPr rtlCol="0" anchor="t"/>
+          <a:lstStyle/>
+          <a:p>
+            <a:pPr algn="ctr"/>
+            <a:r>
+              <a:rPr lang="en-US" sz="2800" b="1" dirty="0" smtClean="0">
+                <a:solidFill>
+                  <a:schemeClr val="tx1"/>
+                </a:solidFill>
+              </a:rPr>
+              <a:t>Dura-</a:t>
+            </a:r>
+          </a:p>
+          <a:p>
+            <a:pPr algn="ctr"/>
+            <a:r>
+              <a:rPr lang="en-US" sz="2800" b="1" dirty="0" err="1" smtClean="0">
+                <a:solidFill>
+                  <a:schemeClr val="tx1"/>
+                </a:solidFill>
+              </a:rPr>
+              <a:t>bility</a:t>
+            </a:r>
+            <a:endParaRPr lang="en-US" sz="2800" b="1" dirty="0">
+              <a:solidFill>
+                <a:schemeClr val="tx1"/>
+              </a:solidFill>
+            </a:endParaRPr>
+          </a:p>
+        </p:txBody>
+      </p:sp>
+      <p:sp>
+        <p:nvSpPr>
+          <p:cNvPr id="8" name="Rectangle 7"/>
+          <p:cNvSpPr/>
+          <p:nvPr/>
+        </p:nvSpPr>
+        <p:spPr>
+          <a:xfrm rot="16200000">
+            <a:off x="7365999" y="2375840"/>
+            <a:ext cx="1654292" cy="1008474"/>
+          </a:xfrm>
+          <a:prstGeom prst="rect">
+            <a:avLst/>
+          </a:prstGeom>
+          <a:noFill/>
+          <a:ln w="38100" cmpd="sng">
+            <a:solidFill>
+              <a:schemeClr val="tx1"/>
+            </a:solidFill>
+          </a:ln>
+        </p:spPr>
+        <p:style>
+          <a:lnRef idx="1">
+            <a:schemeClr val="accent1"/>
+          </a:lnRef>
+          <a:fillRef idx="3">
+            <a:schemeClr val="accent1"/>
+          </a:fillRef>
+          <a:effectRef idx="2">
+            <a:schemeClr val="accent1"/>
+          </a:effectRef>
+          <a:fontRef idx="minor">
+            <a:schemeClr val="lt1"/>
+          </a:fontRef>
+        </p:style>
+        <p:txBody>
+          <a:bodyPr rtlCol="0" anchor="t"/>
+          <a:lstStyle/>
+          <a:p>
+            <a:pPr algn="ctr"/>
+            <a:r>
+              <a:rPr lang="en-US" sz="2800" b="1" dirty="0" smtClean="0">
+                <a:solidFill>
+                  <a:schemeClr val="tx1"/>
+                </a:solidFill>
+              </a:rPr>
+              <a:t>File</a:t>
+            </a:r>
+          </a:p>
+          <a:p>
+            <a:pPr algn="ctr"/>
+            <a:r>
+              <a:rPr lang="en-US" sz="2800" b="1" dirty="0" smtClean="0">
+                <a:solidFill>
+                  <a:schemeClr val="tx1"/>
+                </a:solidFill>
+              </a:rPr>
+              <a:t>Type</a:t>
+            </a:r>
+            <a:endParaRPr lang="en-US" sz="2800" b="1" dirty="0">
+              <a:solidFill>
+                <a:schemeClr val="tx1"/>
+              </a:solidFill>
+            </a:endParaRPr>
+          </a:p>
+        </p:txBody>
+      </p:sp>
+      <p:sp>
+        <p:nvSpPr>
+          <p:cNvPr id="9" name="Rectangle 8"/>
+          <p:cNvSpPr/>
+          <p:nvPr/>
+        </p:nvSpPr>
+        <p:spPr>
+          <a:xfrm rot="16200000">
+            <a:off x="6272391" y="2376315"/>
+            <a:ext cx="1654292" cy="1008474"/>
+          </a:xfrm>
+          <a:prstGeom prst="rect">
+            <a:avLst/>
+          </a:prstGeom>
+          <a:noFill/>
+          <a:ln w="38100" cmpd="sng">
+            <a:solidFill>
+              <a:schemeClr val="tx1"/>
+            </a:solidFill>
+          </a:ln>
+        </p:spPr>
+        <p:style>
+          <a:lnRef idx="1">
+            <a:schemeClr val="accent1"/>
+          </a:lnRef>
+          <a:fillRef idx="3">
+            <a:schemeClr val="accent1"/>
+          </a:fillRef>
+          <a:effectRef idx="2">
+            <a:schemeClr val="accent1"/>
+          </a:effectRef>
+          <a:fontRef idx="minor">
+            <a:schemeClr val="lt1"/>
+          </a:fontRef>
+        </p:style>
+        <p:txBody>
+          <a:bodyPr rtlCol="0" anchor="t"/>
+          <a:lstStyle/>
+          <a:p>
+            <a:pPr algn="ctr"/>
+            <a:r>
+              <a:rPr lang="en-US" sz="2800" b="1" dirty="0" smtClean="0">
+                <a:solidFill>
+                  <a:schemeClr val="tx1"/>
+                </a:solidFill>
+              </a:rPr>
+              <a:t>Service Metadata</a:t>
+            </a:r>
+            <a:endParaRPr lang="en-US" sz="2800" b="1" dirty="0">
+              <a:solidFill>
+                <a:schemeClr val="tx1"/>
+              </a:solidFill>
+            </a:endParaRPr>
+          </a:p>
+        </p:txBody>
+      </p:sp>
+      <p:sp>
+        <p:nvSpPr>
+          <p:cNvPr id="10" name="Rounded Rectangle 9"/>
+          <p:cNvSpPr/>
+          <p:nvPr/>
+        </p:nvSpPr>
+        <p:spPr>
+          <a:xfrm>
+            <a:off x="4397023" y="1205091"/>
+            <a:ext cx="2156178" cy="754472"/>
+          </a:xfrm>
+          <a:prstGeom prst="roundRect">
+            <a:avLst/>
+          </a:prstGeom>
+          <a:noFill/>
+          <a:ln w="76200" cmpd="sng">
+            <a:solidFill>
+              <a:srgbClr val="0000FF"/>
+            </a:solidFill>
+          </a:ln>
+        </p:spPr>
+        <p:style>
+          <a:lnRef idx="1">
+            <a:schemeClr val="accent1"/>
+          </a:lnRef>
+          <a:fillRef idx="3">
+            <a:schemeClr val="accent1"/>
+          </a:fillRef>
+          <a:effectRef idx="2">
+            <a:schemeClr val="accent1"/>
+          </a:effectRef>
+          <a:fontRef idx="minor">
+            <a:schemeClr val="lt1"/>
+          </a:fontRef>
+        </p:style>
+        <p:txBody>
+          <a:bodyPr vert="horz" rtlCol="0" anchor="ctr"/>
+          <a:lstStyle/>
+          <a:p>
+            <a:pPr algn="ctr"/>
+            <a:r>
+              <a:rPr lang="en-US" sz="2000" dirty="0" err="1" smtClean="0">
+                <a:solidFill>
+                  <a:schemeClr val="tx1"/>
+                </a:solidFill>
+              </a:rPr>
+              <a:t>ZLog</a:t>
+            </a:r>
+            <a:r>
+              <a:rPr lang="en-US" sz="2000" dirty="0" smtClean="0">
+                <a:solidFill>
+                  <a:schemeClr val="tx1"/>
+                </a:solidFill>
+              </a:rPr>
+              <a:t> </a:t>
+            </a:r>
+          </a:p>
+        </p:txBody>
+      </p:sp>
+      <p:sp>
+        <p:nvSpPr>
+          <p:cNvPr id="12" name="Rounded Rectangle 11"/>
+          <p:cNvSpPr/>
+          <p:nvPr/>
+        </p:nvSpPr>
+        <p:spPr>
+          <a:xfrm>
+            <a:off x="9791700" y="1206971"/>
+            <a:ext cx="1115248" cy="754472"/>
+          </a:xfrm>
+          <a:prstGeom prst="roundRect">
+            <a:avLst/>
+          </a:prstGeom>
+          <a:noFill/>
+          <a:ln w="76200" cmpd="sng">
+            <a:solidFill>
+              <a:srgbClr val="FF0000"/>
+            </a:solidFill>
+          </a:ln>
+        </p:spPr>
+        <p:style>
+          <a:lnRef idx="1">
+            <a:schemeClr val="accent1"/>
+          </a:lnRef>
+          <a:fillRef idx="3">
+            <a:schemeClr val="accent1"/>
+          </a:fillRef>
+          <a:effectRef idx="2">
+            <a:schemeClr val="accent1"/>
+          </a:effectRef>
+          <a:fontRef idx="minor">
+            <a:schemeClr val="lt1"/>
+          </a:fontRef>
+        </p:style>
+        <p:txBody>
+          <a:bodyPr vert="horz" rtlCol="0" anchor="ctr"/>
+          <a:lstStyle/>
+          <a:p>
+            <a:pPr algn="ctr"/>
+            <a:r>
+              <a:rPr lang="en-US" sz="2000" dirty="0" smtClean="0">
+                <a:solidFill>
+                  <a:schemeClr val="tx1"/>
+                </a:solidFill>
+              </a:rPr>
+              <a:t>Mantle</a:t>
+            </a:r>
+            <a:endParaRPr lang="en-US" sz="2000" dirty="0" smtClean="0">
+              <a:solidFill>
+                <a:schemeClr val="tx1"/>
+              </a:solidFill>
+            </a:endParaRPr>
+          </a:p>
+        </p:txBody>
+      </p:sp>
+      <p:sp>
+        <p:nvSpPr>
+          <p:cNvPr id="13" name="Rounded Rectangle 12"/>
+          <p:cNvSpPr/>
+          <p:nvPr/>
+        </p:nvSpPr>
+        <p:spPr>
+          <a:xfrm>
+            <a:off x="6655740" y="1206973"/>
+            <a:ext cx="3008959" cy="754472"/>
+          </a:xfrm>
+          <a:prstGeom prst="roundRect">
+            <a:avLst/>
+          </a:prstGeom>
+          <a:noFill/>
+          <a:ln w="76200" cmpd="sng">
+            <a:solidFill>
+              <a:srgbClr val="7030A0"/>
+            </a:solidFill>
+            <a:prstDash val="sysDash"/>
+          </a:ln>
+        </p:spPr>
+        <p:style>
+          <a:lnRef idx="1">
+            <a:schemeClr val="accent1"/>
+          </a:lnRef>
+          <a:fillRef idx="3">
+            <a:schemeClr val="accent1"/>
+          </a:fillRef>
+          <a:effectRef idx="2">
+            <a:schemeClr val="accent1"/>
+          </a:effectRef>
+          <a:fontRef idx="minor">
+            <a:schemeClr val="lt1"/>
+          </a:fontRef>
+        </p:style>
+        <p:txBody>
+          <a:bodyPr vert="horz" rtlCol="0" anchor="ctr"/>
+          <a:lstStyle/>
+          <a:p>
+            <a:pPr algn="ctr"/>
+            <a:r>
+              <a:rPr lang="en-US" dirty="0" smtClean="0">
+                <a:solidFill>
+                  <a:schemeClr val="tx1"/>
+                </a:solidFill>
+              </a:rPr>
+              <a:t>Both</a:t>
+            </a:r>
+            <a:endParaRPr lang="en-US" sz="1000" dirty="0">
+              <a:solidFill>
+                <a:schemeClr val="tx1"/>
+              </a:solidFill>
+            </a:endParaRPr>
+          </a:p>
+        </p:txBody>
+      </p:sp>
+      <p:sp>
+        <p:nvSpPr>
+          <p:cNvPr id="15" name="TextBox 14"/>
+          <p:cNvSpPr txBox="1"/>
+          <p:nvPr/>
+        </p:nvSpPr>
+        <p:spPr>
+          <a:xfrm>
+            <a:off x="2540000" y="2289291"/>
+            <a:ext cx="1734727" cy="1200329"/>
+          </a:xfrm>
+          <a:prstGeom prst="rect">
+            <a:avLst/>
+          </a:prstGeom>
+          <a:noFill/>
+        </p:spPr>
+        <p:txBody>
+          <a:bodyPr wrap="square" rtlCol="0">
+            <a:spAutoFit/>
+          </a:bodyPr>
+          <a:lstStyle/>
+          <a:p>
+            <a:pPr algn="r"/>
+            <a:r>
+              <a:rPr lang="en-US" b="1" dirty="0" smtClean="0"/>
+              <a:t>Malacology </a:t>
+            </a:r>
+            <a:r>
+              <a:rPr lang="en-US" b="1" dirty="0" smtClean="0"/>
+              <a:t>Interfaces</a:t>
+            </a:r>
+          </a:p>
+          <a:p>
+            <a:pPr algn="r"/>
+            <a:r>
+              <a:rPr lang="en-US" dirty="0" smtClean="0"/>
+              <a:t>(Section §4</a:t>
+            </a:r>
+          </a:p>
+          <a:p>
+            <a:pPr algn="r"/>
+            <a:r>
+              <a:rPr lang="en-US" dirty="0" smtClean="0"/>
+              <a:t>&amp; Table 2) </a:t>
+            </a:r>
+            <a:endParaRPr lang="en-US" dirty="0"/>
+          </a:p>
+        </p:txBody>
+      </p:sp>
+      <p:sp>
+        <p:nvSpPr>
+          <p:cNvPr id="16" name="TextBox 15"/>
+          <p:cNvSpPr txBox="1"/>
+          <p:nvPr/>
+        </p:nvSpPr>
+        <p:spPr>
+          <a:xfrm>
+            <a:off x="2501900" y="5695715"/>
+            <a:ext cx="1624189" cy="923330"/>
+          </a:xfrm>
+          <a:prstGeom prst="rect">
+            <a:avLst/>
+          </a:prstGeom>
+          <a:noFill/>
+        </p:spPr>
+        <p:txBody>
+          <a:bodyPr wrap="square" rtlCol="0">
+            <a:spAutoFit/>
+          </a:bodyPr>
+          <a:lstStyle/>
+          <a:p>
+            <a:pPr algn="r"/>
+            <a:r>
+              <a:rPr lang="en-US" b="1" dirty="0" smtClean="0"/>
+              <a:t>Existing </a:t>
+            </a:r>
+            <a:r>
+              <a:rPr lang="en-US" b="1" dirty="0" smtClean="0"/>
+              <a:t>Daemons</a:t>
+            </a:r>
+          </a:p>
+          <a:p>
+            <a:pPr algn="r"/>
+            <a:endParaRPr lang="en-US" dirty="0"/>
+          </a:p>
+        </p:txBody>
+      </p:sp>
+      <p:sp>
+        <p:nvSpPr>
+          <p:cNvPr id="17" name="TextBox 16"/>
+          <p:cNvSpPr txBox="1"/>
+          <p:nvPr/>
+        </p:nvSpPr>
+        <p:spPr>
+          <a:xfrm>
+            <a:off x="2489200" y="1087965"/>
+            <a:ext cx="1759187" cy="1200329"/>
+          </a:xfrm>
+          <a:prstGeom prst="rect">
+            <a:avLst/>
+          </a:prstGeom>
+          <a:noFill/>
+        </p:spPr>
+        <p:txBody>
+          <a:bodyPr wrap="square" rtlCol="0">
+            <a:spAutoFit/>
+          </a:bodyPr>
+          <a:lstStyle/>
+          <a:p>
+            <a:pPr algn="r"/>
+            <a:r>
+              <a:rPr lang="en-US" b="1" dirty="0" smtClean="0"/>
+              <a:t>Higher-Level</a:t>
+            </a:r>
+            <a:r>
+              <a:rPr lang="en-US" b="1" dirty="0" smtClean="0"/>
+              <a:t> </a:t>
+            </a:r>
+          </a:p>
+          <a:p>
+            <a:pPr algn="r"/>
+            <a:r>
+              <a:rPr lang="en-US" b="1" dirty="0" smtClean="0"/>
+              <a:t>Services </a:t>
+            </a:r>
+          </a:p>
+          <a:p>
+            <a:pPr algn="r"/>
+            <a:r>
+              <a:rPr lang="en-US" dirty="0" smtClean="0"/>
+              <a:t>(Section §5)</a:t>
+            </a:r>
+            <a:endParaRPr lang="en-US" sz="1000" dirty="0"/>
+          </a:p>
+          <a:p>
+            <a:pPr algn="r"/>
+            <a:r>
+              <a:rPr lang="en-US" dirty="0" smtClean="0"/>
+              <a:t> </a:t>
+            </a:r>
+          </a:p>
+        </p:txBody>
+      </p:sp>
+      <p:sp>
+        <p:nvSpPr>
+          <p:cNvPr id="18" name="Rectangle 17"/>
+          <p:cNvSpPr/>
+          <p:nvPr/>
+        </p:nvSpPr>
+        <p:spPr>
+          <a:xfrm>
+            <a:off x="7125169" y="4032953"/>
+            <a:ext cx="1241777" cy="2111023"/>
+          </a:xfrm>
+          <a:prstGeom prst="rect">
+            <a:avLst/>
+          </a:prstGeom>
+          <a:solidFill>
+            <a:schemeClr val="bg2">
+              <a:lumMod val="75000"/>
+            </a:schemeClr>
+          </a:solidFill>
+          <a:ln>
+            <a:solidFill>
+              <a:schemeClr val="tx1"/>
+            </a:solidFill>
+          </a:ln>
+        </p:spPr>
+        <p:style>
+          <a:lnRef idx="1">
+            <a:schemeClr val="accent1"/>
+          </a:lnRef>
+          <a:fillRef idx="3">
+            <a:schemeClr val="accent1"/>
+          </a:fillRef>
+          <a:effectRef idx="2">
+            <a:schemeClr val="accent1"/>
+          </a:effectRef>
+          <a:fontRef idx="minor">
+            <a:schemeClr val="lt1"/>
+          </a:fontRef>
+        </p:style>
+        <p:txBody>
+          <a:bodyPr rtlCol="0" anchor="b"/>
+          <a:lstStyle/>
+          <a:p>
+            <a:pPr algn="ctr"/>
+            <a:r>
+              <a:rPr lang="en-US" sz="2000" b="1" dirty="0" smtClean="0">
+                <a:solidFill>
+                  <a:schemeClr val="tx1"/>
+                </a:solidFill>
+              </a:rPr>
+              <a:t>Monitor Server</a:t>
+            </a:r>
+          </a:p>
+        </p:txBody>
+      </p:sp>
+      <p:sp>
+        <p:nvSpPr>
+          <p:cNvPr id="19" name="TextBox 18"/>
+          <p:cNvSpPr txBox="1"/>
+          <p:nvPr/>
+        </p:nvSpPr>
+        <p:spPr>
+          <a:xfrm>
+            <a:off x="2527300" y="4286955"/>
+            <a:ext cx="1643945" cy="923330"/>
+          </a:xfrm>
+          <a:prstGeom prst="rect">
+            <a:avLst/>
+          </a:prstGeom>
+          <a:noFill/>
+        </p:spPr>
+        <p:txBody>
+          <a:bodyPr wrap="square" rtlCol="0">
+            <a:spAutoFit/>
+          </a:bodyPr>
+          <a:lstStyle/>
+          <a:p>
+            <a:pPr algn="r"/>
+            <a:r>
+              <a:rPr lang="en-US" b="1" dirty="0" smtClean="0"/>
+              <a:t>Existing Internal Subsystems</a:t>
+            </a:r>
+          </a:p>
+        </p:txBody>
+      </p:sp>
+      <p:sp>
+        <p:nvSpPr>
+          <p:cNvPr id="20" name="Rectangle 19"/>
+          <p:cNvSpPr/>
+          <p:nvPr/>
+        </p:nvSpPr>
+        <p:spPr>
+          <a:xfrm>
+            <a:off x="7233353" y="4146785"/>
+            <a:ext cx="973667" cy="1312334"/>
+          </a:xfrm>
+          <a:prstGeom prst="rect">
+            <a:avLst/>
+          </a:prstGeom>
+          <a:solidFill>
+            <a:schemeClr val="bg1">
+              <a:lumMod val="65000"/>
+            </a:schemeClr>
+          </a:solidFill>
+          <a:ln>
+            <a:solidFill>
+              <a:schemeClr val="tx1"/>
+            </a:solidFill>
+          </a:ln>
+        </p:spPr>
+        <p:style>
+          <a:lnRef idx="1">
+            <a:schemeClr val="accent1"/>
+          </a:lnRef>
+          <a:fillRef idx="3">
+            <a:schemeClr val="accent1"/>
+          </a:fillRef>
+          <a:effectRef idx="2">
+            <a:schemeClr val="accent1"/>
+          </a:effectRef>
+          <a:fontRef idx="minor">
+            <a:schemeClr val="lt1"/>
+          </a:fontRef>
+        </p:style>
+        <p:txBody>
+          <a:bodyPr rtlCol="0" anchor="ctr"/>
+          <a:lstStyle/>
+          <a:p>
+            <a:pPr algn="ctr"/>
+            <a:r>
+              <a:rPr lang="en-US" sz="2000" b="1" dirty="0" smtClean="0">
+                <a:solidFill>
+                  <a:schemeClr val="tx1"/>
+                </a:solidFill>
+              </a:rPr>
+              <a:t>Cluster Maps</a:t>
+            </a:r>
+          </a:p>
+        </p:txBody>
+      </p:sp>
+      <p:cxnSp>
+        <p:nvCxnSpPr>
+          <p:cNvPr id="22" name="Curved Connector 21"/>
+          <p:cNvCxnSpPr>
+            <a:stCxn id="9" idx="1"/>
+            <a:endCxn id="20" idx="0"/>
+          </p:cNvCxnSpPr>
+          <p:nvPr/>
+        </p:nvCxnSpPr>
+        <p:spPr>
+          <a:xfrm rot="16200000" flipH="1">
+            <a:off x="7190319" y="3616916"/>
+            <a:ext cx="439087" cy="620650"/>
+          </a:xfrm>
+          <a:prstGeom prst="curvedConnector3">
+            <a:avLst/>
+          </a:prstGeom>
+          <a:ln w="76200" cmpd="sng">
+            <a:solidFill>
+              <a:schemeClr val="tx1"/>
+            </a:solidFill>
+          </a:ln>
+        </p:spPr>
+        <p:style>
+          <a:lnRef idx="2">
+            <a:schemeClr val="accent1"/>
+          </a:lnRef>
+          <a:fillRef idx="0">
+            <a:schemeClr val="accent1"/>
+          </a:fillRef>
+          <a:effectRef idx="1">
+            <a:schemeClr val="accent1"/>
+          </a:effectRef>
+          <a:fontRef idx="minor">
+            <a:schemeClr val="tx1"/>
+          </a:fontRef>
+        </p:style>
+      </p:cxnSp>
+      <p:sp>
+        <p:nvSpPr>
+          <p:cNvPr id="25" name="Rectangle 24"/>
+          <p:cNvSpPr/>
+          <p:nvPr/>
+        </p:nvSpPr>
+        <p:spPr>
+          <a:xfrm>
+            <a:off x="8426686" y="4034834"/>
+            <a:ext cx="2517891" cy="2111023"/>
+          </a:xfrm>
+          <a:prstGeom prst="rect">
+            <a:avLst/>
+          </a:prstGeom>
+          <a:solidFill>
+            <a:schemeClr val="bg2">
+              <a:lumMod val="75000"/>
+            </a:schemeClr>
+          </a:solidFill>
+          <a:ln>
+            <a:solidFill>
+              <a:schemeClr val="tx1"/>
+            </a:solidFill>
+          </a:ln>
+        </p:spPr>
+        <p:style>
+          <a:lnRef idx="1">
+            <a:schemeClr val="accent1"/>
+          </a:lnRef>
+          <a:fillRef idx="3">
+            <a:schemeClr val="accent1"/>
+          </a:fillRef>
+          <a:effectRef idx="2">
+            <a:schemeClr val="accent1"/>
+          </a:effectRef>
+          <a:fontRef idx="minor">
+            <a:schemeClr val="lt1"/>
+          </a:fontRef>
+        </p:style>
+        <p:txBody>
+          <a:bodyPr rtlCol="0" anchor="b"/>
+          <a:lstStyle/>
+          <a:p>
+            <a:pPr algn="ctr"/>
+            <a:r>
+              <a:rPr lang="en-US" sz="2000" b="1" dirty="0" smtClean="0">
+                <a:solidFill>
+                  <a:schemeClr val="tx1"/>
+                </a:solidFill>
+              </a:rPr>
+              <a:t>Metadata Server</a:t>
+            </a:r>
+          </a:p>
+        </p:txBody>
+      </p:sp>
+      <p:sp>
+        <p:nvSpPr>
+          <p:cNvPr id="26" name="Rectangle 25"/>
+          <p:cNvSpPr/>
+          <p:nvPr/>
+        </p:nvSpPr>
+        <p:spPr>
+          <a:xfrm>
+            <a:off x="8503356" y="4139259"/>
+            <a:ext cx="1093207" cy="764822"/>
+          </a:xfrm>
+          <a:prstGeom prst="rect">
+            <a:avLst/>
+          </a:prstGeom>
+          <a:solidFill>
+            <a:schemeClr val="bg1">
+              <a:lumMod val="65000"/>
+            </a:schemeClr>
+          </a:solidFill>
+          <a:ln>
+            <a:solidFill>
+              <a:schemeClr val="tx1"/>
+            </a:solidFill>
+          </a:ln>
+        </p:spPr>
+        <p:style>
+          <a:lnRef idx="1">
+            <a:schemeClr val="accent1"/>
+          </a:lnRef>
+          <a:fillRef idx="3">
+            <a:schemeClr val="accent1"/>
+          </a:fillRef>
+          <a:effectRef idx="2">
+            <a:schemeClr val="accent1"/>
+          </a:effectRef>
+          <a:fontRef idx="minor">
+            <a:schemeClr val="lt1"/>
+          </a:fontRef>
+        </p:style>
+        <p:txBody>
+          <a:bodyPr rtlCol="0" anchor="ctr"/>
+          <a:lstStyle/>
+          <a:p>
+            <a:pPr algn="ctr"/>
+            <a:r>
+              <a:rPr lang="en-US" sz="2000" b="1" dirty="0" err="1" smtClean="0">
+                <a:solidFill>
+                  <a:schemeClr val="tx1"/>
+                </a:solidFill>
+              </a:rPr>
+              <a:t>Inode</a:t>
+            </a:r>
+            <a:r>
+              <a:rPr lang="en-US" sz="2000" b="1" dirty="0" smtClean="0">
+                <a:solidFill>
+                  <a:schemeClr val="tx1"/>
+                </a:solidFill>
+              </a:rPr>
+              <a:t> </a:t>
+            </a:r>
+            <a:r>
+              <a:rPr lang="en-US" sz="2000" b="1" dirty="0" err="1" smtClean="0">
+                <a:solidFill>
+                  <a:schemeClr val="tx1"/>
+                </a:solidFill>
+              </a:rPr>
+              <a:t>Structs</a:t>
+            </a:r>
+            <a:endParaRPr lang="en-US" sz="2000" b="1" dirty="0" smtClean="0">
+              <a:solidFill>
+                <a:schemeClr val="tx1"/>
+              </a:solidFill>
+            </a:endParaRPr>
+          </a:p>
+        </p:txBody>
+      </p:sp>
+      <p:sp>
+        <p:nvSpPr>
+          <p:cNvPr id="27" name="Rectangle 26"/>
+          <p:cNvSpPr/>
+          <p:nvPr/>
+        </p:nvSpPr>
+        <p:spPr>
+          <a:xfrm>
+            <a:off x="9069683" y="4987805"/>
+            <a:ext cx="1301043" cy="772349"/>
+          </a:xfrm>
+          <a:prstGeom prst="rect">
+            <a:avLst/>
+          </a:prstGeom>
+          <a:solidFill>
+            <a:schemeClr val="bg1">
+              <a:lumMod val="65000"/>
+            </a:schemeClr>
+          </a:solidFill>
+          <a:ln>
+            <a:solidFill>
+              <a:schemeClr val="tx1"/>
+            </a:solidFill>
+          </a:ln>
+        </p:spPr>
+        <p:style>
+          <a:lnRef idx="1">
+            <a:schemeClr val="accent1"/>
+          </a:lnRef>
+          <a:fillRef idx="3">
+            <a:schemeClr val="accent1"/>
+          </a:fillRef>
+          <a:effectRef idx="2">
+            <a:schemeClr val="accent1"/>
+          </a:effectRef>
+          <a:fontRef idx="minor">
+            <a:schemeClr val="lt1"/>
+          </a:fontRef>
+        </p:style>
+        <p:txBody>
+          <a:bodyPr rtlCol="0" anchor="ctr"/>
+          <a:lstStyle/>
+          <a:p>
+            <a:pPr algn="ctr"/>
+            <a:r>
+              <a:rPr lang="en-US" sz="2000" b="1" dirty="0" smtClean="0">
+                <a:solidFill>
+                  <a:schemeClr val="tx1"/>
+                </a:solidFill>
+              </a:rPr>
+              <a:t>Metadata Balancer</a:t>
+            </a:r>
+          </a:p>
+        </p:txBody>
+      </p:sp>
+      <p:sp>
+        <p:nvSpPr>
+          <p:cNvPr id="28" name="Rectangle 27"/>
+          <p:cNvSpPr/>
+          <p:nvPr/>
+        </p:nvSpPr>
+        <p:spPr>
+          <a:xfrm>
+            <a:off x="9748894" y="4133615"/>
+            <a:ext cx="1129831" cy="770467"/>
+          </a:xfrm>
+          <a:prstGeom prst="rect">
+            <a:avLst/>
+          </a:prstGeom>
+          <a:solidFill>
+            <a:schemeClr val="bg1">
+              <a:lumMod val="65000"/>
+            </a:schemeClr>
+          </a:solidFill>
+          <a:ln>
+            <a:solidFill>
+              <a:schemeClr val="tx1"/>
+            </a:solidFill>
+          </a:ln>
+        </p:spPr>
+        <p:style>
+          <a:lnRef idx="1">
+            <a:schemeClr val="accent1"/>
+          </a:lnRef>
+          <a:fillRef idx="3">
+            <a:schemeClr val="accent1"/>
+          </a:fillRef>
+          <a:effectRef idx="2">
+            <a:schemeClr val="accent1"/>
+          </a:effectRef>
+          <a:fontRef idx="minor">
+            <a:schemeClr val="lt1"/>
+          </a:fontRef>
+        </p:style>
+        <p:txBody>
+          <a:bodyPr rtlCol="0" anchor="ctr"/>
+          <a:lstStyle/>
+          <a:p>
+            <a:pPr algn="ctr"/>
+            <a:r>
+              <a:rPr lang="en-US" sz="2000" b="1" dirty="0" smtClean="0">
+                <a:solidFill>
+                  <a:schemeClr val="tx1"/>
+                </a:solidFill>
+              </a:rPr>
+              <a:t>RADOS API</a:t>
+            </a:r>
+            <a:endParaRPr lang="en-US" sz="2000" b="1" dirty="0" smtClean="0">
+              <a:solidFill>
+                <a:schemeClr val="tx1"/>
+              </a:solidFill>
+            </a:endParaRPr>
+          </a:p>
+        </p:txBody>
+      </p:sp>
+      <p:sp>
+        <p:nvSpPr>
+          <p:cNvPr id="30" name="Rectangle 29"/>
+          <p:cNvSpPr/>
+          <p:nvPr/>
+        </p:nvSpPr>
+        <p:spPr>
+          <a:xfrm>
+            <a:off x="5648207" y="4044243"/>
+            <a:ext cx="1420518" cy="2111023"/>
+          </a:xfrm>
+          <a:prstGeom prst="rect">
+            <a:avLst/>
+          </a:prstGeom>
+          <a:solidFill>
+            <a:schemeClr val="bg2">
+              <a:lumMod val="75000"/>
+            </a:schemeClr>
+          </a:solidFill>
+          <a:ln>
+            <a:solidFill>
+              <a:schemeClr val="tx1"/>
+            </a:solidFill>
+          </a:ln>
+        </p:spPr>
+        <p:style>
+          <a:lnRef idx="1">
+            <a:schemeClr val="accent1"/>
+          </a:lnRef>
+          <a:fillRef idx="3">
+            <a:schemeClr val="accent1"/>
+          </a:fillRef>
+          <a:effectRef idx="2">
+            <a:schemeClr val="accent1"/>
+          </a:effectRef>
+          <a:fontRef idx="minor">
+            <a:schemeClr val="lt1"/>
+          </a:fontRef>
+        </p:style>
+        <p:txBody>
+          <a:bodyPr rtlCol="0" anchor="b"/>
+          <a:lstStyle/>
+          <a:p>
+            <a:pPr algn="ctr"/>
+            <a:r>
+              <a:rPr lang="en-US" sz="2000" b="1" dirty="0" smtClean="0">
+                <a:solidFill>
+                  <a:schemeClr val="tx1"/>
+                </a:solidFill>
+              </a:rPr>
+              <a:t>Object Server</a:t>
+            </a:r>
+          </a:p>
+        </p:txBody>
+      </p:sp>
+      <p:sp>
+        <p:nvSpPr>
+          <p:cNvPr id="29" name="Rectangle 28"/>
+          <p:cNvSpPr/>
+          <p:nvPr/>
+        </p:nvSpPr>
+        <p:spPr>
+          <a:xfrm>
+            <a:off x="5742281" y="4120444"/>
+            <a:ext cx="1262318" cy="1312334"/>
+          </a:xfrm>
+          <a:prstGeom prst="rect">
+            <a:avLst/>
+          </a:prstGeom>
+          <a:solidFill>
+            <a:schemeClr val="bg1">
+              <a:lumMod val="65000"/>
+            </a:schemeClr>
+          </a:solidFill>
+          <a:ln>
+            <a:solidFill>
+              <a:schemeClr val="tx1"/>
+            </a:solidFill>
+          </a:ln>
+        </p:spPr>
+        <p:style>
+          <a:lnRef idx="1">
+            <a:schemeClr val="accent1"/>
+          </a:lnRef>
+          <a:fillRef idx="3">
+            <a:schemeClr val="accent1"/>
+          </a:fillRef>
+          <a:effectRef idx="2">
+            <a:schemeClr val="accent1"/>
+          </a:effectRef>
+          <a:fontRef idx="minor">
+            <a:schemeClr val="lt1"/>
+          </a:fontRef>
+        </p:style>
+        <p:txBody>
+          <a:bodyPr rtlCol="0" anchor="ctr"/>
+          <a:lstStyle/>
+          <a:p>
+            <a:pPr algn="ctr"/>
+            <a:r>
+              <a:rPr lang="en-US" sz="2000" b="1" dirty="0" smtClean="0">
+                <a:solidFill>
+                  <a:schemeClr val="tx1"/>
+                </a:solidFill>
+              </a:rPr>
+              <a:t>Object </a:t>
+            </a:r>
+            <a:r>
+              <a:rPr lang="en-US" sz="2000" b="1" dirty="0" smtClean="0">
+                <a:solidFill>
+                  <a:schemeClr val="tx1"/>
+                </a:solidFill>
+              </a:rPr>
+              <a:t>Classes</a:t>
+            </a:r>
+          </a:p>
+        </p:txBody>
+      </p:sp>
+      <p:sp>
+        <p:nvSpPr>
+          <p:cNvPr id="37" name="Rectangle 36"/>
+          <p:cNvSpPr/>
+          <p:nvPr/>
+        </p:nvSpPr>
+        <p:spPr>
+          <a:xfrm>
+            <a:off x="4351866" y="4053649"/>
+            <a:ext cx="1241777" cy="2111023"/>
+          </a:xfrm>
+          <a:prstGeom prst="rect">
+            <a:avLst/>
+          </a:prstGeom>
+          <a:solidFill>
+            <a:schemeClr val="bg2">
+              <a:lumMod val="75000"/>
+            </a:schemeClr>
+          </a:solidFill>
+          <a:ln>
+            <a:solidFill>
+              <a:schemeClr val="tx1"/>
+            </a:solidFill>
+          </a:ln>
+        </p:spPr>
+        <p:style>
+          <a:lnRef idx="1">
+            <a:schemeClr val="accent1"/>
+          </a:lnRef>
+          <a:fillRef idx="3">
+            <a:schemeClr val="accent1"/>
+          </a:fillRef>
+          <a:effectRef idx="2">
+            <a:schemeClr val="accent1"/>
+          </a:effectRef>
+          <a:fontRef idx="minor">
+            <a:schemeClr val="lt1"/>
+          </a:fontRef>
+        </p:style>
+        <p:txBody>
+          <a:bodyPr rtlCol="0" anchor="b"/>
+          <a:lstStyle/>
+          <a:p>
+            <a:pPr algn="ctr"/>
+            <a:r>
+              <a:rPr lang="en-US" sz="2000" b="1" dirty="0" smtClean="0">
+                <a:solidFill>
+                  <a:schemeClr val="tx1"/>
+                </a:solidFill>
+              </a:rPr>
+              <a:t>Client</a:t>
+            </a:r>
+          </a:p>
+        </p:txBody>
+      </p:sp>
+      <p:sp>
+        <p:nvSpPr>
+          <p:cNvPr id="38" name="Rectangle 37"/>
+          <p:cNvSpPr/>
+          <p:nvPr/>
+        </p:nvSpPr>
+        <p:spPr>
+          <a:xfrm>
+            <a:off x="4394200" y="4167481"/>
+            <a:ext cx="1155700" cy="1312334"/>
+          </a:xfrm>
+          <a:prstGeom prst="rect">
+            <a:avLst/>
+          </a:prstGeom>
+          <a:solidFill>
+            <a:schemeClr val="bg1">
+              <a:lumMod val="65000"/>
+            </a:schemeClr>
+          </a:solidFill>
+          <a:ln>
+            <a:solidFill>
+              <a:schemeClr val="tx1"/>
+            </a:solidFill>
+          </a:ln>
+        </p:spPr>
+        <p:style>
+          <a:lnRef idx="1">
+            <a:schemeClr val="accent1"/>
+          </a:lnRef>
+          <a:fillRef idx="3">
+            <a:schemeClr val="accent1"/>
+          </a:fillRef>
+          <a:effectRef idx="2">
+            <a:schemeClr val="accent1"/>
+          </a:effectRef>
+          <a:fontRef idx="minor">
+            <a:schemeClr val="lt1"/>
+          </a:fontRef>
+        </p:style>
+        <p:txBody>
+          <a:bodyPr rtlCol="0" anchor="ctr"/>
+          <a:lstStyle/>
+          <a:p>
+            <a:pPr algn="ctr"/>
+            <a:r>
+              <a:rPr lang="en-US" sz="2000" b="1" dirty="0" err="1" smtClean="0">
+                <a:solidFill>
+                  <a:schemeClr val="tx1"/>
+                </a:solidFill>
+              </a:rPr>
+              <a:t>libcephfs</a:t>
+            </a:r>
+            <a:endParaRPr lang="en-US" sz="2000" b="1" dirty="0" smtClean="0">
+              <a:solidFill>
+                <a:schemeClr val="tx1"/>
+              </a:solidFill>
+            </a:endParaRPr>
+          </a:p>
+        </p:txBody>
+      </p:sp>
+      <p:cxnSp>
+        <p:nvCxnSpPr>
+          <p:cNvPr id="41" name="Curved Connector 40"/>
+          <p:cNvCxnSpPr>
+            <a:stCxn id="6" idx="1"/>
+            <a:endCxn id="29" idx="0"/>
+          </p:cNvCxnSpPr>
+          <p:nvPr/>
+        </p:nvCxnSpPr>
+        <p:spPr>
+          <a:xfrm rot="16200000" flipH="1">
+            <a:off x="5992715" y="3739719"/>
+            <a:ext cx="407574" cy="353875"/>
+          </a:xfrm>
+          <a:prstGeom prst="curvedConnector3">
+            <a:avLst>
+              <a:gd name="adj1" fmla="val 50000"/>
+            </a:avLst>
+          </a:prstGeom>
+          <a:ln w="76200" cmpd="sng">
+            <a:solidFill>
+              <a:schemeClr val="tx1"/>
+            </a:solidFill>
+          </a:ln>
+        </p:spPr>
+        <p:style>
+          <a:lnRef idx="2">
+            <a:schemeClr val="accent1"/>
+          </a:lnRef>
+          <a:fillRef idx="0">
+            <a:schemeClr val="accent1"/>
+          </a:fillRef>
+          <a:effectRef idx="1">
+            <a:schemeClr val="accent1"/>
+          </a:effectRef>
+          <a:fontRef idx="minor">
+            <a:schemeClr val="tx1"/>
+          </a:fontRef>
+        </p:style>
+      </p:cxnSp>
+      <p:cxnSp>
+        <p:nvCxnSpPr>
+          <p:cNvPr id="44" name="Curved Connector 43"/>
+          <p:cNvCxnSpPr>
+            <a:stCxn id="4" idx="1"/>
+            <a:endCxn id="38" idx="0"/>
+          </p:cNvCxnSpPr>
+          <p:nvPr/>
+        </p:nvCxnSpPr>
+        <p:spPr>
+          <a:xfrm rot="16200000" flipH="1">
+            <a:off x="4725459" y="3920890"/>
+            <a:ext cx="455082" cy="38099"/>
+          </a:xfrm>
+          <a:prstGeom prst="curvedConnector3">
+            <a:avLst>
+              <a:gd name="adj1" fmla="val 50000"/>
+            </a:avLst>
+          </a:prstGeom>
+          <a:ln w="76200" cmpd="sng">
+            <a:solidFill>
+              <a:schemeClr val="tx1"/>
+            </a:solidFill>
+          </a:ln>
+        </p:spPr>
+        <p:style>
+          <a:lnRef idx="2">
+            <a:schemeClr val="accent1"/>
+          </a:lnRef>
+          <a:fillRef idx="0">
+            <a:schemeClr val="accent1"/>
+          </a:fillRef>
+          <a:effectRef idx="1">
+            <a:schemeClr val="accent1"/>
+          </a:effectRef>
+          <a:fontRef idx="minor">
+            <a:schemeClr val="tx1"/>
+          </a:fontRef>
+        </p:style>
+      </p:cxnSp>
+      <p:cxnSp>
+        <p:nvCxnSpPr>
+          <p:cNvPr id="47" name="Curved Connector 46"/>
+          <p:cNvCxnSpPr>
+            <a:stCxn id="5" idx="1"/>
+            <a:endCxn id="27" idx="0"/>
+          </p:cNvCxnSpPr>
+          <p:nvPr/>
+        </p:nvCxnSpPr>
+        <p:spPr>
+          <a:xfrm rot="16200000" flipH="1">
+            <a:off x="8858017" y="4125617"/>
+            <a:ext cx="1286226" cy="438149"/>
+          </a:xfrm>
+          <a:prstGeom prst="curvedConnector3">
+            <a:avLst>
+              <a:gd name="adj1" fmla="val 50000"/>
+            </a:avLst>
+          </a:prstGeom>
+          <a:ln w="76200" cmpd="sng">
+            <a:solidFill>
+              <a:schemeClr val="tx1"/>
+            </a:solidFill>
+          </a:ln>
+        </p:spPr>
+        <p:style>
+          <a:lnRef idx="2">
+            <a:schemeClr val="accent1"/>
+          </a:lnRef>
+          <a:fillRef idx="0">
+            <a:schemeClr val="accent1"/>
+          </a:fillRef>
+          <a:effectRef idx="1">
+            <a:schemeClr val="accent1"/>
+          </a:effectRef>
+          <a:fontRef idx="minor">
+            <a:schemeClr val="tx1"/>
+          </a:fontRef>
+        </p:style>
+      </p:cxnSp>
+      <p:cxnSp>
+        <p:nvCxnSpPr>
+          <p:cNvPr id="53" name="Curved Connector 52"/>
+          <p:cNvCxnSpPr>
+            <a:stCxn id="8" idx="1"/>
+            <a:endCxn id="26" idx="0"/>
+          </p:cNvCxnSpPr>
+          <p:nvPr/>
+        </p:nvCxnSpPr>
+        <p:spPr>
+          <a:xfrm rot="16200000" flipH="1">
+            <a:off x="8405534" y="3494833"/>
+            <a:ext cx="432036" cy="856815"/>
+          </a:xfrm>
+          <a:prstGeom prst="curvedConnector3">
+            <a:avLst>
+              <a:gd name="adj1" fmla="val 50000"/>
+            </a:avLst>
+          </a:prstGeom>
+          <a:ln w="76200" cmpd="sng">
+            <a:solidFill>
+              <a:schemeClr val="tx1"/>
+            </a:solidFill>
+          </a:ln>
+        </p:spPr>
+        <p:style>
+          <a:lnRef idx="2">
+            <a:schemeClr val="accent1"/>
+          </a:lnRef>
+          <a:fillRef idx="0">
+            <a:schemeClr val="accent1"/>
+          </a:fillRef>
+          <a:effectRef idx="1">
+            <a:schemeClr val="accent1"/>
+          </a:effectRef>
+          <a:fontRef idx="minor">
+            <a:schemeClr val="tx1"/>
+          </a:fontRef>
+        </p:style>
+      </p:cxnSp>
+      <p:cxnSp>
+        <p:nvCxnSpPr>
+          <p:cNvPr id="56" name="Curved Connector 55"/>
+          <p:cNvCxnSpPr>
+            <a:stCxn id="7" idx="1"/>
+            <a:endCxn id="28" idx="0"/>
+          </p:cNvCxnSpPr>
+          <p:nvPr/>
+        </p:nvCxnSpPr>
+        <p:spPr>
+          <a:xfrm rot="5400000">
+            <a:off x="10110847" y="3905016"/>
+            <a:ext cx="431563" cy="25635"/>
+          </a:xfrm>
+          <a:prstGeom prst="curvedConnector3">
+            <a:avLst>
+              <a:gd name="adj1" fmla="val 50000"/>
+            </a:avLst>
+          </a:prstGeom>
+          <a:ln w="76200" cmpd="sng">
+            <a:solidFill>
+              <a:schemeClr val="tx1"/>
+            </a:solidFill>
+          </a:ln>
+        </p:spPr>
+        <p:style>
+          <a:lnRef idx="2">
+            <a:schemeClr val="accent1"/>
+          </a:lnRef>
+          <a:fillRef idx="0">
+            <a:schemeClr val="accent1"/>
+          </a:fillRef>
+          <a:effectRef idx="1">
+            <a:schemeClr val="accent1"/>
+          </a:effectRef>
+          <a:fontRef idx="minor">
+            <a:schemeClr val="tx1"/>
+          </a:fontRef>
+        </p:style>
+      </p:cxnSp>
+      <p:sp>
+        <p:nvSpPr>
+          <p:cNvPr id="42" name="Smiley Face 41"/>
+          <p:cNvSpPr/>
+          <p:nvPr/>
+        </p:nvSpPr>
+        <p:spPr>
+          <a:xfrm>
+            <a:off x="4719320" y="6205220"/>
+            <a:ext cx="447040" cy="447040"/>
+          </a:xfrm>
+          <a:prstGeom prst="smileyFace">
+            <a:avLst/>
+          </a:prstGeom>
+          <a:solidFill>
+            <a:srgbClr val="FFFF00"/>
+          </a:solidFill>
+          <a:ln>
+            <a:solidFill>
+              <a:srgbClr val="000000"/>
+            </a:solidFill>
+          </a:ln>
+        </p:spPr>
+        <p:style>
+          <a:lnRef idx="1">
+            <a:schemeClr val="accent1"/>
+          </a:lnRef>
+          <a:fillRef idx="3">
+            <a:schemeClr val="accent1"/>
+          </a:fillRef>
+          <a:effectRef idx="2">
+            <a:schemeClr val="accent1"/>
+          </a:effectRef>
+          <a:fontRef idx="minor">
+            <a:schemeClr val="lt1"/>
+          </a:fontRef>
+        </p:style>
+        <p:txBody>
+          <a:bodyPr rtlCol="0" anchor="ctr"/>
+          <a:lstStyle/>
+          <a:p>
+            <a:pPr algn="ctr"/>
+            <a:endParaRPr lang="en-US" sz="2400"/>
+          </a:p>
+        </p:txBody>
+      </p:sp>
+      <p:grpSp>
+        <p:nvGrpSpPr>
+          <p:cNvPr id="43" name="Group 42"/>
+          <p:cNvGrpSpPr/>
+          <p:nvPr/>
+        </p:nvGrpSpPr>
+        <p:grpSpPr>
+          <a:xfrm>
+            <a:off x="6118446" y="6217118"/>
+            <a:ext cx="485554" cy="485554"/>
+            <a:chOff x="5437726" y="4672798"/>
+            <a:chExt cx="452260" cy="452260"/>
+          </a:xfrm>
+        </p:grpSpPr>
+        <p:sp>
+          <p:nvSpPr>
+            <p:cNvPr id="45" name="Rounded Rectangle 44"/>
+            <p:cNvSpPr/>
+            <p:nvPr/>
+          </p:nvSpPr>
+          <p:spPr>
+            <a:xfrm>
+              <a:off x="5437726" y="4672798"/>
+              <a:ext cx="452260" cy="452260"/>
+            </a:xfrm>
+            <a:prstGeom prst="roundRect">
+              <a:avLst/>
+            </a:prstGeom>
+            <a:solidFill>
+              <a:srgbClr val="80D2DD"/>
+            </a:solidFill>
+            <a:ln>
+              <a:solidFill>
+                <a:schemeClr val="tx1"/>
+              </a:solidFill>
+            </a:ln>
+          </p:spPr>
+          <p:style>
+            <a:lnRef idx="2">
+              <a:schemeClr val="accent1">
+                <a:shade val="50000"/>
+              </a:schemeClr>
+            </a:lnRef>
+            <a:fillRef idx="1">
+              <a:schemeClr val="accent1"/>
+            </a:fillRef>
+            <a:effectRef idx="0">
+              <a:schemeClr val="accent1"/>
+            </a:effectRef>
+            <a:fontRef idx="minor">
+              <a:schemeClr val="lt1"/>
+            </a:fontRef>
+          </p:style>
+          <p:txBody>
+            <a:bodyPr rtlCol="0" anchor="ctr"/>
+            <a:lstStyle/>
+            <a:p>
+              <a:pPr algn="ctr"/>
+              <a:endParaRPr lang="en-US" sz="1600" dirty="0">
+                <a:latin typeface="Arial" panose="020B0604020202020204" pitchFamily="34" charset="0"/>
+                <a:cs typeface="Arial" panose="020B0604020202020204" pitchFamily="34" charset="0"/>
+              </a:endParaRPr>
+            </a:p>
+          </p:txBody>
+        </p:sp>
+        <p:sp>
+          <p:nvSpPr>
+            <p:cNvPr id="46" name="Rounded Rectangle 45"/>
+            <p:cNvSpPr/>
+            <p:nvPr/>
+          </p:nvSpPr>
+          <p:spPr>
+            <a:xfrm>
+              <a:off x="5457779" y="4965572"/>
+              <a:ext cx="409481" cy="121328"/>
+            </a:xfrm>
+            <a:prstGeom prst="roundRect">
+              <a:avLst>
+                <a:gd name="adj" fmla="val 35977"/>
+              </a:avLst>
+            </a:prstGeom>
+            <a:solidFill>
+              <a:srgbClr val="F05D55"/>
+            </a:solidFill>
+            <a:ln>
+              <a:solidFill>
+                <a:schemeClr val="tx1"/>
+              </a:solidFill>
+            </a:ln>
+          </p:spPr>
+          <p:style>
+            <a:lnRef idx="2">
+              <a:schemeClr val="accent1">
+                <a:shade val="50000"/>
+              </a:schemeClr>
+            </a:lnRef>
+            <a:fillRef idx="1">
+              <a:schemeClr val="accent1"/>
+            </a:fillRef>
+            <a:effectRef idx="0">
+              <a:schemeClr val="accent1"/>
+            </a:effectRef>
+            <a:fontRef idx="minor">
+              <a:schemeClr val="lt1"/>
+            </a:fontRef>
+          </p:style>
+          <p:txBody>
+            <a:bodyPr rtlCol="0" anchor="ctr"/>
+            <a:lstStyle/>
+            <a:p>
+              <a:pPr algn="ctr"/>
+              <a:endParaRPr lang="en-US" sz="1200" b="1" dirty="0">
+                <a:latin typeface="Arial" panose="020B0604020202020204" pitchFamily="34" charset="0"/>
+                <a:cs typeface="Arial" panose="020B0604020202020204" pitchFamily="34" charset="0"/>
+              </a:endParaRPr>
+            </a:p>
+          </p:txBody>
+        </p:sp>
+      </p:grpSp>
+      <p:grpSp>
+        <p:nvGrpSpPr>
+          <p:cNvPr id="48" name="Group 47"/>
+          <p:cNvGrpSpPr/>
+          <p:nvPr/>
+        </p:nvGrpSpPr>
+        <p:grpSpPr>
+          <a:xfrm>
+            <a:off x="9347200" y="6204489"/>
+            <a:ext cx="511271" cy="511271"/>
+            <a:chOff x="4243616" y="5502638"/>
+            <a:chExt cx="417576" cy="417576"/>
+          </a:xfrm>
+        </p:grpSpPr>
+        <p:sp>
+          <p:nvSpPr>
+            <p:cNvPr id="49" name="Rounded Rectangle 48"/>
+            <p:cNvSpPr/>
+            <p:nvPr/>
+          </p:nvSpPr>
+          <p:spPr>
+            <a:xfrm>
+              <a:off x="4243616" y="5502638"/>
+              <a:ext cx="417576" cy="417576"/>
+            </a:xfrm>
+            <a:prstGeom prst="roundRect">
+              <a:avLst/>
+            </a:prstGeom>
+            <a:solidFill>
+              <a:srgbClr val="D0CECE"/>
+            </a:solidFill>
+            <a:ln>
+              <a:solidFill>
+                <a:schemeClr val="tx1"/>
+              </a:solidFill>
+            </a:ln>
+          </p:spPr>
+          <p:style>
+            <a:lnRef idx="2">
+              <a:schemeClr val="accent1">
+                <a:shade val="50000"/>
+              </a:schemeClr>
+            </a:lnRef>
+            <a:fillRef idx="1">
+              <a:schemeClr val="accent1"/>
+            </a:fillRef>
+            <a:effectRef idx="0">
+              <a:schemeClr val="accent1"/>
+            </a:effectRef>
+            <a:fontRef idx="minor">
+              <a:schemeClr val="lt1"/>
+            </a:fontRef>
+          </p:style>
+          <p:txBody>
+            <a:bodyPr rtlCol="0" anchor="ctr"/>
+            <a:lstStyle/>
+            <a:p>
+              <a:pPr algn="ctr"/>
+              <a:endParaRPr lang="en-US" sz="1600" dirty="0">
+                <a:solidFill>
+                  <a:schemeClr val="bg1"/>
+                </a:solidFill>
+                <a:latin typeface="Arial" panose="020B0604020202020204" pitchFamily="34" charset="0"/>
+                <a:cs typeface="Arial" panose="020B0604020202020204" pitchFamily="34" charset="0"/>
+              </a:endParaRPr>
+            </a:p>
+          </p:txBody>
+        </p:sp>
+        <p:sp>
+          <p:nvSpPr>
+            <p:cNvPr id="50" name="Rounded Rectangle 49"/>
+            <p:cNvSpPr/>
+            <p:nvPr/>
+          </p:nvSpPr>
+          <p:spPr>
+            <a:xfrm>
+              <a:off x="4264024" y="5530850"/>
+              <a:ext cx="371767" cy="363964"/>
+            </a:xfrm>
+            <a:prstGeom prst="roundRect">
+              <a:avLst/>
+            </a:prstGeom>
+            <a:solidFill>
+              <a:srgbClr val="38424C"/>
+            </a:solidFill>
+            <a:ln>
+              <a:solidFill>
+                <a:schemeClr val="tx1"/>
+              </a:solidFill>
+            </a:ln>
+          </p:spPr>
+          <p:style>
+            <a:lnRef idx="2">
+              <a:schemeClr val="accent1">
+                <a:shade val="50000"/>
+              </a:schemeClr>
+            </a:lnRef>
+            <a:fillRef idx="1">
+              <a:schemeClr val="accent1"/>
+            </a:fillRef>
+            <a:effectRef idx="0">
+              <a:schemeClr val="accent1"/>
+            </a:effectRef>
+            <a:fontRef idx="minor">
+              <a:schemeClr val="lt1"/>
+            </a:fontRef>
+          </p:style>
+          <p:txBody>
+            <a:bodyPr rtlCol="0" anchor="ctr"/>
+            <a:lstStyle/>
+            <a:p>
+              <a:pPr algn="ctr"/>
+              <a:endParaRPr lang="en-US" sz="1600" dirty="0">
+                <a:solidFill>
+                  <a:schemeClr val="bg1"/>
+                </a:solidFill>
+                <a:latin typeface="Arial" panose="020B0604020202020204" pitchFamily="34" charset="0"/>
+                <a:cs typeface="Arial" panose="020B0604020202020204" pitchFamily="34" charset="0"/>
+              </a:endParaRPr>
+            </a:p>
+          </p:txBody>
+        </p:sp>
+        <p:cxnSp>
+          <p:nvCxnSpPr>
+            <p:cNvPr id="51" name="Straight Connector 50"/>
+            <p:cNvCxnSpPr/>
+            <p:nvPr/>
+          </p:nvCxnSpPr>
+          <p:spPr>
+            <a:xfrm flipH="1">
+              <a:off x="4332589" y="5598091"/>
+              <a:ext cx="74924" cy="115359"/>
+            </a:xfrm>
+            <a:prstGeom prst="line">
+              <a:avLst/>
+            </a:prstGeom>
+            <a:ln w="19050" cmpd="sng">
+              <a:solidFill>
+                <a:schemeClr val="bg1"/>
+              </a:solidFill>
+              <a:headEnd type="oval" w="sm" len="sm"/>
+              <a:tailEnd type="oval" w="sm" len="sm"/>
+            </a:ln>
+          </p:spPr>
+          <p:style>
+            <a:lnRef idx="1">
+              <a:schemeClr val="accent1"/>
+            </a:lnRef>
+            <a:fillRef idx="0">
+              <a:schemeClr val="accent1"/>
+            </a:fillRef>
+            <a:effectRef idx="0">
+              <a:schemeClr val="accent1"/>
+            </a:effectRef>
+            <a:fontRef idx="minor">
+              <a:schemeClr val="tx1"/>
+            </a:fontRef>
+          </p:style>
+        </p:cxnSp>
+        <p:cxnSp>
+          <p:nvCxnSpPr>
+            <p:cNvPr id="52" name="Straight Connector 51"/>
+            <p:cNvCxnSpPr/>
+            <p:nvPr/>
+          </p:nvCxnSpPr>
+          <p:spPr>
+            <a:xfrm flipH="1">
+              <a:off x="4426306" y="5718605"/>
+              <a:ext cx="74924" cy="115359"/>
+            </a:xfrm>
+            <a:prstGeom prst="line">
+              <a:avLst/>
+            </a:prstGeom>
+            <a:ln w="19050" cmpd="sng">
+              <a:solidFill>
+                <a:schemeClr val="bg1"/>
+              </a:solidFill>
+              <a:headEnd type="oval" w="sm" len="sm"/>
+              <a:tailEnd type="oval" w="sm" len="sm"/>
+            </a:ln>
+          </p:spPr>
+          <p:style>
+            <a:lnRef idx="1">
+              <a:schemeClr val="accent1"/>
+            </a:lnRef>
+            <a:fillRef idx="0">
+              <a:schemeClr val="accent1"/>
+            </a:fillRef>
+            <a:effectRef idx="0">
+              <a:schemeClr val="accent1"/>
+            </a:effectRef>
+            <a:fontRef idx="minor">
+              <a:schemeClr val="tx1"/>
+            </a:fontRef>
+          </p:style>
+        </p:cxnSp>
+        <p:cxnSp>
+          <p:nvCxnSpPr>
+            <p:cNvPr id="54" name="Straight Connector 53"/>
+            <p:cNvCxnSpPr/>
+            <p:nvPr/>
+          </p:nvCxnSpPr>
+          <p:spPr>
+            <a:xfrm>
+              <a:off x="4408718" y="5596067"/>
+              <a:ext cx="176345" cy="237897"/>
+            </a:xfrm>
+            <a:prstGeom prst="line">
+              <a:avLst/>
+            </a:prstGeom>
+            <a:ln w="19050" cmpd="sng">
+              <a:solidFill>
+                <a:schemeClr val="bg1"/>
+              </a:solidFill>
+              <a:headEnd type="oval" w="sm" len="sm"/>
+              <a:tailEnd type="oval" w="sm" len="sm"/>
+            </a:ln>
+          </p:spPr>
+          <p:style>
+            <a:lnRef idx="1">
+              <a:schemeClr val="accent1"/>
+            </a:lnRef>
+            <a:fillRef idx="0">
+              <a:schemeClr val="accent1"/>
+            </a:fillRef>
+            <a:effectRef idx="0">
+              <a:schemeClr val="accent1"/>
+            </a:effectRef>
+            <a:fontRef idx="minor">
+              <a:schemeClr val="tx1"/>
+            </a:fontRef>
+          </p:style>
+        </p:cxnSp>
+      </p:grpSp>
+      <p:sp>
+        <p:nvSpPr>
+          <p:cNvPr id="55" name="Rounded Rectangle 54"/>
+          <p:cNvSpPr/>
+          <p:nvPr/>
+        </p:nvSpPr>
+        <p:spPr>
+          <a:xfrm>
+            <a:off x="7460518" y="6193507"/>
+            <a:ext cx="494762" cy="494762"/>
+          </a:xfrm>
+          <a:prstGeom prst="roundRect">
+            <a:avLst/>
+          </a:prstGeom>
+          <a:solidFill>
+            <a:srgbClr val="38424C"/>
+          </a:solidFill>
+          <a:ln>
+            <a:solidFill>
+              <a:schemeClr val="tx1"/>
+            </a:solidFill>
+          </a:ln>
+        </p:spPr>
+        <p:style>
+          <a:lnRef idx="2">
+            <a:schemeClr val="accent1">
+              <a:shade val="50000"/>
+            </a:schemeClr>
+          </a:lnRef>
+          <a:fillRef idx="1">
+            <a:schemeClr val="accent1"/>
+          </a:fillRef>
+          <a:effectRef idx="0">
+            <a:schemeClr val="accent1"/>
+          </a:effectRef>
+          <a:fontRef idx="minor">
+            <a:schemeClr val="lt1"/>
+          </a:fontRef>
+        </p:style>
+        <p:txBody>
+          <a:bodyPr rtlCol="0" anchor="ctr"/>
+          <a:lstStyle/>
+          <a:p>
+            <a:r>
+              <a:rPr lang="en-US" sz="2800" dirty="0" smtClean="0">
+                <a:solidFill>
+                  <a:schemeClr val="bg1"/>
+                </a:solidFill>
+                <a:latin typeface="Arial" panose="020B0604020202020204" pitchFamily="34" charset="0"/>
+                <a:cs typeface="Arial" panose="020B0604020202020204" pitchFamily="34" charset="0"/>
+              </a:rPr>
+              <a:t>M</a:t>
+            </a:r>
+            <a:endParaRPr lang="en-US" sz="3600" dirty="0">
+              <a:solidFill>
+                <a:schemeClr val="bg1"/>
+              </a:solidFill>
+              <a:latin typeface="Arial" panose="020B0604020202020204" pitchFamily="34" charset="0"/>
+              <a:cs typeface="Arial" panose="020B0604020202020204" pitchFamily="34" charset="0"/>
+            </a:endParaRPr>
+          </a:p>
+        </p:txBody>
+      </p:sp>
+    </p:spTree>
+    <p:extLst>
+      <p:ext uri="{BB962C8B-B14F-4D97-AF65-F5344CB8AC3E}">
+        <p14:creationId xmlns:p14="http://schemas.microsoft.com/office/powerpoint/2010/main" val="1446299560"/>
+      </p:ext>
+    </p:extLst>
+  </p:cSld>
+  <p:clrMapOvr>
+    <a:masterClrMapping/>
+  </p:clrMapOvr>
+  <p:timing>
+    <p:tnLst>
+      <p:par>
+        <p:cTn xmlns:p14="http://schemas.microsoft.com/office/powerpoint/2010/main" id="1" dur="indefinite" restart="never" nodeType="tmRoot"/>
+      </p:par>
+    </p:tnLst>
+  </p:timing>
+</p:sld>
+</file>
+
+<file path=ppt/slides/slide7.xml><?xml version="1.0" encoding="utf-8"?>
 <p:sld xmlns:a="http://schemas.openxmlformats.org/drawingml/2006/main" xmlns:r="http://schemas.openxmlformats.org/officeDocument/2006/relationships" xmlns:p="http://schemas.openxmlformats.org/presentationml/2006/main">
   <p:cSld>
     <p:spTree>
@@ -37138,7 +39882,7 @@
 </p:sld>
 </file>
 
-<file path=ppt/slides/slide7.xml><?xml version="1.0" encoding="utf-8"?>
+<file path=ppt/slides/slide8.xml><?xml version="1.0" encoding="utf-8"?>
 <p:sld xmlns:a="http://schemas.openxmlformats.org/drawingml/2006/main" xmlns:r="http://schemas.openxmlformats.org/officeDocument/2006/relationships" xmlns:p="http://schemas.openxmlformats.org/presentationml/2006/main">
   <p:cSld>
     <p:spTree>
@@ -41915,7 +44659,7 @@
 </p:sld>
 </file>
 
-<file path=ppt/slides/slide8.xml><?xml version="1.0" encoding="utf-8"?>
+<file path=ppt/slides/slide9.xml><?xml version="1.0" encoding="utf-8"?>
 <p:sld xmlns:a="http://schemas.openxmlformats.org/drawingml/2006/main" xmlns:r="http://schemas.openxmlformats.org/officeDocument/2006/relationships" xmlns:p="http://schemas.openxmlformats.org/presentationml/2006/main">
   <p:cSld>
     <p:spTree>
@@ -45613,634 +48357,6 @@
 </p:sld>
 </file>
 
-<file path=ppt/slides/slide9.xml><?xml version="1.0" encoding="utf-8"?>
-<p:sld xmlns:a="http://schemas.openxmlformats.org/drawingml/2006/main" xmlns:r="http://schemas.openxmlformats.org/officeDocument/2006/relationships" xmlns:p="http://schemas.openxmlformats.org/presentationml/2006/main">
-  <p:cSld>
-    <p:spTree>
-      <p:nvGrpSpPr>
-        <p:cNvPr id="1" name=""/>
-        <p:cNvGrpSpPr/>
-        <p:nvPr/>
-      </p:nvGrpSpPr>
-      <p:grpSpPr>
-        <a:xfrm>
-          <a:off x="0" y="0"/>
-          <a:ext cx="0" cy="0"/>
-          <a:chOff x="0" y="0"/>
-          <a:chExt cx="0" cy="0"/>
-        </a:xfrm>
-      </p:grpSpPr>
-      <p:sp>
-        <p:nvSpPr>
-          <p:cNvPr id="2" name="Title 1"/>
-          <p:cNvSpPr>
-            <a:spLocks noGrp="1"/>
-          </p:cNvSpPr>
-          <p:nvPr>
-            <p:ph type="title"/>
-          </p:nvPr>
-        </p:nvSpPr>
-        <p:spPr/>
-        <p:txBody>
-          <a:bodyPr/>
-          <a:lstStyle/>
-          <a:p>
-            <a:r>
-              <a:rPr lang="en-US" dirty="0" smtClean="0"/>
-              <a:t>A Quick Story…</a:t>
-            </a:r>
-            <a:endParaRPr lang="en-US" dirty="0"/>
-          </a:p>
-        </p:txBody>
-      </p:sp>
-      <p:sp>
-        <p:nvSpPr>
-          <p:cNvPr id="3" name="Content Placeholder 2"/>
-          <p:cNvSpPr>
-            <a:spLocks noGrp="1"/>
-          </p:cNvSpPr>
-          <p:nvPr>
-            <p:ph idx="1"/>
-          </p:nvPr>
-        </p:nvSpPr>
-        <p:spPr/>
-        <p:txBody>
-          <a:bodyPr>
-            <a:normAutofit/>
-          </a:bodyPr>
-          <a:lstStyle/>
-          <a:p>
-            <a:pPr marL="0" indent="0">
-              <a:buNone/>
-            </a:pPr>
-            <a:r>
-              <a:rPr lang="en-US" dirty="0" smtClean="0"/>
-              <a:t>Research Code </a:t>
-            </a:r>
-            <a:r>
-              <a:rPr lang="en-US" dirty="0"/>
-              <a:t>≠ Production </a:t>
-            </a:r>
-            <a:r>
-              <a:rPr lang="en-US" dirty="0" smtClean="0"/>
-              <a:t>quality</a:t>
-            </a:r>
-          </a:p>
-          <a:p>
-            <a:pPr marL="514350" indent="-514350">
-              <a:buAutoNum type="arabicPeriod"/>
-            </a:pPr>
-            <a:r>
-              <a:rPr lang="en-US" sz="2800" b="1" dirty="0" smtClean="0">
-                <a:solidFill>
-                  <a:srgbClr val="FF0000"/>
-                </a:solidFill>
-              </a:rPr>
-              <a:t>Distributing work</a:t>
-            </a:r>
-          </a:p>
-          <a:p>
-            <a:pPr lvl="1"/>
-            <a:r>
-              <a:rPr lang="en-US" dirty="0" smtClean="0"/>
-              <a:t>Dynamically </a:t>
-            </a:r>
-            <a:r>
-              <a:rPr lang="en-US" dirty="0"/>
-              <a:t>load </a:t>
-            </a:r>
-            <a:r>
-              <a:rPr lang="en-US" dirty="0" smtClean="0"/>
-              <a:t>balancers?</a:t>
-            </a:r>
-          </a:p>
-          <a:p>
-            <a:pPr lvl="1"/>
-            <a:r>
-              <a:rPr lang="en-US" sz="2400" dirty="0" smtClean="0"/>
-              <a:t>Safety </a:t>
-            </a:r>
-            <a:r>
-              <a:rPr lang="en-US" sz="2400" dirty="0"/>
-              <a:t>and security</a:t>
-            </a:r>
-            <a:r>
-              <a:rPr lang="en-US" sz="2400" dirty="0" smtClean="0"/>
-              <a:t>?</a:t>
-            </a:r>
-          </a:p>
-          <a:p>
-            <a:pPr marL="514350" indent="-514350">
-              <a:buAutoNum type="arabicPeriod"/>
-            </a:pPr>
-            <a:r>
-              <a:rPr lang="en-US" b="1" dirty="0" smtClean="0">
-                <a:solidFill>
-                  <a:srgbClr val="FF0000"/>
-                </a:solidFill>
-              </a:rPr>
-              <a:t>Durability</a:t>
-            </a:r>
-          </a:p>
-          <a:p>
-            <a:pPr lvl="1"/>
-            <a:r>
-              <a:rPr lang="en-US" dirty="0" smtClean="0"/>
-              <a:t>Store balancers?</a:t>
-            </a:r>
-          </a:p>
-          <a:p>
-            <a:pPr marL="514350" indent="-514350">
-              <a:buAutoNum type="arabicPeriod"/>
-            </a:pPr>
-            <a:r>
-              <a:rPr lang="en-US" sz="2800" b="1" dirty="0" smtClean="0">
-                <a:solidFill>
-                  <a:srgbClr val="FF0000"/>
-                </a:solidFill>
-              </a:rPr>
-              <a:t>Versioning</a:t>
-            </a:r>
-          </a:p>
-          <a:p>
-            <a:pPr lvl="1"/>
-            <a:r>
-              <a:rPr lang="en-US" sz="2400" dirty="0" smtClean="0"/>
-              <a:t>Current balancer?</a:t>
-            </a:r>
-          </a:p>
-        </p:txBody>
-      </p:sp>
-      <p:pic>
-        <p:nvPicPr>
-          <p:cNvPr id="9" name="Picture 8"/>
-          <p:cNvPicPr>
-            <a:picLocks noChangeAspect="1"/>
-          </p:cNvPicPr>
-          <p:nvPr/>
-        </p:nvPicPr>
-        <p:blipFill rotWithShape="1">
-          <a:blip r:embed="rId2"/>
-          <a:srcRect l="14492" t="12753" r="33898"/>
-          <a:stretch/>
-        </p:blipFill>
-        <p:spPr>
-          <a:xfrm>
-            <a:off x="8466749" y="651184"/>
-            <a:ext cx="3465914" cy="4504194"/>
-          </a:xfrm>
-          <a:prstGeom prst="rect">
-            <a:avLst/>
-          </a:prstGeom>
-          <a:ln>
-            <a:solidFill>
-              <a:schemeClr val="tx1"/>
-            </a:solidFill>
-          </a:ln>
-        </p:spPr>
-      </p:pic>
-      <p:pic>
-        <p:nvPicPr>
-          <p:cNvPr id="4" name="Picture 3" descr="Screen Shot 2016-01-14 at 9.55.13 AM.png"/>
-          <p:cNvPicPr>
-            <a:picLocks noChangeAspect="1"/>
-          </p:cNvPicPr>
-          <p:nvPr/>
-        </p:nvPicPr>
-        <p:blipFill rotWithShape="1">
-          <a:blip r:embed="rId3" cstate="print">
-            <a:extLst>
-              <a:ext uri="{28A0092B-C50C-407E-A947-70E740481C1C}">
-                <a14:useLocalDpi xmlns:a14="http://schemas.microsoft.com/office/drawing/2010/main" val="0"/>
-              </a:ext>
-            </a:extLst>
-          </a:blip>
-          <a:srcRect r="26247"/>
-          <a:stretch/>
-        </p:blipFill>
-        <p:spPr>
-          <a:xfrm>
-            <a:off x="6067837" y="3091903"/>
-            <a:ext cx="3133486" cy="2349534"/>
-          </a:xfrm>
-          <a:prstGeom prst="rect">
-            <a:avLst/>
-          </a:prstGeom>
-          <a:ln>
-            <a:solidFill>
-              <a:srgbClr val="0D0D0D"/>
-            </a:solidFill>
-          </a:ln>
-        </p:spPr>
-      </p:pic>
-    </p:spTree>
-    <p:extLst>
-      <p:ext uri="{BB962C8B-B14F-4D97-AF65-F5344CB8AC3E}">
-        <p14:creationId xmlns:p14="http://schemas.microsoft.com/office/powerpoint/2010/main" val="3991331871"/>
-      </p:ext>
-    </p:extLst>
-  </p:cSld>
-  <p:clrMapOvr>
-    <a:masterClrMapping/>
-  </p:clrMapOvr>
-  <p:timing>
-    <p:tnLst>
-      <p:par>
-        <p:cTn xmlns:p14="http://schemas.microsoft.com/office/powerpoint/2010/main" id="1" dur="indefinite" restart="never" nodeType="tmRoot">
-          <p:childTnLst>
-            <p:seq concurrent="1" nextAc="seek">
-              <p:cTn id="2" dur="indefinite" nodeType="mainSeq">
-                <p:childTnLst>
-                  <p:par>
-                    <p:cTn id="3" fill="hold">
-                      <p:stCondLst>
-                        <p:cond delay="indefinite"/>
-                      </p:stCondLst>
-                      <p:childTnLst>
-                        <p:par>
-                          <p:cTn id="4" fill="hold">
-                            <p:stCondLst>
-                              <p:cond delay="0"/>
-                            </p:stCondLst>
-                            <p:childTnLst>
-                              <p:par>
-                                <p:cTn id="5" presetID="1" presetClass="entr" presetSubtype="0" fill="hold" nodeType="clickEffect">
-                                  <p:stCondLst>
-                                    <p:cond delay="0"/>
-                                  </p:stCondLst>
-                                  <p:childTnLst>
-                                    <p:set>
-                                      <p:cBhvr>
-                                        <p:cTn id="6" dur="1" fill="hold">
-                                          <p:stCondLst>
-                                            <p:cond delay="0"/>
-                                          </p:stCondLst>
-                                        </p:cTn>
-                                        <p:tgtEl>
-                                          <p:spTgt spid="4"/>
-                                        </p:tgtEl>
-                                        <p:attrNameLst>
-                                          <p:attrName>style.visibility</p:attrName>
-                                        </p:attrNameLst>
-                                      </p:cBhvr>
-                                      <p:to>
-                                        <p:strVal val="visible"/>
-                                      </p:to>
-                                    </p:set>
-                                  </p:childTnLst>
-                                </p:cTn>
-                              </p:par>
-                            </p:childTnLst>
-                          </p:cTn>
-                        </p:par>
-                      </p:childTnLst>
-                    </p:cTn>
-                  </p:par>
-                  <p:par>
-                    <p:cTn id="7" fill="hold">
-                      <p:stCondLst>
-                        <p:cond delay="indefinite"/>
-                      </p:stCondLst>
-                      <p:childTnLst>
-                        <p:par>
-                          <p:cTn id="8" fill="hold">
-                            <p:stCondLst>
-                              <p:cond delay="0"/>
-                            </p:stCondLst>
-                            <p:childTnLst>
-                              <p:par>
-                                <p:cTn id="9" presetID="1" presetClass="entr" presetSubtype="0" fill="hold" nodeType="clickEffect">
-                                  <p:stCondLst>
-                                    <p:cond delay="0"/>
-                                  </p:stCondLst>
-                                  <p:childTnLst>
-                                    <p:set>
-                                      <p:cBhvr>
-                                        <p:cTn id="10" dur="1" fill="hold">
-                                          <p:stCondLst>
-                                            <p:cond delay="0"/>
-                                          </p:stCondLst>
-                                        </p:cTn>
-                                        <p:tgtEl>
-                                          <p:spTgt spid="3">
-                                            <p:txEl>
-                                              <p:pRg st="0" end="0"/>
-                                            </p:txEl>
-                                          </p:spTgt>
-                                        </p:tgtEl>
-                                        <p:attrNameLst>
-                                          <p:attrName>style.visibility</p:attrName>
-                                        </p:attrNameLst>
-                                      </p:cBhvr>
-                                      <p:to>
-                                        <p:strVal val="visible"/>
-                                      </p:to>
-                                    </p:set>
-                                  </p:childTnLst>
-                                </p:cTn>
-                              </p:par>
-                            </p:childTnLst>
-                          </p:cTn>
-                        </p:par>
-                      </p:childTnLst>
-                    </p:cTn>
-                  </p:par>
-                  <p:par>
-                    <p:cTn id="11" fill="hold">
-                      <p:stCondLst>
-                        <p:cond delay="indefinite"/>
-                      </p:stCondLst>
-                      <p:childTnLst>
-                        <p:par>
-                          <p:cTn id="12" fill="hold">
-                            <p:stCondLst>
-                              <p:cond delay="0"/>
-                            </p:stCondLst>
-                            <p:childTnLst>
-                              <p:par>
-                                <p:cTn id="13" presetID="1" presetClass="entr" presetSubtype="0" fill="hold" nodeType="clickEffect">
-                                  <p:stCondLst>
-                                    <p:cond delay="0"/>
-                                  </p:stCondLst>
-                                  <p:childTnLst>
-                                    <p:set>
-                                      <p:cBhvr>
-                                        <p:cTn id="14" dur="1" fill="hold">
-                                          <p:stCondLst>
-                                            <p:cond delay="0"/>
-                                          </p:stCondLst>
-                                        </p:cTn>
-                                        <p:tgtEl>
-                                          <p:spTgt spid="3">
-                                            <p:txEl>
-                                              <p:pRg st="1" end="1"/>
-                                            </p:txEl>
-                                          </p:spTgt>
-                                        </p:tgtEl>
-                                        <p:attrNameLst>
-                                          <p:attrName>style.visibility</p:attrName>
-                                        </p:attrNameLst>
-                                      </p:cBhvr>
-                                      <p:to>
-                                        <p:strVal val="visible"/>
-                                      </p:to>
-                                    </p:set>
-                                  </p:childTnLst>
-                                </p:cTn>
-                              </p:par>
-                              <p:par>
-                                <p:cTn id="15" presetID="1" presetClass="entr" presetSubtype="0" fill="hold" nodeType="withEffect">
-                                  <p:stCondLst>
-                                    <p:cond delay="0"/>
-                                  </p:stCondLst>
-                                  <p:childTnLst>
-                                    <p:set>
-                                      <p:cBhvr>
-                                        <p:cTn id="16" dur="1" fill="hold">
-                                          <p:stCondLst>
-                                            <p:cond delay="0"/>
-                                          </p:stCondLst>
-                                        </p:cTn>
-                                        <p:tgtEl>
-                                          <p:spTgt spid="3">
-                                            <p:txEl>
-                                              <p:pRg st="2" end="2"/>
-                                            </p:txEl>
-                                          </p:spTgt>
-                                        </p:tgtEl>
-                                        <p:attrNameLst>
-                                          <p:attrName>style.visibility</p:attrName>
-                                        </p:attrNameLst>
-                                      </p:cBhvr>
-                                      <p:to>
-                                        <p:strVal val="visible"/>
-                                      </p:to>
-                                    </p:set>
-                                  </p:childTnLst>
-                                </p:cTn>
-                              </p:par>
-                              <p:par>
-                                <p:cTn id="17" presetID="1" presetClass="entr" presetSubtype="0" fill="hold" nodeType="withEffect">
-                                  <p:stCondLst>
-                                    <p:cond delay="0"/>
-                                  </p:stCondLst>
-                                  <p:childTnLst>
-                                    <p:set>
-                                      <p:cBhvr>
-                                        <p:cTn id="18" dur="1" fill="hold">
-                                          <p:stCondLst>
-                                            <p:cond delay="0"/>
-                                          </p:stCondLst>
-                                        </p:cTn>
-                                        <p:tgtEl>
-                                          <p:spTgt spid="3">
-                                            <p:txEl>
-                                              <p:pRg st="3" end="3"/>
-                                            </p:txEl>
-                                          </p:spTgt>
-                                        </p:tgtEl>
-                                        <p:attrNameLst>
-                                          <p:attrName>style.visibility</p:attrName>
-                                        </p:attrNameLst>
-                                      </p:cBhvr>
-                                      <p:to>
-                                        <p:strVal val="visible"/>
-                                      </p:to>
-                                    </p:set>
-                                  </p:childTnLst>
-                                </p:cTn>
-                              </p:par>
-                            </p:childTnLst>
-                          </p:cTn>
-                        </p:par>
-                      </p:childTnLst>
-                    </p:cTn>
-                  </p:par>
-                  <p:par>
-                    <p:cTn id="19" fill="hold">
-                      <p:stCondLst>
-                        <p:cond delay="indefinite"/>
-                      </p:stCondLst>
-                      <p:childTnLst>
-                        <p:par>
-                          <p:cTn id="20" fill="hold">
-                            <p:stCondLst>
-                              <p:cond delay="0"/>
-                            </p:stCondLst>
-                            <p:childTnLst>
-                              <p:par>
-                                <p:cTn id="21" presetID="1" presetClass="entr" presetSubtype="0" fill="hold" nodeType="clickEffect">
-                                  <p:stCondLst>
-                                    <p:cond delay="0"/>
-                                  </p:stCondLst>
-                                  <p:childTnLst>
-                                    <p:set>
-                                      <p:cBhvr>
-                                        <p:cTn id="22" dur="1" fill="hold">
-                                          <p:stCondLst>
-                                            <p:cond delay="0"/>
-                                          </p:stCondLst>
-                                        </p:cTn>
-                                        <p:tgtEl>
-                                          <p:spTgt spid="3">
-                                            <p:txEl>
-                                              <p:pRg st="4" end="4"/>
-                                            </p:txEl>
-                                          </p:spTgt>
-                                        </p:tgtEl>
-                                        <p:attrNameLst>
-                                          <p:attrName>style.visibility</p:attrName>
-                                        </p:attrNameLst>
-                                      </p:cBhvr>
-                                      <p:to>
-                                        <p:strVal val="visible"/>
-                                      </p:to>
-                                    </p:set>
-                                  </p:childTnLst>
-                                </p:cTn>
-                              </p:par>
-                              <p:par>
-                                <p:cTn id="23" presetID="1" presetClass="entr" presetSubtype="0" fill="hold" nodeType="withEffect">
-                                  <p:stCondLst>
-                                    <p:cond delay="0"/>
-                                  </p:stCondLst>
-                                  <p:childTnLst>
-                                    <p:set>
-                                      <p:cBhvr>
-                                        <p:cTn id="24" dur="1" fill="hold">
-                                          <p:stCondLst>
-                                            <p:cond delay="0"/>
-                                          </p:stCondLst>
-                                        </p:cTn>
-                                        <p:tgtEl>
-                                          <p:spTgt spid="3">
-                                            <p:txEl>
-                                              <p:pRg st="5" end="5"/>
-                                            </p:txEl>
-                                          </p:spTgt>
-                                        </p:tgtEl>
-                                        <p:attrNameLst>
-                                          <p:attrName>style.visibility</p:attrName>
-                                        </p:attrNameLst>
-                                      </p:cBhvr>
-                                      <p:to>
-                                        <p:strVal val="visible"/>
-                                      </p:to>
-                                    </p:set>
-                                  </p:childTnLst>
-                                </p:cTn>
-                              </p:par>
-                            </p:childTnLst>
-                          </p:cTn>
-                        </p:par>
-                      </p:childTnLst>
-                    </p:cTn>
-                  </p:par>
-                  <p:par>
-                    <p:cTn id="25" fill="hold">
-                      <p:stCondLst>
-                        <p:cond delay="indefinite"/>
-                      </p:stCondLst>
-                      <p:childTnLst>
-                        <p:par>
-                          <p:cTn id="26" fill="hold">
-                            <p:stCondLst>
-                              <p:cond delay="0"/>
-                            </p:stCondLst>
-                            <p:childTnLst>
-                              <p:par>
-                                <p:cTn id="27" presetID="1" presetClass="entr" presetSubtype="0" fill="hold" nodeType="clickEffect">
-                                  <p:stCondLst>
-                                    <p:cond delay="0"/>
-                                  </p:stCondLst>
-                                  <p:childTnLst>
-                                    <p:set>
-                                      <p:cBhvr>
-                                        <p:cTn id="28" dur="1" fill="hold">
-                                          <p:stCondLst>
-                                            <p:cond delay="0"/>
-                                          </p:stCondLst>
-                                        </p:cTn>
-                                        <p:tgtEl>
-                                          <p:spTgt spid="3">
-                                            <p:txEl>
-                                              <p:pRg st="6" end="6"/>
-                                            </p:txEl>
-                                          </p:spTgt>
-                                        </p:tgtEl>
-                                        <p:attrNameLst>
-                                          <p:attrName>style.visibility</p:attrName>
-                                        </p:attrNameLst>
-                                      </p:cBhvr>
-                                      <p:to>
-                                        <p:strVal val="visible"/>
-                                      </p:to>
-                                    </p:set>
-                                  </p:childTnLst>
-                                </p:cTn>
-                              </p:par>
-                              <p:par>
-                                <p:cTn id="29" presetID="1" presetClass="entr" presetSubtype="0" fill="hold" nodeType="withEffect">
-                                  <p:stCondLst>
-                                    <p:cond delay="0"/>
-                                  </p:stCondLst>
-                                  <p:childTnLst>
-                                    <p:set>
-                                      <p:cBhvr>
-                                        <p:cTn id="30" dur="1" fill="hold">
-                                          <p:stCondLst>
-                                            <p:cond delay="0"/>
-                                          </p:stCondLst>
-                                        </p:cTn>
-                                        <p:tgtEl>
-                                          <p:spTgt spid="3">
-                                            <p:txEl>
-                                              <p:pRg st="7" end="7"/>
-                                            </p:txEl>
-                                          </p:spTgt>
-                                        </p:tgtEl>
-                                        <p:attrNameLst>
-                                          <p:attrName>style.visibility</p:attrName>
-                                        </p:attrNameLst>
-                                      </p:cBhvr>
-                                      <p:to>
-                                        <p:strVal val="visible"/>
-                                      </p:to>
-                                    </p:set>
-                                  </p:childTnLst>
-                                </p:cTn>
-                              </p:par>
-                            </p:childTnLst>
-                          </p:cTn>
-                        </p:par>
-                      </p:childTnLst>
-                    </p:cTn>
-                  </p:par>
-                </p:childTnLst>
-              </p:cTn>
-              <p:prevCondLst>
-                <p:cond evt="onPrev" delay="0">
-                  <p:tgtEl>
-                    <p:sldTgt/>
-                  </p:tgtEl>
-                </p:cond>
-              </p:prevCondLst>
-              <p:nextCondLst>
-                <p:cond evt="onNext" delay="0">
-                  <p:tgtEl>
-                    <p:sldTgt/>
-                  </p:tgtEl>
-                </p:cond>
-              </p:nextCondLst>
-            </p:seq>
-          </p:childTnLst>
-        </p:cTn>
-      </p:par>
-    </p:tnLst>
-  </p:timing>
-</p:sld>
-</file>
-
 <file path=ppt/theme/theme1.xml><?xml version="1.0" encoding="utf-8"?>
 <a:theme xmlns:a="http://schemas.openxmlformats.org/drawingml/2006/main" name="Office Theme">
   <a:themeElements>
@@ -46496,7 +48612,7 @@
   <a:extraClrSchemeLst/>
   <a:extLst>
     <a:ext uri="{05A4C25C-085E-4340-85A3-A5531E510DB2}">
-      <thm15:themeFamily xmlns="" xmlns:thm15="http://schemas.microsoft.com/office/thememl/2012/main" name="Office Theme" id="{62F939B6-93AF-4DB8-9C6B-D6C7DFDC589F}" vid="{4A3C46E8-61CC-4603-A589-7422A47A8E4A}"/>
+      <thm15:themeFamily xmlns:thm15="http://schemas.microsoft.com/office/thememl/2012/main" xmlns="" name="Office Theme" id="{62F939B6-93AF-4DB8-9C6B-D6C7DFDC589F}" vid="{4A3C46E8-61CC-4603-A589-7422A47A8E4A}"/>
     </a:ext>
   </a:extLst>
 </a:theme>
@@ -46757,7 +48873,7 @@
   <a:extraClrSchemeLst/>
   <a:extLst>
     <a:ext uri="{05A4C25C-085E-4340-85A3-A5531E510DB2}">
-      <thm15:themeFamily xmlns="" xmlns:thm15="http://schemas.microsoft.com/office/thememl/2012/main" name="Office Theme" id="{62F939B6-93AF-4DB8-9C6B-D6C7DFDC589F}" vid="{4A3C46E8-61CC-4603-A589-7422A47A8E4A}"/>
+      <thm15:themeFamily xmlns:thm15="http://schemas.microsoft.com/office/thememl/2012/main" xmlns="" name="Office Theme" id="{62F939B6-93AF-4DB8-9C6B-D6C7DFDC589F}" vid="{4A3C46E8-61CC-4603-A589-7422A47A8E4A}"/>
     </a:ext>
   </a:extLst>
 </a:theme>
@@ -47018,7 +49134,7 @@
   <a:extraClrSchemeLst/>
   <a:extLst>
     <a:ext uri="{05A4C25C-085E-4340-85A3-A5531E510DB2}">
-      <thm15:themeFamily xmlns="" xmlns:thm15="http://schemas.microsoft.com/office/thememl/2012/main" name="Office Theme" id="{62F939B6-93AF-4DB8-9C6B-D6C7DFDC589F}" vid="{4A3C46E8-61CC-4603-A589-7422A47A8E4A}"/>
+      <thm15:themeFamily xmlns:thm15="http://schemas.microsoft.com/office/thememl/2012/main" xmlns="" name="Office Theme" id="{62F939B6-93AF-4DB8-9C6B-D6C7DFDC589F}" vid="{4A3C46E8-61CC-4603-A589-7422A47A8E4A}"/>
     </a:ext>
   </a:extLst>
 </a:theme>
@@ -47279,7 +49395,7 @@
   <a:extraClrSchemeLst/>
   <a:extLst>
     <a:ext uri="{05A4C25C-085E-4340-85A3-A5531E510DB2}">
-      <thm15:themeFamily xmlns="" xmlns:thm15="http://schemas.microsoft.com/office/thememl/2012/main" name="Office Theme" id="{62F939B6-93AF-4DB8-9C6B-D6C7DFDC589F}" vid="{4A3C46E8-61CC-4603-A589-7422A47A8E4A}"/>
+      <thm15:themeFamily xmlns:thm15="http://schemas.microsoft.com/office/thememl/2012/main" xmlns="" name="Office Theme" id="{62F939B6-93AF-4DB8-9C6B-D6C7DFDC589F}" vid="{4A3C46E8-61CC-4603-A589-7422A47A8E4A}"/>
     </a:ext>
   </a:extLst>
 </a:theme>
@@ -47540,7 +49656,7 @@
   <a:extraClrSchemeLst/>
   <a:extLst>
     <a:ext uri="{05A4C25C-085E-4340-85A3-A5531E510DB2}">
-      <thm15:themeFamily xmlns="" xmlns:thm15="http://schemas.microsoft.com/office/thememl/2012/main" name="Office Theme" id="{62F939B6-93AF-4DB8-9C6B-D6C7DFDC589F}" vid="{4A3C46E8-61CC-4603-A589-7422A47A8E4A}"/>
+      <thm15:themeFamily xmlns:thm15="http://schemas.microsoft.com/office/thememl/2012/main" xmlns="" name="Office Theme" id="{62F939B6-93AF-4DB8-9C6B-D6C7DFDC589F}" vid="{4A3C46E8-61CC-4603-A589-7422A47A8E4A}"/>
     </a:ext>
   </a:extLst>
 </a:theme>

</xml_diff>

<commit_message>
paper: integrate Jeff's comments
Signed-off-by: Michael Sevilla <mikesevilla3@gmail.com>
</commit_message>
<xml_diff>
--- a/paper/figures/figures.pptx
+++ b/paper/figures/figures.pptx
@@ -125,7 +125,7 @@
   </p:defaultTextStyle>
   <p:extLst>
     <p:ext uri="{EFAFB233-063F-42B5-8137-9DF3F51BA10A}">
-      <p15:sldGuideLst xmlns:p15="http://schemas.microsoft.com/office/powerpoint/2012/main" xmlns=""/>
+      <p15:sldGuideLst xmlns="" xmlns:p15="http://schemas.microsoft.com/office/powerpoint/2012/main"/>
     </p:ext>
   </p:extLst>
 </p:presentation>
@@ -213,7 +213,7 @@
           <a:p>
             <a:fld id="{8B6AC9F1-AAD0-495C-933B-F901D4FCD036}" type="datetimeFigureOut">
               <a:rPr lang="en-US" smtClean="0"/>
-              <a:t>2/8/17</a:t>
+              <a:t>2/23/17</a:t>
             </a:fld>
             <a:endParaRPr lang="en-US"/>
           </a:p>
@@ -1049,7 +1049,7 @@
           <a:p>
             <a:fld id="{7ACA203A-1341-45AE-8AE5-9E342A2C38C9}" type="datetimeFigureOut">
               <a:rPr lang="en-US" smtClean="0"/>
-              <a:t>2/8/17</a:t>
+              <a:t>2/23/17</a:t>
             </a:fld>
             <a:endParaRPr lang="en-US"/>
           </a:p>
@@ -1226,7 +1226,7 @@
           <a:p>
             <a:fld id="{7ACA203A-1341-45AE-8AE5-9E342A2C38C9}" type="datetimeFigureOut">
               <a:rPr lang="en-US" smtClean="0"/>
-              <a:t>2/8/17</a:t>
+              <a:t>2/23/17</a:t>
             </a:fld>
             <a:endParaRPr lang="en-US"/>
           </a:p>
@@ -1413,7 +1413,7 @@
           <a:p>
             <a:fld id="{7ACA203A-1341-45AE-8AE5-9E342A2C38C9}" type="datetimeFigureOut">
               <a:rPr lang="en-US" smtClean="0"/>
-              <a:t>2/8/17</a:t>
+              <a:t>2/23/17</a:t>
             </a:fld>
             <a:endParaRPr lang="en-US"/>
           </a:p>
@@ -2221,7 +2221,7 @@
           <a:p>
             <a:fld id="{BA5C85E4-B586-4D50-9BA0-0F3A58A49C8B}" type="datetimeFigureOut">
               <a:rPr lang="en-US" smtClean="0"/>
-              <a:t>2/8/17</a:t>
+              <a:t>2/23/17</a:t>
             </a:fld>
             <a:endParaRPr lang="en-US"/>
           </a:p>
@@ -2527,7 +2527,7 @@
           <a:p>
             <a:fld id="{BA5C85E4-B586-4D50-9BA0-0F3A58A49C8B}" type="datetimeFigureOut">
               <a:rPr lang="en-US" smtClean="0"/>
-              <a:t>2/8/17</a:t>
+              <a:t>2/23/17</a:t>
             </a:fld>
             <a:endParaRPr lang="en-US"/>
           </a:p>
@@ -2780,7 +2780,7 @@
           <a:p>
             <a:fld id="{BA5C85E4-B586-4D50-9BA0-0F3A58A49C8B}" type="datetimeFigureOut">
               <a:rPr lang="en-US" smtClean="0"/>
-              <a:t>2/8/17</a:t>
+              <a:t>2/23/17</a:t>
             </a:fld>
             <a:endParaRPr lang="en-US"/>
           </a:p>
@@ -3019,7 +3019,7 @@
           <a:p>
             <a:fld id="{BA5C85E4-B586-4D50-9BA0-0F3A58A49C8B}" type="datetimeFigureOut">
               <a:rPr lang="en-US" smtClean="0"/>
-              <a:t>2/8/17</a:t>
+              <a:t>2/23/17</a:t>
             </a:fld>
             <a:endParaRPr lang="en-US"/>
           </a:p>
@@ -3393,7 +3393,7 @@
           <a:p>
             <a:fld id="{BA5C85E4-B586-4D50-9BA0-0F3A58A49C8B}" type="datetimeFigureOut">
               <a:rPr lang="en-US" smtClean="0"/>
-              <a:t>2/8/17</a:t>
+              <a:t>2/23/17</a:t>
             </a:fld>
             <a:endParaRPr lang="en-US"/>
           </a:p>
@@ -3518,7 +3518,7 @@
           <a:p>
             <a:fld id="{BA5C85E4-B586-4D50-9BA0-0F3A58A49C8B}" type="datetimeFigureOut">
               <a:rPr lang="en-US" smtClean="0"/>
-              <a:t>2/8/17</a:t>
+              <a:t>2/23/17</a:t>
             </a:fld>
             <a:endParaRPr lang="en-US"/>
           </a:p>
@@ -3620,7 +3620,7 @@
           <a:p>
             <a:fld id="{BA5C85E4-B586-4D50-9BA0-0F3A58A49C8B}" type="datetimeFigureOut">
               <a:rPr lang="en-US" smtClean="0"/>
-              <a:t>2/8/17</a:t>
+              <a:t>2/23/17</a:t>
             </a:fld>
             <a:endParaRPr lang="en-US"/>
           </a:p>
@@ -3904,7 +3904,7 @@
           <a:p>
             <a:fld id="{BA5C85E4-B586-4D50-9BA0-0F3A58A49C8B}" type="datetimeFigureOut">
               <a:rPr lang="en-US" smtClean="0"/>
-              <a:t>2/8/17</a:t>
+              <a:t>2/23/17</a:t>
             </a:fld>
             <a:endParaRPr lang="en-US"/>
           </a:p>
@@ -4081,7 +4081,7 @@
           <a:p>
             <a:fld id="{7ACA203A-1341-45AE-8AE5-9E342A2C38C9}" type="datetimeFigureOut">
               <a:rPr lang="en-US" smtClean="0"/>
-              <a:t>2/8/17</a:t>
+              <a:t>2/23/17</a:t>
             </a:fld>
             <a:endParaRPr lang="en-US"/>
           </a:p>
@@ -4341,7 +4341,7 @@
           <a:p>
             <a:fld id="{BA5C85E4-B586-4D50-9BA0-0F3A58A49C8B}" type="datetimeFigureOut">
               <a:rPr lang="en-US" smtClean="0"/>
-              <a:t>2/8/17</a:t>
+              <a:t>2/23/17</a:t>
             </a:fld>
             <a:endParaRPr lang="en-US"/>
           </a:p>
@@ -4511,7 +4511,7 @@
           <a:p>
             <a:fld id="{BA5C85E4-B586-4D50-9BA0-0F3A58A49C8B}" type="datetimeFigureOut">
               <a:rPr lang="en-US" smtClean="0"/>
-              <a:t>2/8/17</a:t>
+              <a:t>2/23/17</a:t>
             </a:fld>
             <a:endParaRPr lang="en-US"/>
           </a:p>
@@ -4691,7 +4691,7 @@
           <a:p>
             <a:fld id="{BA5C85E4-B586-4D50-9BA0-0F3A58A49C8B}" type="datetimeFigureOut">
               <a:rPr lang="en-US" smtClean="0"/>
-              <a:t>2/8/17</a:t>
+              <a:t>2/23/17</a:t>
             </a:fld>
             <a:endParaRPr lang="en-US"/>
           </a:p>
@@ -4890,7 +4890,7 @@
           <a:p>
             <a:fld id="{027A1B2E-1286-4A75-915E-AE937742E7F1}" type="datetimeFigureOut">
               <a:rPr lang="en-US" smtClean="0"/>
-              <a:t>2/8/17</a:t>
+              <a:t>2/23/17</a:t>
             </a:fld>
             <a:endParaRPr lang="en-US"/>
           </a:p>
@@ -5375,7 +5375,7 @@
           <a:p>
             <a:fld id="{027A1B2E-1286-4A75-915E-AE937742E7F1}" type="datetimeFigureOut">
               <a:rPr lang="en-US" smtClean="0"/>
-              <a:t>2/8/17</a:t>
+              <a:t>2/23/17</a:t>
             </a:fld>
             <a:endParaRPr lang="en-US"/>
           </a:p>
@@ -5628,7 +5628,7 @@
           <a:p>
             <a:fld id="{027A1B2E-1286-4A75-915E-AE937742E7F1}" type="datetimeFigureOut">
               <a:rPr lang="en-US" smtClean="0"/>
-              <a:t>2/8/17</a:t>
+              <a:t>2/23/17</a:t>
             </a:fld>
             <a:endParaRPr lang="en-US"/>
           </a:p>
@@ -5860,7 +5860,7 @@
           <a:p>
             <a:fld id="{027A1B2E-1286-4A75-915E-AE937742E7F1}" type="datetimeFigureOut">
               <a:rPr lang="en-US" smtClean="0"/>
-              <a:t>2/8/17</a:t>
+              <a:t>2/23/17</a:t>
             </a:fld>
             <a:endParaRPr lang="en-US"/>
           </a:p>
@@ -6227,7 +6227,7 @@
           <a:p>
             <a:fld id="{027A1B2E-1286-4A75-915E-AE937742E7F1}" type="datetimeFigureOut">
               <a:rPr lang="en-US" smtClean="0"/>
-              <a:t>2/8/17</a:t>
+              <a:t>2/23/17</a:t>
             </a:fld>
             <a:endParaRPr lang="en-US"/>
           </a:p>
@@ -6345,7 +6345,7 @@
           <a:p>
             <a:fld id="{027A1B2E-1286-4A75-915E-AE937742E7F1}" type="datetimeFigureOut">
               <a:rPr lang="en-US" smtClean="0"/>
-              <a:t>2/8/17</a:t>
+              <a:t>2/23/17</a:t>
             </a:fld>
             <a:endParaRPr lang="en-US"/>
           </a:p>
@@ -6440,7 +6440,7 @@
           <a:p>
             <a:fld id="{027A1B2E-1286-4A75-915E-AE937742E7F1}" type="datetimeFigureOut">
               <a:rPr lang="en-US" smtClean="0"/>
-              <a:t>2/8/17</a:t>
+              <a:t>2/23/17</a:t>
             </a:fld>
             <a:endParaRPr lang="en-US"/>
           </a:p>
@@ -6686,7 +6686,7 @@
           <a:p>
             <a:fld id="{7ACA203A-1341-45AE-8AE5-9E342A2C38C9}" type="datetimeFigureOut">
               <a:rPr lang="en-US" smtClean="0"/>
-              <a:t>2/8/17</a:t>
+              <a:t>2/23/17</a:t>
             </a:fld>
             <a:endParaRPr lang="en-US"/>
           </a:p>
@@ -6970,7 +6970,7 @@
           <a:p>
             <a:fld id="{027A1B2E-1286-4A75-915E-AE937742E7F1}" type="datetimeFigureOut">
               <a:rPr lang="en-US" smtClean="0"/>
-              <a:t>2/8/17</a:t>
+              <a:t>2/23/17</a:t>
             </a:fld>
             <a:endParaRPr lang="en-US"/>
           </a:p>
@@ -7223,7 +7223,7 @@
           <a:p>
             <a:fld id="{027A1B2E-1286-4A75-915E-AE937742E7F1}" type="datetimeFigureOut">
               <a:rPr lang="en-US" smtClean="0"/>
-              <a:t>2/8/17</a:t>
+              <a:t>2/23/17</a:t>
             </a:fld>
             <a:endParaRPr lang="en-US"/>
           </a:p>
@@ -7400,7 +7400,7 @@
           <a:p>
             <a:fld id="{027A1B2E-1286-4A75-915E-AE937742E7F1}" type="datetimeFigureOut">
               <a:rPr lang="en-US" smtClean="0"/>
-              <a:t>2/8/17</a:t>
+              <a:t>2/23/17</a:t>
             </a:fld>
             <a:endParaRPr lang="en-US"/>
           </a:p>
@@ -7580,7 +7580,7 @@
           <a:p>
             <a:fld id="{027A1B2E-1286-4A75-915E-AE937742E7F1}" type="datetimeFigureOut">
               <a:rPr lang="en-US" smtClean="0"/>
-              <a:t>2/8/17</a:t>
+              <a:t>2/23/17</a:t>
             </a:fld>
             <a:endParaRPr lang="en-US"/>
           </a:p>
@@ -7772,7 +7772,7 @@
           <a:p>
             <a:fld id="{9C0D432E-3E9D-4011-B87F-F9F35BE171A9}" type="datetimeFigureOut">
               <a:rPr lang="en-US" smtClean="0"/>
-              <a:t>2/8/17</a:t>
+              <a:t>2/23/17</a:t>
             </a:fld>
             <a:endParaRPr lang="en-US"/>
           </a:p>
@@ -8319,7 +8319,7 @@
           <a:p>
             <a:fld id="{9C0D432E-3E9D-4011-B87F-F9F35BE171A9}" type="datetimeFigureOut">
               <a:rPr lang="en-US" smtClean="0"/>
-              <a:t>2/8/17</a:t>
+              <a:t>2/23/17</a:t>
             </a:fld>
             <a:endParaRPr lang="en-US"/>
           </a:p>
@@ -8572,7 +8572,7 @@
           <a:p>
             <a:fld id="{9C0D432E-3E9D-4011-B87F-F9F35BE171A9}" type="datetimeFigureOut">
               <a:rPr lang="en-US" smtClean="0"/>
-              <a:t>2/8/17</a:t>
+              <a:t>2/23/17</a:t>
             </a:fld>
             <a:endParaRPr lang="en-US"/>
           </a:p>
@@ -8804,7 +8804,7 @@
           <a:p>
             <a:fld id="{9C0D432E-3E9D-4011-B87F-F9F35BE171A9}" type="datetimeFigureOut">
               <a:rPr lang="en-US" smtClean="0"/>
-              <a:t>2/8/17</a:t>
+              <a:t>2/23/17</a:t>
             </a:fld>
             <a:endParaRPr lang="en-US"/>
           </a:p>
@@ -9171,7 +9171,7 @@
           <a:p>
             <a:fld id="{9C0D432E-3E9D-4011-B87F-F9F35BE171A9}" type="datetimeFigureOut">
               <a:rPr lang="en-US" smtClean="0"/>
-              <a:t>2/8/17</a:t>
+              <a:t>2/23/17</a:t>
             </a:fld>
             <a:endParaRPr lang="en-US"/>
           </a:p>
@@ -9289,7 +9289,7 @@
           <a:p>
             <a:fld id="{9C0D432E-3E9D-4011-B87F-F9F35BE171A9}" type="datetimeFigureOut">
               <a:rPr lang="en-US" smtClean="0"/>
-              <a:t>2/8/17</a:t>
+              <a:t>2/23/17</a:t>
             </a:fld>
             <a:endParaRPr lang="en-US"/>
           </a:p>
@@ -9521,7 +9521,7 @@
           <a:p>
             <a:fld id="{7ACA203A-1341-45AE-8AE5-9E342A2C38C9}" type="datetimeFigureOut">
               <a:rPr lang="en-US" smtClean="0"/>
-              <a:t>2/8/17</a:t>
+              <a:t>2/23/17</a:t>
             </a:fld>
             <a:endParaRPr lang="en-US"/>
           </a:p>
@@ -9628,7 +9628,7 @@
           <a:p>
             <a:fld id="{9C0D432E-3E9D-4011-B87F-F9F35BE171A9}" type="datetimeFigureOut">
               <a:rPr lang="en-US" smtClean="0"/>
-              <a:t>2/8/17</a:t>
+              <a:t>2/23/17</a:t>
             </a:fld>
             <a:endParaRPr lang="en-US"/>
           </a:p>
@@ -9905,7 +9905,7 @@
           <a:p>
             <a:fld id="{9C0D432E-3E9D-4011-B87F-F9F35BE171A9}" type="datetimeFigureOut">
               <a:rPr lang="en-US" smtClean="0"/>
-              <a:t>2/8/17</a:t>
+              <a:t>2/23/17</a:t>
             </a:fld>
             <a:endParaRPr lang="en-US"/>
           </a:p>
@@ -10158,7 +10158,7 @@
           <a:p>
             <a:fld id="{9C0D432E-3E9D-4011-B87F-F9F35BE171A9}" type="datetimeFigureOut">
               <a:rPr lang="en-US" smtClean="0"/>
-              <a:t>2/8/17</a:t>
+              <a:t>2/23/17</a:t>
             </a:fld>
             <a:endParaRPr lang="en-US"/>
           </a:p>
@@ -10328,7 +10328,7 @@
           <a:p>
             <a:fld id="{9C0D432E-3E9D-4011-B87F-F9F35BE171A9}" type="datetimeFigureOut">
               <a:rPr lang="en-US" smtClean="0"/>
-              <a:t>2/8/17</a:t>
+              <a:t>2/23/17</a:t>
             </a:fld>
             <a:endParaRPr lang="en-US"/>
           </a:p>
@@ -10508,7 +10508,7 @@
           <a:p>
             <a:fld id="{9C0D432E-3E9D-4011-B87F-F9F35BE171A9}" type="datetimeFigureOut">
               <a:rPr lang="en-US" smtClean="0"/>
-              <a:t>2/8/17</a:t>
+              <a:t>2/23/17</a:t>
             </a:fld>
             <a:endParaRPr lang="en-US"/>
           </a:p>
@@ -10875,7 +10875,7 @@
           <a:p>
             <a:fld id="{7ACA203A-1341-45AE-8AE5-9E342A2C38C9}" type="datetimeFigureOut">
               <a:rPr lang="en-US" smtClean="0"/>
-              <a:t>2/8/17</a:t>
+              <a:t>2/23/17</a:t>
             </a:fld>
             <a:endParaRPr lang="en-US"/>
           </a:p>
@@ -11000,7 +11000,7 @@
           <a:p>
             <a:fld id="{7ACA203A-1341-45AE-8AE5-9E342A2C38C9}" type="datetimeFigureOut">
               <a:rPr lang="en-US" smtClean="0"/>
-              <a:t>2/8/17</a:t>
+              <a:t>2/23/17</a:t>
             </a:fld>
             <a:endParaRPr lang="en-US"/>
           </a:p>
@@ -11102,7 +11102,7 @@
           <a:p>
             <a:fld id="{7ACA203A-1341-45AE-8AE5-9E342A2C38C9}" type="datetimeFigureOut">
               <a:rPr lang="en-US" smtClean="0"/>
-              <a:t>2/8/17</a:t>
+              <a:t>2/23/17</a:t>
             </a:fld>
             <a:endParaRPr lang="en-US"/>
           </a:p>
@@ -11386,7 +11386,7 @@
           <a:p>
             <a:fld id="{7ACA203A-1341-45AE-8AE5-9E342A2C38C9}" type="datetimeFigureOut">
               <a:rPr lang="en-US" smtClean="0"/>
-              <a:t>2/8/17</a:t>
+              <a:t>2/23/17</a:t>
             </a:fld>
             <a:endParaRPr lang="en-US"/>
           </a:p>
@@ -11646,7 +11646,7 @@
           <a:p>
             <a:fld id="{7ACA203A-1341-45AE-8AE5-9E342A2C38C9}" type="datetimeFigureOut">
               <a:rPr lang="en-US" smtClean="0"/>
-              <a:t>2/8/17</a:t>
+              <a:t>2/23/17</a:t>
             </a:fld>
             <a:endParaRPr lang="en-US"/>
           </a:p>
@@ -11859,7 +11859,7 @@
           <a:p>
             <a:fld id="{7ACA203A-1341-45AE-8AE5-9E342A2C38C9}" type="datetimeFigureOut">
               <a:rPr lang="en-US" smtClean="0"/>
-              <a:t>2/8/17</a:t>
+              <a:t>2/23/17</a:t>
             </a:fld>
             <a:endParaRPr lang="en-US"/>
           </a:p>
@@ -12406,7 +12406,7 @@
           <a:p>
             <a:fld id="{BA5C85E4-B586-4D50-9BA0-0F3A58A49C8B}" type="datetimeFigureOut">
               <a:rPr lang="en-US" smtClean="0"/>
-              <a:t>2/8/17</a:t>
+              <a:t>2/23/17</a:t>
             </a:fld>
             <a:endParaRPr lang="en-US"/>
           </a:p>
@@ -13036,7 +13036,7 @@
           <a:p>
             <a:fld id="{027A1B2E-1286-4A75-915E-AE937742E7F1}" type="datetimeFigureOut">
               <a:rPr lang="en-US" smtClean="0"/>
-              <a:t>2/8/17</a:t>
+              <a:t>2/23/17</a:t>
             </a:fld>
             <a:endParaRPr lang="en-US"/>
           </a:p>
@@ -13719,7 +13719,7 @@
           <a:p>
             <a:fld id="{9C0D432E-3E9D-4011-B87F-F9F35BE171A9}" type="datetimeFigureOut">
               <a:rPr lang="en-US" smtClean="0"/>
-              <a:t>2/8/17</a:t>
+              <a:t>2/23/17</a:t>
             </a:fld>
             <a:endParaRPr lang="en-US"/>
           </a:p>
@@ -33062,11 +33062,6 @@
               </a:rPr>
               <a:t>Mantle</a:t>
             </a:r>
-            <a:endParaRPr lang="en-US" sz="2000" dirty="0" smtClean="0">
-              <a:solidFill>
-                <a:schemeClr val="tx1"/>
-              </a:solidFill>
-            </a:endParaRPr>
           </a:p>
         </p:txBody>
       </p:sp>
@@ -33152,11 +33147,7 @@
             <a:pPr algn="r"/>
             <a:r>
               <a:rPr lang="en-US" b="1" dirty="0" smtClean="0"/>
-              <a:t>Malacology </a:t>
-            </a:r>
-            <a:r>
-              <a:rPr lang="en-US" b="1" dirty="0" smtClean="0"/>
-              <a:t>Interfaces</a:t>
+              <a:t>Malacology Interfaces</a:t>
             </a:r>
           </a:p>
           <a:p>
@@ -33201,11 +33192,7 @@
             <a:pPr algn="r"/>
             <a:r>
               <a:rPr lang="en-US" b="1" dirty="0" smtClean="0"/>
-              <a:t>Existing </a:t>
-            </a:r>
-            <a:r>
-              <a:rPr lang="en-US" b="1" dirty="0" smtClean="0"/>
-              <a:t>Daemons</a:t>
+              <a:t>Existing Daemons</a:t>
             </a:r>
           </a:p>
           <a:p>
@@ -33239,11 +33226,7 @@
             <a:pPr algn="r"/>
             <a:r>
               <a:rPr lang="en-US" b="1" dirty="0" smtClean="0"/>
-              <a:t>Higher-Level</a:t>
-            </a:r>
-            <a:r>
-              <a:rPr lang="en-US" b="1" dirty="0" smtClean="0"/>
-              <a:t> </a:t>
+              <a:t>Higher-Level </a:t>
             </a:r>
           </a:p>
           <a:p>
@@ -33686,11 +33669,6 @@
               </a:rPr>
               <a:t>RADOS API</a:t>
             </a:r>
-            <a:endParaRPr lang="en-US" sz="2000" b="1" dirty="0" smtClean="0">
-              <a:solidFill>
-                <a:schemeClr val="tx1"/>
-              </a:solidFill>
-            </a:endParaRPr>
           </a:p>
         </p:txBody>
       </p:sp>
@@ -33799,15 +33777,7 @@
                   <a:schemeClr val="tx1"/>
                 </a:solidFill>
               </a:rPr>
-              <a:t>Object </a:t>
-            </a:r>
-            <a:r>
-              <a:rPr lang="en-US" sz="2000" b="1" dirty="0" smtClean="0">
-                <a:solidFill>
-                  <a:schemeClr val="tx1"/>
-                </a:solidFill>
-              </a:rPr>
-              <a:t>Classes</a:t>
+              <a:t>Object Classes</a:t>
             </a:r>
           </a:p>
         </p:txBody>
@@ -34127,468 +34097,6 @@
           </a:fontRef>
         </p:style>
       </p:cxnSp>
-      <p:sp>
-        <p:nvSpPr>
-          <p:cNvPr id="42" name="Smiley Face 41"/>
-          <p:cNvSpPr/>
-          <p:nvPr/>
-        </p:nvSpPr>
-        <p:spPr>
-          <a:xfrm>
-            <a:off x="4719320" y="6205220"/>
-            <a:ext cx="447040" cy="447040"/>
-          </a:xfrm>
-          <a:prstGeom prst="smileyFace">
-            <a:avLst/>
-          </a:prstGeom>
-          <a:solidFill>
-            <a:srgbClr val="FFFF00"/>
-          </a:solidFill>
-          <a:ln>
-            <a:solidFill>
-              <a:srgbClr val="000000"/>
-            </a:solidFill>
-          </a:ln>
-        </p:spPr>
-        <p:style>
-          <a:lnRef idx="1">
-            <a:schemeClr val="accent1"/>
-          </a:lnRef>
-          <a:fillRef idx="3">
-            <a:schemeClr val="accent1"/>
-          </a:fillRef>
-          <a:effectRef idx="2">
-            <a:schemeClr val="accent1"/>
-          </a:effectRef>
-          <a:fontRef idx="minor">
-            <a:schemeClr val="lt1"/>
-          </a:fontRef>
-        </p:style>
-        <p:txBody>
-          <a:bodyPr rtlCol="0" anchor="ctr"/>
-          <a:lstStyle/>
-          <a:p>
-            <a:pPr algn="ctr"/>
-            <a:endParaRPr lang="en-US" sz="2400"/>
-          </a:p>
-        </p:txBody>
-      </p:sp>
-      <p:grpSp>
-        <p:nvGrpSpPr>
-          <p:cNvPr id="43" name="Group 42"/>
-          <p:cNvGrpSpPr/>
-          <p:nvPr/>
-        </p:nvGrpSpPr>
-        <p:grpSpPr>
-          <a:xfrm>
-            <a:off x="6118446" y="6217118"/>
-            <a:ext cx="485554" cy="485554"/>
-            <a:chOff x="5437726" y="4672798"/>
-            <a:chExt cx="452260" cy="452260"/>
-          </a:xfrm>
-        </p:grpSpPr>
-        <p:sp>
-          <p:nvSpPr>
-            <p:cNvPr id="45" name="Rounded Rectangle 44"/>
-            <p:cNvSpPr/>
-            <p:nvPr/>
-          </p:nvSpPr>
-          <p:spPr>
-            <a:xfrm>
-              <a:off x="5437726" y="4672798"/>
-              <a:ext cx="452260" cy="452260"/>
-            </a:xfrm>
-            <a:prstGeom prst="roundRect">
-              <a:avLst/>
-            </a:prstGeom>
-            <a:solidFill>
-              <a:srgbClr val="80D2DD"/>
-            </a:solidFill>
-            <a:ln>
-              <a:solidFill>
-                <a:schemeClr val="tx1"/>
-              </a:solidFill>
-            </a:ln>
-          </p:spPr>
-          <p:style>
-            <a:lnRef idx="2">
-              <a:schemeClr val="accent1">
-                <a:shade val="50000"/>
-              </a:schemeClr>
-            </a:lnRef>
-            <a:fillRef idx="1">
-              <a:schemeClr val="accent1"/>
-            </a:fillRef>
-            <a:effectRef idx="0">
-              <a:schemeClr val="accent1"/>
-            </a:effectRef>
-            <a:fontRef idx="minor">
-              <a:schemeClr val="lt1"/>
-            </a:fontRef>
-          </p:style>
-          <p:txBody>
-            <a:bodyPr rtlCol="0" anchor="ctr"/>
-            <a:lstStyle/>
-            <a:p>
-              <a:pPr algn="ctr"/>
-              <a:endParaRPr lang="en-US" sz="1600" dirty="0">
-                <a:latin typeface="Arial" panose="020B0604020202020204" pitchFamily="34" charset="0"/>
-                <a:cs typeface="Arial" panose="020B0604020202020204" pitchFamily="34" charset="0"/>
-              </a:endParaRPr>
-            </a:p>
-          </p:txBody>
-        </p:sp>
-        <p:sp>
-          <p:nvSpPr>
-            <p:cNvPr id="46" name="Rounded Rectangle 45"/>
-            <p:cNvSpPr/>
-            <p:nvPr/>
-          </p:nvSpPr>
-          <p:spPr>
-            <a:xfrm>
-              <a:off x="5457779" y="4965572"/>
-              <a:ext cx="409481" cy="121328"/>
-            </a:xfrm>
-            <a:prstGeom prst="roundRect">
-              <a:avLst>
-                <a:gd name="adj" fmla="val 35977"/>
-              </a:avLst>
-            </a:prstGeom>
-            <a:solidFill>
-              <a:srgbClr val="F05D55"/>
-            </a:solidFill>
-            <a:ln>
-              <a:solidFill>
-                <a:schemeClr val="tx1"/>
-              </a:solidFill>
-            </a:ln>
-          </p:spPr>
-          <p:style>
-            <a:lnRef idx="2">
-              <a:schemeClr val="accent1">
-                <a:shade val="50000"/>
-              </a:schemeClr>
-            </a:lnRef>
-            <a:fillRef idx="1">
-              <a:schemeClr val="accent1"/>
-            </a:fillRef>
-            <a:effectRef idx="0">
-              <a:schemeClr val="accent1"/>
-            </a:effectRef>
-            <a:fontRef idx="minor">
-              <a:schemeClr val="lt1"/>
-            </a:fontRef>
-          </p:style>
-          <p:txBody>
-            <a:bodyPr rtlCol="0" anchor="ctr"/>
-            <a:lstStyle/>
-            <a:p>
-              <a:pPr algn="ctr"/>
-              <a:endParaRPr lang="en-US" sz="1200" b="1" dirty="0">
-                <a:latin typeface="Arial" panose="020B0604020202020204" pitchFamily="34" charset="0"/>
-                <a:cs typeface="Arial" panose="020B0604020202020204" pitchFamily="34" charset="0"/>
-              </a:endParaRPr>
-            </a:p>
-          </p:txBody>
-        </p:sp>
-      </p:grpSp>
-      <p:grpSp>
-        <p:nvGrpSpPr>
-          <p:cNvPr id="48" name="Group 47"/>
-          <p:cNvGrpSpPr/>
-          <p:nvPr/>
-        </p:nvGrpSpPr>
-        <p:grpSpPr>
-          <a:xfrm>
-            <a:off x="9347200" y="6204489"/>
-            <a:ext cx="511271" cy="511271"/>
-            <a:chOff x="4243616" y="5502638"/>
-            <a:chExt cx="417576" cy="417576"/>
-          </a:xfrm>
-        </p:grpSpPr>
-        <p:sp>
-          <p:nvSpPr>
-            <p:cNvPr id="49" name="Rounded Rectangle 48"/>
-            <p:cNvSpPr/>
-            <p:nvPr/>
-          </p:nvSpPr>
-          <p:spPr>
-            <a:xfrm>
-              <a:off x="4243616" y="5502638"/>
-              <a:ext cx="417576" cy="417576"/>
-            </a:xfrm>
-            <a:prstGeom prst="roundRect">
-              <a:avLst/>
-            </a:prstGeom>
-            <a:solidFill>
-              <a:srgbClr val="D0CECE"/>
-            </a:solidFill>
-            <a:ln>
-              <a:solidFill>
-                <a:schemeClr val="tx1"/>
-              </a:solidFill>
-            </a:ln>
-          </p:spPr>
-          <p:style>
-            <a:lnRef idx="2">
-              <a:schemeClr val="accent1">
-                <a:shade val="50000"/>
-              </a:schemeClr>
-            </a:lnRef>
-            <a:fillRef idx="1">
-              <a:schemeClr val="accent1"/>
-            </a:fillRef>
-            <a:effectRef idx="0">
-              <a:schemeClr val="accent1"/>
-            </a:effectRef>
-            <a:fontRef idx="minor">
-              <a:schemeClr val="lt1"/>
-            </a:fontRef>
-          </p:style>
-          <p:txBody>
-            <a:bodyPr rtlCol="0" anchor="ctr"/>
-            <a:lstStyle/>
-            <a:p>
-              <a:pPr algn="ctr"/>
-              <a:endParaRPr lang="en-US" sz="1600" dirty="0">
-                <a:solidFill>
-                  <a:schemeClr val="bg1"/>
-                </a:solidFill>
-                <a:latin typeface="Arial" panose="020B0604020202020204" pitchFamily="34" charset="0"/>
-                <a:cs typeface="Arial" panose="020B0604020202020204" pitchFamily="34" charset="0"/>
-              </a:endParaRPr>
-            </a:p>
-          </p:txBody>
-        </p:sp>
-        <p:sp>
-          <p:nvSpPr>
-            <p:cNvPr id="50" name="Rounded Rectangle 49"/>
-            <p:cNvSpPr/>
-            <p:nvPr/>
-          </p:nvSpPr>
-          <p:spPr>
-            <a:xfrm>
-              <a:off x="4264024" y="5530850"/>
-              <a:ext cx="371767" cy="363964"/>
-            </a:xfrm>
-            <a:prstGeom prst="roundRect">
-              <a:avLst/>
-            </a:prstGeom>
-            <a:solidFill>
-              <a:srgbClr val="38424C"/>
-            </a:solidFill>
-            <a:ln>
-              <a:solidFill>
-                <a:schemeClr val="tx1"/>
-              </a:solidFill>
-            </a:ln>
-          </p:spPr>
-          <p:style>
-            <a:lnRef idx="2">
-              <a:schemeClr val="accent1">
-                <a:shade val="50000"/>
-              </a:schemeClr>
-            </a:lnRef>
-            <a:fillRef idx="1">
-              <a:schemeClr val="accent1"/>
-            </a:fillRef>
-            <a:effectRef idx="0">
-              <a:schemeClr val="accent1"/>
-            </a:effectRef>
-            <a:fontRef idx="minor">
-              <a:schemeClr val="lt1"/>
-            </a:fontRef>
-          </p:style>
-          <p:txBody>
-            <a:bodyPr rtlCol="0" anchor="ctr"/>
-            <a:lstStyle/>
-            <a:p>
-              <a:pPr algn="ctr"/>
-              <a:endParaRPr lang="en-US" sz="1600" dirty="0">
-                <a:solidFill>
-                  <a:schemeClr val="bg1"/>
-                </a:solidFill>
-                <a:latin typeface="Arial" panose="020B0604020202020204" pitchFamily="34" charset="0"/>
-                <a:cs typeface="Arial" panose="020B0604020202020204" pitchFamily="34" charset="0"/>
-              </a:endParaRPr>
-            </a:p>
-          </p:txBody>
-        </p:sp>
-        <p:cxnSp>
-          <p:nvCxnSpPr>
-            <p:cNvPr id="51" name="Straight Connector 50"/>
-            <p:cNvCxnSpPr/>
-            <p:nvPr/>
-          </p:nvCxnSpPr>
-          <p:spPr>
-            <a:xfrm flipH="1">
-              <a:off x="4332589" y="5598091"/>
-              <a:ext cx="74924" cy="115359"/>
-            </a:xfrm>
-            <a:prstGeom prst="line">
-              <a:avLst/>
-            </a:prstGeom>
-            <a:ln w="19050" cmpd="sng">
-              <a:solidFill>
-                <a:schemeClr val="bg1"/>
-              </a:solidFill>
-              <a:headEnd type="oval" w="sm" len="sm"/>
-              <a:tailEnd type="oval" w="sm" len="sm"/>
-            </a:ln>
-          </p:spPr>
-          <p:style>
-            <a:lnRef idx="1">
-              <a:schemeClr val="accent1"/>
-            </a:lnRef>
-            <a:fillRef idx="0">
-              <a:schemeClr val="accent1"/>
-            </a:fillRef>
-            <a:effectRef idx="0">
-              <a:schemeClr val="accent1"/>
-            </a:effectRef>
-            <a:fontRef idx="minor">
-              <a:schemeClr val="tx1"/>
-            </a:fontRef>
-          </p:style>
-        </p:cxnSp>
-        <p:cxnSp>
-          <p:nvCxnSpPr>
-            <p:cNvPr id="52" name="Straight Connector 51"/>
-            <p:cNvCxnSpPr/>
-            <p:nvPr/>
-          </p:nvCxnSpPr>
-          <p:spPr>
-            <a:xfrm flipH="1">
-              <a:off x="4426306" y="5718605"/>
-              <a:ext cx="74924" cy="115359"/>
-            </a:xfrm>
-            <a:prstGeom prst="line">
-              <a:avLst/>
-            </a:prstGeom>
-            <a:ln w="19050" cmpd="sng">
-              <a:solidFill>
-                <a:schemeClr val="bg1"/>
-              </a:solidFill>
-              <a:headEnd type="oval" w="sm" len="sm"/>
-              <a:tailEnd type="oval" w="sm" len="sm"/>
-            </a:ln>
-          </p:spPr>
-          <p:style>
-            <a:lnRef idx="1">
-              <a:schemeClr val="accent1"/>
-            </a:lnRef>
-            <a:fillRef idx="0">
-              <a:schemeClr val="accent1"/>
-            </a:fillRef>
-            <a:effectRef idx="0">
-              <a:schemeClr val="accent1"/>
-            </a:effectRef>
-            <a:fontRef idx="minor">
-              <a:schemeClr val="tx1"/>
-            </a:fontRef>
-          </p:style>
-        </p:cxnSp>
-        <p:cxnSp>
-          <p:nvCxnSpPr>
-            <p:cNvPr id="54" name="Straight Connector 53"/>
-            <p:cNvCxnSpPr/>
-            <p:nvPr/>
-          </p:nvCxnSpPr>
-          <p:spPr>
-            <a:xfrm>
-              <a:off x="4408718" y="5596067"/>
-              <a:ext cx="176345" cy="237897"/>
-            </a:xfrm>
-            <a:prstGeom prst="line">
-              <a:avLst/>
-            </a:prstGeom>
-            <a:ln w="19050" cmpd="sng">
-              <a:solidFill>
-                <a:schemeClr val="bg1"/>
-              </a:solidFill>
-              <a:headEnd type="oval" w="sm" len="sm"/>
-              <a:tailEnd type="oval" w="sm" len="sm"/>
-            </a:ln>
-          </p:spPr>
-          <p:style>
-            <a:lnRef idx="1">
-              <a:schemeClr val="accent1"/>
-            </a:lnRef>
-            <a:fillRef idx="0">
-              <a:schemeClr val="accent1"/>
-            </a:fillRef>
-            <a:effectRef idx="0">
-              <a:schemeClr val="accent1"/>
-            </a:effectRef>
-            <a:fontRef idx="minor">
-              <a:schemeClr val="tx1"/>
-            </a:fontRef>
-          </p:style>
-        </p:cxnSp>
-      </p:grpSp>
-      <p:sp>
-        <p:nvSpPr>
-          <p:cNvPr id="55" name="Rounded Rectangle 54"/>
-          <p:cNvSpPr/>
-          <p:nvPr/>
-        </p:nvSpPr>
-        <p:spPr>
-          <a:xfrm>
-            <a:off x="7460518" y="6193507"/>
-            <a:ext cx="494762" cy="494762"/>
-          </a:xfrm>
-          <a:prstGeom prst="roundRect">
-            <a:avLst/>
-          </a:prstGeom>
-          <a:solidFill>
-            <a:srgbClr val="38424C"/>
-          </a:solidFill>
-          <a:ln>
-            <a:solidFill>
-              <a:schemeClr val="tx1"/>
-            </a:solidFill>
-          </a:ln>
-        </p:spPr>
-        <p:style>
-          <a:lnRef idx="2">
-            <a:schemeClr val="accent1">
-              <a:shade val="50000"/>
-            </a:schemeClr>
-          </a:lnRef>
-          <a:fillRef idx="1">
-            <a:schemeClr val="accent1"/>
-          </a:fillRef>
-          <a:effectRef idx="0">
-            <a:schemeClr val="accent1"/>
-          </a:effectRef>
-          <a:fontRef idx="minor">
-            <a:schemeClr val="lt1"/>
-          </a:fontRef>
-        </p:style>
-        <p:txBody>
-          <a:bodyPr rtlCol="0" anchor="ctr"/>
-          <a:lstStyle/>
-          <a:p>
-            <a:r>
-              <a:rPr lang="en-US" sz="2800" dirty="0" smtClean="0">
-                <a:solidFill>
-                  <a:schemeClr val="bg1"/>
-                </a:solidFill>
-                <a:latin typeface="Arial" panose="020B0604020202020204" pitchFamily="34" charset="0"/>
-                <a:cs typeface="Arial" panose="020B0604020202020204" pitchFamily="34" charset="0"/>
-              </a:rPr>
-              <a:t>M</a:t>
-            </a:r>
-            <a:endParaRPr lang="en-US" sz="3600" dirty="0">
-              <a:solidFill>
-                <a:schemeClr val="bg1"/>
-              </a:solidFill>
-              <a:latin typeface="Arial" panose="020B0604020202020204" pitchFamily="34" charset="0"/>
-              <a:cs typeface="Arial" panose="020B0604020202020204" pitchFamily="34" charset="0"/>
-            </a:endParaRPr>
-          </a:p>
-        </p:txBody>
-      </p:sp>
     </p:spTree>
     <p:extLst>
       <p:ext uri="{BB962C8B-B14F-4D97-AF65-F5344CB8AC3E}">
@@ -48612,7 +48120,7 @@
   <a:extraClrSchemeLst/>
   <a:extLst>
     <a:ext uri="{05A4C25C-085E-4340-85A3-A5531E510DB2}">
-      <thm15:themeFamily xmlns:thm15="http://schemas.microsoft.com/office/thememl/2012/main" xmlns="" name="Office Theme" id="{62F939B6-93AF-4DB8-9C6B-D6C7DFDC589F}" vid="{4A3C46E8-61CC-4603-A589-7422A47A8E4A}"/>
+      <thm15:themeFamily xmlns="" xmlns:thm15="http://schemas.microsoft.com/office/thememl/2012/main" name="Office Theme" id="{62F939B6-93AF-4DB8-9C6B-D6C7DFDC589F}" vid="{4A3C46E8-61CC-4603-A589-7422A47A8E4A}"/>
     </a:ext>
   </a:extLst>
 </a:theme>
@@ -48873,7 +48381,7 @@
   <a:extraClrSchemeLst/>
   <a:extLst>
     <a:ext uri="{05A4C25C-085E-4340-85A3-A5531E510DB2}">
-      <thm15:themeFamily xmlns:thm15="http://schemas.microsoft.com/office/thememl/2012/main" xmlns="" name="Office Theme" id="{62F939B6-93AF-4DB8-9C6B-D6C7DFDC589F}" vid="{4A3C46E8-61CC-4603-A589-7422A47A8E4A}"/>
+      <thm15:themeFamily xmlns="" xmlns:thm15="http://schemas.microsoft.com/office/thememl/2012/main" name="Office Theme" id="{62F939B6-93AF-4DB8-9C6B-D6C7DFDC589F}" vid="{4A3C46E8-61CC-4603-A589-7422A47A8E4A}"/>
     </a:ext>
   </a:extLst>
 </a:theme>
@@ -49134,7 +48642,7 @@
   <a:extraClrSchemeLst/>
   <a:extLst>
     <a:ext uri="{05A4C25C-085E-4340-85A3-A5531E510DB2}">
-      <thm15:themeFamily xmlns:thm15="http://schemas.microsoft.com/office/thememl/2012/main" xmlns="" name="Office Theme" id="{62F939B6-93AF-4DB8-9C6B-D6C7DFDC589F}" vid="{4A3C46E8-61CC-4603-A589-7422A47A8E4A}"/>
+      <thm15:themeFamily xmlns="" xmlns:thm15="http://schemas.microsoft.com/office/thememl/2012/main" name="Office Theme" id="{62F939B6-93AF-4DB8-9C6B-D6C7DFDC589F}" vid="{4A3C46E8-61CC-4603-A589-7422A47A8E4A}"/>
     </a:ext>
   </a:extLst>
 </a:theme>
@@ -49395,7 +48903,7 @@
   <a:extraClrSchemeLst/>
   <a:extLst>
     <a:ext uri="{05A4C25C-085E-4340-85A3-A5531E510DB2}">
-      <thm15:themeFamily xmlns:thm15="http://schemas.microsoft.com/office/thememl/2012/main" xmlns="" name="Office Theme" id="{62F939B6-93AF-4DB8-9C6B-D6C7DFDC589F}" vid="{4A3C46E8-61CC-4603-A589-7422A47A8E4A}"/>
+      <thm15:themeFamily xmlns="" xmlns:thm15="http://schemas.microsoft.com/office/thememl/2012/main" name="Office Theme" id="{62F939B6-93AF-4DB8-9C6B-D6C7DFDC589F}" vid="{4A3C46E8-61CC-4603-A589-7422A47A8E4A}"/>
     </a:ext>
   </a:extLst>
 </a:theme>
@@ -49656,7 +49164,7 @@
   <a:extraClrSchemeLst/>
   <a:extLst>
     <a:ext uri="{05A4C25C-085E-4340-85A3-A5531E510DB2}">
-      <thm15:themeFamily xmlns:thm15="http://schemas.microsoft.com/office/thememl/2012/main" xmlns="" name="Office Theme" id="{62F939B6-93AF-4DB8-9C6B-D6C7DFDC589F}" vid="{4A3C46E8-61CC-4603-A589-7422A47A8E4A}"/>
+      <thm15:themeFamily xmlns="" xmlns:thm15="http://schemas.microsoft.com/office/thememl/2012/main" name="Office Theme" id="{62F939B6-93AF-4DB8-9C6B-D6C7DFDC589F}" vid="{4A3C46E8-61CC-4603-A589-7422A47A8E4A}"/>
     </a:ext>
   </a:extLst>
 </a:theme>

</xml_diff>

<commit_message>
paper: more clarifications on terminology
Signed-off-by: Michael Sevilla <mikesevilla3@gmail.com>
</commit_message>
<xml_diff>
--- a/paper/figures/figures.pptx
+++ b/paper/figures/figures.pptx
@@ -125,7 +125,7 @@
   </p:defaultTextStyle>
   <p:extLst>
     <p:ext uri="{EFAFB233-063F-42B5-8137-9DF3F51BA10A}">
-      <p15:sldGuideLst xmlns="" xmlns:p15="http://schemas.microsoft.com/office/powerpoint/2012/main"/>
+      <p15:sldGuideLst xmlns:p15="http://schemas.microsoft.com/office/powerpoint/2012/main" xmlns=""/>
     </p:ext>
   </p:extLst>
 </p:presentation>
@@ -32963,8 +32963,8 @@
         </p:nvSpPr>
         <p:spPr>
           <a:xfrm>
-            <a:off x="4397023" y="1205091"/>
-            <a:ext cx="2156178" cy="754472"/>
+            <a:off x="4397022" y="1270000"/>
+            <a:ext cx="5293077" cy="622299"/>
           </a:xfrm>
           <a:prstGeom prst="roundRect">
             <a:avLst/>
@@ -32994,7 +32994,6 @@
           <a:bodyPr vert="horz" rtlCol="0" anchor="ctr"/>
           <a:lstStyle/>
           <a:p>
-            <a:pPr algn="ctr"/>
             <a:r>
               <a:rPr lang="en-US" sz="2000" dirty="0" err="1" smtClean="0">
                 <a:solidFill>
@@ -33022,8 +33021,8 @@
         </p:nvSpPr>
         <p:spPr>
           <a:xfrm>
-            <a:off x="9791700" y="1206971"/>
-            <a:ext cx="1115248" cy="754472"/>
+            <a:off x="6565900" y="1206971"/>
+            <a:ext cx="4341048" cy="754472"/>
           </a:xfrm>
           <a:prstGeom prst="roundRect">
             <a:avLst/>
@@ -33053,7 +33052,7 @@
           <a:bodyPr vert="horz" rtlCol="0" anchor="ctr"/>
           <a:lstStyle/>
           <a:p>
-            <a:pPr algn="ctr"/>
+            <a:pPr algn="r"/>
             <a:r>
               <a:rPr lang="en-US" sz="2000" dirty="0" smtClean="0">
                 <a:solidFill>
@@ -33062,63 +33061,6 @@
               </a:rPr>
               <a:t>Mantle</a:t>
             </a:r>
-          </a:p>
-        </p:txBody>
-      </p:sp>
-      <p:sp>
-        <p:nvSpPr>
-          <p:cNvPr id="13" name="Rounded Rectangle 12"/>
-          <p:cNvSpPr/>
-          <p:nvPr/>
-        </p:nvSpPr>
-        <p:spPr>
-          <a:xfrm>
-            <a:off x="6655740" y="1206973"/>
-            <a:ext cx="3008959" cy="754472"/>
-          </a:xfrm>
-          <a:prstGeom prst="roundRect">
-            <a:avLst/>
-          </a:prstGeom>
-          <a:noFill/>
-          <a:ln w="76200" cmpd="sng">
-            <a:solidFill>
-              <a:srgbClr val="7030A0"/>
-            </a:solidFill>
-            <a:prstDash val="sysDash"/>
-          </a:ln>
-        </p:spPr>
-        <p:style>
-          <a:lnRef idx="1">
-            <a:schemeClr val="accent1"/>
-          </a:lnRef>
-          <a:fillRef idx="3">
-            <a:schemeClr val="accent1"/>
-          </a:fillRef>
-          <a:effectRef idx="2">
-            <a:schemeClr val="accent1"/>
-          </a:effectRef>
-          <a:fontRef idx="minor">
-            <a:schemeClr val="lt1"/>
-          </a:fontRef>
-        </p:style>
-        <p:txBody>
-          <a:bodyPr vert="horz" rtlCol="0" anchor="ctr"/>
-          <a:lstStyle/>
-          <a:p>
-            <a:pPr algn="ctr"/>
-            <a:r>
-              <a:rPr lang="en-US" dirty="0" smtClean="0">
-                <a:solidFill>
-                  <a:schemeClr val="tx1"/>
-                </a:solidFill>
-              </a:rPr>
-              <a:t>Both</a:t>
-            </a:r>
-            <a:endParaRPr lang="en-US" sz="1000" dirty="0">
-              <a:solidFill>
-                <a:schemeClr val="tx1"/>
-              </a:solidFill>
-            </a:endParaRPr>
           </a:p>
         </p:txBody>
       </p:sp>
@@ -48120,7 +48062,7 @@
   <a:extraClrSchemeLst/>
   <a:extLst>
     <a:ext uri="{05A4C25C-085E-4340-85A3-A5531E510DB2}">
-      <thm15:themeFamily xmlns="" xmlns:thm15="http://schemas.microsoft.com/office/thememl/2012/main" name="Office Theme" id="{62F939B6-93AF-4DB8-9C6B-D6C7DFDC589F}" vid="{4A3C46E8-61CC-4603-A589-7422A47A8E4A}"/>
+      <thm15:themeFamily xmlns:thm15="http://schemas.microsoft.com/office/thememl/2012/main" xmlns="" name="Office Theme" id="{62F939B6-93AF-4DB8-9C6B-D6C7DFDC589F}" vid="{4A3C46E8-61CC-4603-A589-7422A47A8E4A}"/>
     </a:ext>
   </a:extLst>
 </a:theme>
@@ -48381,7 +48323,7 @@
   <a:extraClrSchemeLst/>
   <a:extLst>
     <a:ext uri="{05A4C25C-085E-4340-85A3-A5531E510DB2}">
-      <thm15:themeFamily xmlns="" xmlns:thm15="http://schemas.microsoft.com/office/thememl/2012/main" name="Office Theme" id="{62F939B6-93AF-4DB8-9C6B-D6C7DFDC589F}" vid="{4A3C46E8-61CC-4603-A589-7422A47A8E4A}"/>
+      <thm15:themeFamily xmlns:thm15="http://schemas.microsoft.com/office/thememl/2012/main" xmlns="" name="Office Theme" id="{62F939B6-93AF-4DB8-9C6B-D6C7DFDC589F}" vid="{4A3C46E8-61CC-4603-A589-7422A47A8E4A}"/>
     </a:ext>
   </a:extLst>
 </a:theme>
@@ -48642,7 +48584,7 @@
   <a:extraClrSchemeLst/>
   <a:extLst>
     <a:ext uri="{05A4C25C-085E-4340-85A3-A5531E510DB2}">
-      <thm15:themeFamily xmlns="" xmlns:thm15="http://schemas.microsoft.com/office/thememl/2012/main" name="Office Theme" id="{62F939B6-93AF-4DB8-9C6B-D6C7DFDC589F}" vid="{4A3C46E8-61CC-4603-A589-7422A47A8E4A}"/>
+      <thm15:themeFamily xmlns:thm15="http://schemas.microsoft.com/office/thememl/2012/main" xmlns="" name="Office Theme" id="{62F939B6-93AF-4DB8-9C6B-D6C7DFDC589F}" vid="{4A3C46E8-61CC-4603-A589-7422A47A8E4A}"/>
     </a:ext>
   </a:extLst>
 </a:theme>
@@ -48903,7 +48845,7 @@
   <a:extraClrSchemeLst/>
   <a:extLst>
     <a:ext uri="{05A4C25C-085E-4340-85A3-A5531E510DB2}">
-      <thm15:themeFamily xmlns="" xmlns:thm15="http://schemas.microsoft.com/office/thememl/2012/main" name="Office Theme" id="{62F939B6-93AF-4DB8-9C6B-D6C7DFDC589F}" vid="{4A3C46E8-61CC-4603-A589-7422A47A8E4A}"/>
+      <thm15:themeFamily xmlns:thm15="http://schemas.microsoft.com/office/thememl/2012/main" xmlns="" name="Office Theme" id="{62F939B6-93AF-4DB8-9C6B-D6C7DFDC589F}" vid="{4A3C46E8-61CC-4603-A589-7422A47A8E4A}"/>
     </a:ext>
   </a:extLst>
 </a:theme>
@@ -49164,7 +49106,7 @@
   <a:extraClrSchemeLst/>
   <a:extLst>
     <a:ext uri="{05A4C25C-085E-4340-85A3-A5531E510DB2}">
-      <thm15:themeFamily xmlns="" xmlns:thm15="http://schemas.microsoft.com/office/thememl/2012/main" name="Office Theme" id="{62F939B6-93AF-4DB8-9C6B-D6C7DFDC589F}" vid="{4A3C46E8-61CC-4603-A589-7422A47A8E4A}"/>
+      <thm15:themeFamily xmlns:thm15="http://schemas.microsoft.com/office/thememl/2012/main" xmlns="" name="Office Theme" id="{62F939B6-93AF-4DB8-9C6B-D6C7DFDC589F}" vid="{4A3C46E8-61CC-4603-A589-7422A47A8E4A}"/>
     </a:ext>
   </a:extLst>
 </a:theme>

</xml_diff>